<commit_message>
Update Gardener Architecture picture with new Gardenlet
</commit_message>
<xml_diff>
--- a/doc/architecture/GardenerArchitecture.pptx
+++ b/doc/architecture/GardenerArchitecture.pptx
@@ -197,7 +197,7 @@
           <a:p>
             <a:fld id="{D74E709A-69AA-A94C-AD8F-6C318DC30780}" type="datetimeFigureOut">
               <a:rPr lang="en-US" smtClean="0"/>
-              <a:t>3/7/18</a:t>
+              <a:t>11/11/19</a:t>
             </a:fld>
             <a:endParaRPr lang="en-US"/>
           </a:p>
@@ -593,7 +593,7 @@
           <a:p>
             <a:fld id="{5EFE2BF0-18F9-D245-A6F0-FBB2AFC12A9B}" type="datetimeFigureOut">
               <a:rPr lang="en-US" smtClean="0"/>
-              <a:t>3/7/18</a:t>
+              <a:t>11/11/19</a:t>
             </a:fld>
             <a:endParaRPr lang="en-US"/>
           </a:p>
@@ -761,7 +761,7 @@
           <a:p>
             <a:fld id="{5EFE2BF0-18F9-D245-A6F0-FBB2AFC12A9B}" type="datetimeFigureOut">
               <a:rPr lang="en-US" smtClean="0"/>
-              <a:t>3/7/18</a:t>
+              <a:t>11/11/19</a:t>
             </a:fld>
             <a:endParaRPr lang="en-US"/>
           </a:p>
@@ -939,7 +939,7 @@
           <a:p>
             <a:fld id="{5EFE2BF0-18F9-D245-A6F0-FBB2AFC12A9B}" type="datetimeFigureOut">
               <a:rPr lang="en-US" smtClean="0"/>
-              <a:t>3/7/18</a:t>
+              <a:t>11/11/19</a:t>
             </a:fld>
             <a:endParaRPr lang="en-US"/>
           </a:p>
@@ -1107,7 +1107,7 @@
           <a:p>
             <a:fld id="{5EFE2BF0-18F9-D245-A6F0-FBB2AFC12A9B}" type="datetimeFigureOut">
               <a:rPr lang="en-US" smtClean="0"/>
-              <a:t>3/7/18</a:t>
+              <a:t>11/11/19</a:t>
             </a:fld>
             <a:endParaRPr lang="en-US"/>
           </a:p>
@@ -1352,7 +1352,7 @@
           <a:p>
             <a:fld id="{5EFE2BF0-18F9-D245-A6F0-FBB2AFC12A9B}" type="datetimeFigureOut">
               <a:rPr lang="en-US" smtClean="0"/>
-              <a:t>3/7/18</a:t>
+              <a:t>11/11/19</a:t>
             </a:fld>
             <a:endParaRPr lang="en-US"/>
           </a:p>
@@ -1581,7 +1581,7 @@
           <a:p>
             <a:fld id="{5EFE2BF0-18F9-D245-A6F0-FBB2AFC12A9B}" type="datetimeFigureOut">
               <a:rPr lang="en-US" smtClean="0"/>
-              <a:t>3/7/18</a:t>
+              <a:t>11/11/19</a:t>
             </a:fld>
             <a:endParaRPr lang="en-US"/>
           </a:p>
@@ -1945,7 +1945,7 @@
           <a:p>
             <a:fld id="{5EFE2BF0-18F9-D245-A6F0-FBB2AFC12A9B}" type="datetimeFigureOut">
               <a:rPr lang="en-US" smtClean="0"/>
-              <a:t>3/7/18</a:t>
+              <a:t>11/11/19</a:t>
             </a:fld>
             <a:endParaRPr lang="en-US"/>
           </a:p>
@@ -2062,7 +2062,7 @@
           <a:p>
             <a:fld id="{5EFE2BF0-18F9-D245-A6F0-FBB2AFC12A9B}" type="datetimeFigureOut">
               <a:rPr lang="en-US" smtClean="0"/>
-              <a:t>3/7/18</a:t>
+              <a:t>11/11/19</a:t>
             </a:fld>
             <a:endParaRPr lang="en-US"/>
           </a:p>
@@ -2157,7 +2157,7 @@
           <a:p>
             <a:fld id="{5EFE2BF0-18F9-D245-A6F0-FBB2AFC12A9B}" type="datetimeFigureOut">
               <a:rPr lang="en-US" smtClean="0"/>
-              <a:t>3/7/18</a:t>
+              <a:t>11/11/19</a:t>
             </a:fld>
             <a:endParaRPr lang="en-US"/>
           </a:p>
@@ -2432,7 +2432,7 @@
           <a:p>
             <a:fld id="{5EFE2BF0-18F9-D245-A6F0-FBB2AFC12A9B}" type="datetimeFigureOut">
               <a:rPr lang="en-US" smtClean="0"/>
-              <a:t>3/7/18</a:t>
+              <a:t>11/11/19</a:t>
             </a:fld>
             <a:endParaRPr lang="en-US"/>
           </a:p>
@@ -2684,7 +2684,7 @@
           <a:p>
             <a:fld id="{5EFE2BF0-18F9-D245-A6F0-FBB2AFC12A9B}" type="datetimeFigureOut">
               <a:rPr lang="en-US" smtClean="0"/>
-              <a:t>3/7/18</a:t>
+              <a:t>11/11/19</a:t>
             </a:fld>
             <a:endParaRPr lang="en-US"/>
           </a:p>
@@ -2895,7 +2895,7 @@
           <a:p>
             <a:fld id="{5EFE2BF0-18F9-D245-A6F0-FBB2AFC12A9B}" type="datetimeFigureOut">
               <a:rPr lang="en-US" smtClean="0"/>
-              <a:t>3/7/18</a:t>
+              <a:t>11/11/19</a:t>
             </a:fld>
             <a:endParaRPr lang="en-US"/>
           </a:p>
@@ -3414,7 +3414,7 @@
         </p:nvSpPr>
         <p:spPr bwMode="auto">
           <a:xfrm>
-            <a:off x="1009690" y="891950"/>
+            <a:off x="848943" y="899517"/>
             <a:ext cx="858591" cy="396000"/>
           </a:xfrm>
           <a:prstGeom prst="rect">
@@ -3455,8 +3455,8 @@
         </p:nvCxnSpPr>
         <p:spPr>
           <a:xfrm flipV="1">
-            <a:off x="247338" y="1908492"/>
-            <a:ext cx="11649986" cy="2900"/>
+            <a:off x="572739" y="1908492"/>
+            <a:ext cx="11324585" cy="41576"/>
           </a:xfrm>
           <a:prstGeom prst="line">
             <a:avLst/>
@@ -3561,7 +3561,7 @@
             </a:pPr>
             <a:r>
               <a:rPr lang="de-DE" sz="1200" dirty="0"/>
-              <a:t>W                                                  Worker</a:t>
+              <a:t>W                                                 Worker</a:t>
             </a:r>
             <a:endParaRPr lang="en-US" sz="1200" dirty="0"/>
           </a:p>
@@ -3623,8 +3623,8 @@
         </p:nvSpPr>
         <p:spPr>
           <a:xfrm>
-            <a:off x="5283590" y="3529817"/>
-            <a:ext cx="1604103" cy="2673380"/>
+            <a:off x="5283590" y="4003945"/>
+            <a:ext cx="1604103" cy="2199251"/>
           </a:xfrm>
           <a:prstGeom prst="rect">
             <a:avLst/>
@@ -3669,7 +3669,7 @@
         </p:nvGrpSpPr>
         <p:grpSpPr bwMode="auto">
           <a:xfrm rot="5400000">
-            <a:off x="6828601" y="3595644"/>
+            <a:off x="6830035" y="4091211"/>
             <a:ext cx="157654" cy="182177"/>
             <a:chOff x="998" y="3624"/>
             <a:chExt cx="271" cy="271"/>
@@ -3860,7 +3860,7 @@
         </p:nvGrpSpPr>
         <p:grpSpPr>
           <a:xfrm>
-            <a:off x="6971102" y="3582548"/>
+            <a:off x="6972536" y="4078115"/>
             <a:ext cx="718458" cy="190951"/>
             <a:chOff x="6971102" y="3839906"/>
             <a:chExt cx="718458" cy="190418"/>
@@ -4450,12 +4450,8 @@
           <a:p>
             <a:pPr algn="ctr"/>
             <a:r>
-              <a:rPr lang="en-US" sz="1000" err="1"/>
-              <a:t>Kube</a:t>
-            </a:r>
-            <a:r>
-              <a:rPr lang="en-US" sz="1000"/>
-              <a:t> DNS</a:t>
+              <a:rPr lang="en-US" sz="1000" dirty="0"/>
+              <a:t>Core DNS</a:t>
             </a:r>
           </a:p>
         </p:txBody>
@@ -4559,7 +4555,7 @@
         </p:nvCxnSpPr>
         <p:spPr>
           <a:xfrm flipH="1">
-            <a:off x="1481395" y="705596"/>
+            <a:off x="1320648" y="713163"/>
             <a:ext cx="875" cy="186354"/>
           </a:xfrm>
           <a:prstGeom prst="line">
@@ -4596,8 +4592,8 @@
         </p:nvSpPr>
         <p:spPr bwMode="auto">
           <a:xfrm>
-            <a:off x="160867" y="372782"/>
-            <a:ext cx="4254343" cy="332814"/>
+            <a:off x="708839" y="372782"/>
+            <a:ext cx="3706371" cy="332814"/>
           </a:xfrm>
           <a:prstGeom prst="rect">
             <a:avLst/>
@@ -5139,7 +5135,7 @@
         <p:spPr bwMode="auto">
           <a:xfrm>
             <a:off x="1080235" y="3202826"/>
-            <a:ext cx="2887200" cy="2747085"/>
+            <a:ext cx="2887200" cy="3041601"/>
           </a:xfrm>
           <a:prstGeom prst="rect">
             <a:avLst/>
@@ -5184,7 +5180,7 @@
         </p:nvSpPr>
         <p:spPr bwMode="auto">
           <a:xfrm>
-            <a:off x="1402082" y="4336460"/>
+            <a:off x="1400157" y="4614668"/>
             <a:ext cx="424463" cy="371513"/>
           </a:xfrm>
           <a:prstGeom prst="rect">
@@ -5232,7 +5228,7 @@
         </p:nvSpPr>
         <p:spPr bwMode="auto">
           <a:xfrm>
-            <a:off x="1073930" y="5778948"/>
+            <a:off x="1088629" y="6067953"/>
             <a:ext cx="431800" cy="366712"/>
           </a:xfrm>
           <a:prstGeom prst="rect">
@@ -5278,8 +5274,8 @@
         </p:nvSpPr>
         <p:spPr bwMode="gray">
           <a:xfrm rot="5400000">
-            <a:off x="1045423" y="3571705"/>
-            <a:ext cx="2419010" cy="2190512"/>
+            <a:off x="888811" y="3728316"/>
+            <a:ext cx="2732233" cy="2190512"/>
           </a:xfrm>
           <a:prstGeom prst="corner">
             <a:avLst>
@@ -5651,7 +5647,7 @@
         </p:nvSpPr>
         <p:spPr bwMode="auto">
           <a:xfrm>
-            <a:off x="1940311" y="892709"/>
+            <a:off x="1779564" y="900276"/>
             <a:ext cx="786464" cy="396000"/>
           </a:xfrm>
           <a:prstGeom prst="rect">
@@ -5698,7 +5694,7 @@
         </p:nvSpPr>
         <p:spPr bwMode="auto">
           <a:xfrm>
-            <a:off x="3626581" y="889185"/>
+            <a:off x="3465834" y="896752"/>
             <a:ext cx="780758" cy="396000"/>
           </a:xfrm>
           <a:prstGeom prst="rect">
@@ -5746,7 +5742,7 @@
         </p:nvCxnSpPr>
         <p:spPr>
           <a:xfrm flipH="1">
-            <a:off x="2350498" y="705596"/>
+            <a:off x="2189751" y="713163"/>
             <a:ext cx="875" cy="186354"/>
           </a:xfrm>
           <a:prstGeom prst="line">
@@ -5781,7 +5777,7 @@
         </p:nvCxnSpPr>
         <p:spPr>
           <a:xfrm flipH="1">
-            <a:off x="3156801" y="705596"/>
+            <a:off x="2996054" y="713163"/>
             <a:ext cx="875" cy="186354"/>
           </a:xfrm>
           <a:prstGeom prst="line">
@@ -6937,7 +6933,7 @@
         </p:nvCxnSpPr>
         <p:spPr>
           <a:xfrm>
-            <a:off x="2333543" y="1288709"/>
+            <a:off x="2172796" y="1296276"/>
             <a:ext cx="0" cy="463108"/>
           </a:xfrm>
           <a:prstGeom prst="line">
@@ -7167,44 +7163,6 @@
             <a:ext cx="3173" cy="369211"/>
           </a:xfrm>
           <a:prstGeom prst="line">
-            <a:avLst/>
-          </a:prstGeom>
-          <a:ln w="12700">
-            <a:solidFill>
-              <a:schemeClr val="tx1"/>
-            </a:solidFill>
-          </a:ln>
-        </p:spPr>
-        <p:style>
-          <a:lnRef idx="1">
-            <a:schemeClr val="accent1"/>
-          </a:lnRef>
-          <a:fillRef idx="0">
-            <a:schemeClr val="accent1"/>
-          </a:fillRef>
-          <a:effectRef idx="0">
-            <a:schemeClr val="accent1"/>
-          </a:effectRef>
-          <a:fontRef idx="minor">
-            <a:schemeClr val="tx1"/>
-          </a:fontRef>
-        </p:style>
-      </p:cxnSp>
-      <p:cxnSp>
-        <p:nvCxnSpPr>
-          <p:cNvPr id="367" name="Elbow Connector 366"/>
-          <p:cNvCxnSpPr>
-            <a:cxnSpLocks/>
-            <a:endCxn id="216" idx="3"/>
-          </p:cNvCxnSpPr>
-          <p:nvPr/>
-        </p:nvCxnSpPr>
-        <p:spPr>
-          <a:xfrm rot="5400000">
-            <a:off x="2371485" y="2527813"/>
-            <a:ext cx="2833224" cy="903990"/>
-          </a:xfrm>
-          <a:prstGeom prst="bentConnector2">
             <a:avLst/>
           </a:prstGeom>
           <a:ln w="12700">
@@ -8004,7 +7962,7 @@
         </p:nvGrpSpPr>
         <p:grpSpPr>
           <a:xfrm>
-            <a:off x="-664302" y="6590078"/>
+            <a:off x="-664302" y="6591355"/>
             <a:ext cx="161055" cy="182227"/>
             <a:chOff x="5728872" y="623443"/>
             <a:chExt cx="161055" cy="182227"/>
@@ -8772,7 +8730,7 @@
         </p:nvGrpSpPr>
         <p:grpSpPr>
           <a:xfrm>
-            <a:off x="1367971" y="697322"/>
+            <a:off x="1207224" y="704889"/>
             <a:ext cx="151694" cy="171451"/>
             <a:chOff x="4873292" y="193240"/>
             <a:chExt cx="151694" cy="171451"/>
@@ -8900,7 +8858,7 @@
         </p:nvGrpSpPr>
         <p:grpSpPr>
           <a:xfrm>
-            <a:off x="3041684" y="697322"/>
+            <a:off x="2880937" y="704889"/>
             <a:ext cx="151694" cy="171451"/>
             <a:chOff x="4873292" y="193240"/>
             <a:chExt cx="151694" cy="171451"/>
@@ -9028,7 +8986,7 @@
         </p:nvGrpSpPr>
         <p:grpSpPr>
           <a:xfrm>
-            <a:off x="2238422" y="697322"/>
+            <a:off x="2077675" y="704889"/>
             <a:ext cx="151694" cy="171451"/>
             <a:chOff x="4873292" y="193240"/>
             <a:chExt cx="151694" cy="171451"/>
@@ -9571,45 +9529,6 @@
       </p:cxnSp>
       <p:cxnSp>
         <p:nvCxnSpPr>
-          <p:cNvPr id="386" name="Elbow Connector 385"/>
-          <p:cNvCxnSpPr>
-            <a:cxnSpLocks/>
-          </p:cNvCxnSpPr>
-          <p:nvPr/>
-        </p:nvCxnSpPr>
-        <p:spPr>
-          <a:xfrm>
-            <a:off x="4243517" y="1563194"/>
-            <a:ext cx="2300483" cy="644611"/>
-          </a:xfrm>
-          <a:prstGeom prst="bentConnector3">
-            <a:avLst>
-              <a:gd name="adj1" fmla="val 100927"/>
-            </a:avLst>
-          </a:prstGeom>
-          <a:ln w="12700">
-            <a:solidFill>
-              <a:schemeClr val="tx1"/>
-            </a:solidFill>
-          </a:ln>
-        </p:spPr>
-        <p:style>
-          <a:lnRef idx="1">
-            <a:schemeClr val="accent1"/>
-          </a:lnRef>
-          <a:fillRef idx="0">
-            <a:schemeClr val="accent1"/>
-          </a:fillRef>
-          <a:effectRef idx="0">
-            <a:schemeClr val="accent1"/>
-          </a:effectRef>
-          <a:fontRef idx="minor">
-            <a:schemeClr val="tx1"/>
-          </a:fontRef>
-        </p:style>
-      </p:cxnSp>
-      <p:cxnSp>
-        <p:nvCxnSpPr>
           <p:cNvPr id="272" name="Straight Connector 271"/>
           <p:cNvCxnSpPr>
             <a:cxnSpLocks/>
@@ -10287,134 +10206,6 @@
       </p:grpSp>
       <p:grpSp>
         <p:nvGrpSpPr>
-          <p:cNvPr id="493" name="Group 492"/>
-          <p:cNvGrpSpPr/>
-          <p:nvPr/>
-        </p:nvGrpSpPr>
-        <p:grpSpPr>
-          <a:xfrm>
-            <a:off x="3705200" y="4242503"/>
-            <a:ext cx="133802" cy="188751"/>
-            <a:chOff x="6043023" y="141196"/>
-            <a:chExt cx="133802" cy="188751"/>
-          </a:xfrm>
-        </p:grpSpPr>
-        <p:sp>
-          <p:nvSpPr>
-            <p:cNvPr id="494" name="Text Box 105"/>
-            <p:cNvSpPr txBox="1">
-              <a:spLocks noChangeArrowheads="1"/>
-            </p:cNvSpPr>
-            <p:nvPr/>
-          </p:nvSpPr>
-          <p:spPr bwMode="auto">
-            <a:xfrm>
-              <a:off x="6043023" y="141196"/>
-              <a:ext cx="85725" cy="122238"/>
-            </a:xfrm>
-            <a:prstGeom prst="rect">
-              <a:avLst/>
-            </a:prstGeom>
-            <a:noFill/>
-            <a:ln w="12700">
-              <a:noFill/>
-              <a:miter lim="800000"/>
-              <a:headEnd/>
-              <a:tailEnd/>
-            </a:ln>
-          </p:spPr>
-          <p:txBody>
-            <a:bodyPr lIns="0" tIns="0" rIns="0" bIns="0">
-              <a:spAutoFit/>
-            </a:bodyPr>
-            <a:lstStyle/>
-            <a:p>
-              <a:pPr algn="l">
-                <a:buClrTx/>
-                <a:buSzTx/>
-                <a:buFontTx/>
-                <a:buNone/>
-              </a:pPr>
-              <a:r>
-                <a:rPr lang="en-US" sz="800" b="1"/>
-                <a:t>R</a:t>
-              </a:r>
-            </a:p>
-          </p:txBody>
-        </p:sp>
-        <p:sp>
-          <p:nvSpPr>
-            <p:cNvPr id="495" name="AutoShape 76"/>
-            <p:cNvSpPr>
-              <a:spLocks noChangeArrowheads="1"/>
-            </p:cNvSpPr>
-            <p:nvPr/>
-          </p:nvSpPr>
-          <p:spPr bwMode="auto">
-            <a:xfrm rot="5400000">
-              <a:off x="6061593" y="257947"/>
-              <a:ext cx="72000" cy="72000"/>
-            </a:xfrm>
-            <a:prstGeom prst="flowChartConnector">
-              <a:avLst/>
-            </a:prstGeom>
-            <a:solidFill>
-              <a:schemeClr val="bg1"/>
-            </a:solidFill>
-            <a:ln w="17780">
-              <a:solidFill>
-                <a:schemeClr val="tx1"/>
-              </a:solidFill>
-              <a:round/>
-              <a:headEnd/>
-              <a:tailEnd/>
-            </a:ln>
-          </p:spPr>
-          <p:txBody>
-            <a:bodyPr wrap="none" lIns="90000" tIns="46800" rIns="90000" bIns="46800" anchor="ctr"/>
-            <a:lstStyle/>
-            <a:p>
-              <a:endParaRPr lang="en-US"/>
-            </a:p>
-          </p:txBody>
-        </p:sp>
-        <p:sp>
-          <p:nvSpPr>
-            <p:cNvPr id="496" name="Line 104"/>
-            <p:cNvSpPr>
-              <a:spLocks noChangeShapeType="1"/>
-            </p:cNvSpPr>
-            <p:nvPr/>
-          </p:nvSpPr>
-          <p:spPr bwMode="auto">
-            <a:xfrm flipV="1">
-              <a:off x="6132599" y="203644"/>
-              <a:ext cx="44226" cy="0"/>
-            </a:xfrm>
-            <a:prstGeom prst="line">
-              <a:avLst/>
-            </a:prstGeom>
-            <a:noFill/>
-            <a:ln w="8890">
-              <a:solidFill>
-                <a:schemeClr val="tx1"/>
-              </a:solidFill>
-              <a:round/>
-              <a:headEnd/>
-              <a:tailEnd type="stealth" w="med" len="med"/>
-            </a:ln>
-          </p:spPr>
-          <p:txBody>
-            <a:bodyPr lIns="90000" tIns="46800" rIns="90000" bIns="46800" anchor="ctr"/>
-            <a:lstStyle/>
-            <a:p>
-              <a:endParaRPr lang="en-US"/>
-            </a:p>
-          </p:txBody>
-        </p:sp>
-      </p:grpSp>
-      <p:grpSp>
-        <p:nvGrpSpPr>
           <p:cNvPr id="576" name="Group 575"/>
           <p:cNvGrpSpPr/>
           <p:nvPr/>
@@ -10933,8 +10724,8 @@
         </p:nvSpPr>
         <p:spPr bwMode="gray">
           <a:xfrm>
-            <a:off x="1463041" y="4706395"/>
-            <a:ext cx="2401263" cy="1132752"/>
+            <a:off x="1455505" y="4971008"/>
+            <a:ext cx="2401263" cy="1234020"/>
           </a:xfrm>
           <a:prstGeom prst="wedgeRectCallout">
             <a:avLst>
@@ -11171,7 +10962,161 @@
                 <a:ea typeface="Arial Unicode MS" pitchFamily="34" charset="-128"/>
                 <a:cs typeface="Arial Unicode MS" pitchFamily="34" charset="-128"/>
               </a:rPr>
-              <a:t> Garden Cluster. The Gardener </a:t>
+              <a:t> Garden Cluster. The Gardener Scheduler </a:t>
+            </a:r>
+            <a:r>
+              <a:rPr lang="de-DE" sz="800" b="1" kern="0" dirty="0" err="1">
+                <a:ea typeface="Arial Unicode MS" pitchFamily="34" charset="-128"/>
+                <a:cs typeface="Arial Unicode MS" pitchFamily="34" charset="-128"/>
+              </a:rPr>
+              <a:t>finds</a:t>
+            </a:r>
+            <a:r>
+              <a:rPr lang="de-DE" sz="800" b="1" kern="0" dirty="0">
+                <a:ea typeface="Arial Unicode MS" pitchFamily="34" charset="-128"/>
+                <a:cs typeface="Arial Unicode MS" pitchFamily="34" charset="-128"/>
+              </a:rPr>
+              <a:t> </a:t>
+            </a:r>
+            <a:r>
+              <a:rPr lang="de-DE" sz="800" b="1" kern="0" dirty="0" err="1">
+                <a:ea typeface="Arial Unicode MS" pitchFamily="34" charset="-128"/>
+                <a:cs typeface="Arial Unicode MS" pitchFamily="34" charset="-128"/>
+              </a:rPr>
+              <a:t>the</a:t>
+            </a:r>
+            <a:r>
+              <a:rPr lang="de-DE" sz="800" b="1" kern="0" dirty="0">
+                <a:ea typeface="Arial Unicode MS" pitchFamily="34" charset="-128"/>
+                <a:cs typeface="Arial Unicode MS" pitchFamily="34" charset="-128"/>
+              </a:rPr>
+              <a:t> </a:t>
+            </a:r>
+            <a:r>
+              <a:rPr lang="de-DE" sz="800" b="1" kern="0" dirty="0" err="1">
+                <a:ea typeface="Arial Unicode MS" pitchFamily="34" charset="-128"/>
+                <a:cs typeface="Arial Unicode MS" pitchFamily="34" charset="-128"/>
+              </a:rPr>
+              <a:t>best</a:t>
+            </a:r>
+            <a:r>
+              <a:rPr lang="de-DE" sz="800" b="1" kern="0" dirty="0">
+                <a:ea typeface="Arial Unicode MS" pitchFamily="34" charset="-128"/>
+                <a:cs typeface="Arial Unicode MS" pitchFamily="34" charset="-128"/>
+              </a:rPr>
+              <a:t> </a:t>
+            </a:r>
+            <a:r>
+              <a:rPr lang="de-DE" sz="800" b="1" kern="0" dirty="0" err="1">
+                <a:ea typeface="Arial Unicode MS" pitchFamily="34" charset="-128"/>
+                <a:cs typeface="Arial Unicode MS" pitchFamily="34" charset="-128"/>
+              </a:rPr>
+              <a:t>seed</a:t>
+            </a:r>
+            <a:r>
+              <a:rPr lang="de-DE" sz="800" b="1" kern="0" dirty="0">
+                <a:ea typeface="Arial Unicode MS" pitchFamily="34" charset="-128"/>
+                <a:cs typeface="Arial Unicode MS" pitchFamily="34" charset="-128"/>
+              </a:rPr>
+              <a:t> </a:t>
+            </a:r>
+            <a:r>
+              <a:rPr lang="de-DE" sz="800" b="1" kern="0" dirty="0" err="1">
+                <a:ea typeface="Arial Unicode MS" pitchFamily="34" charset="-128"/>
+                <a:cs typeface="Arial Unicode MS" pitchFamily="34" charset="-128"/>
+              </a:rPr>
+              <a:t>cluster</a:t>
+            </a:r>
+            <a:r>
+              <a:rPr lang="de-DE" sz="800" b="1" kern="0" dirty="0">
+                <a:ea typeface="Arial Unicode MS" pitchFamily="34" charset="-128"/>
+                <a:cs typeface="Arial Unicode MS" pitchFamily="34" charset="-128"/>
+              </a:rPr>
+              <a:t> </a:t>
+            </a:r>
+            <a:r>
+              <a:rPr lang="de-DE" sz="800" b="1" kern="0" dirty="0" err="1">
+                <a:ea typeface="Arial Unicode MS" pitchFamily="34" charset="-128"/>
+                <a:cs typeface="Arial Unicode MS" pitchFamily="34" charset="-128"/>
+              </a:rPr>
+              <a:t>for</a:t>
+            </a:r>
+            <a:r>
+              <a:rPr lang="de-DE" sz="800" b="1" kern="0" dirty="0">
+                <a:ea typeface="Arial Unicode MS" pitchFamily="34" charset="-128"/>
+                <a:cs typeface="Arial Unicode MS" pitchFamily="34" charset="-128"/>
+              </a:rPr>
+              <a:t> </a:t>
+            </a:r>
+            <a:r>
+              <a:rPr lang="de-DE" sz="800" b="1" kern="0" dirty="0" err="1">
+                <a:ea typeface="Arial Unicode MS" pitchFamily="34" charset="-128"/>
+                <a:cs typeface="Arial Unicode MS" pitchFamily="34" charset="-128"/>
+              </a:rPr>
+              <a:t>the</a:t>
+            </a:r>
+            <a:r>
+              <a:rPr lang="de-DE" sz="800" b="1" kern="0" dirty="0">
+                <a:ea typeface="Arial Unicode MS" pitchFamily="34" charset="-128"/>
+                <a:cs typeface="Arial Unicode MS" pitchFamily="34" charset="-128"/>
+              </a:rPr>
+              <a:t> </a:t>
+            </a:r>
+            <a:r>
+              <a:rPr lang="de-DE" sz="800" b="1" kern="0" dirty="0" err="1">
+                <a:ea typeface="Arial Unicode MS" pitchFamily="34" charset="-128"/>
+                <a:cs typeface="Arial Unicode MS" pitchFamily="34" charset="-128"/>
+              </a:rPr>
+              <a:t>shoot</a:t>
+            </a:r>
+            <a:r>
+              <a:rPr lang="de-DE" sz="800" b="1" kern="0" dirty="0">
+                <a:ea typeface="Arial Unicode MS" pitchFamily="34" charset="-128"/>
+                <a:cs typeface="Arial Unicode MS" pitchFamily="34" charset="-128"/>
+              </a:rPr>
+              <a:t>. </a:t>
+            </a:r>
+            <a:r>
+              <a:rPr lang="de-DE" sz="800" b="1" kern="0" dirty="0" err="1">
+                <a:ea typeface="Arial Unicode MS" pitchFamily="34" charset="-128"/>
+                <a:cs typeface="Arial Unicode MS" pitchFamily="34" charset="-128"/>
+              </a:rPr>
+              <a:t>Then</a:t>
+            </a:r>
+            <a:r>
+              <a:rPr lang="de-DE" sz="800" b="1" kern="0" dirty="0">
+                <a:ea typeface="Arial Unicode MS" pitchFamily="34" charset="-128"/>
+                <a:cs typeface="Arial Unicode MS" pitchFamily="34" charset="-128"/>
+              </a:rPr>
+              <a:t>, </a:t>
+            </a:r>
+            <a:r>
+              <a:rPr lang="de-DE" sz="800" b="1" kern="0" dirty="0" err="1">
+                <a:ea typeface="Arial Unicode MS" pitchFamily="34" charset="-128"/>
+                <a:cs typeface="Arial Unicode MS" pitchFamily="34" charset="-128"/>
+              </a:rPr>
+              <a:t>the</a:t>
+            </a:r>
+            <a:r>
+              <a:rPr lang="de-DE" sz="800" b="1" kern="0" dirty="0">
+                <a:ea typeface="Arial Unicode MS" pitchFamily="34" charset="-128"/>
+                <a:cs typeface="Arial Unicode MS" pitchFamily="34" charset="-128"/>
+              </a:rPr>
+              <a:t> </a:t>
+            </a:r>
+            <a:r>
+              <a:rPr lang="de-DE" sz="800" b="1" kern="0" dirty="0" err="1">
+                <a:ea typeface="Arial Unicode MS" pitchFamily="34" charset="-128"/>
+                <a:cs typeface="Arial Unicode MS" pitchFamily="34" charset="-128"/>
+              </a:rPr>
+              <a:t>Gardenlet</a:t>
+            </a:r>
+            <a:r>
+              <a:rPr lang="de-DE" sz="800" b="1" kern="0" dirty="0">
+                <a:ea typeface="Arial Unicode MS" pitchFamily="34" charset="-128"/>
+                <a:cs typeface="Arial Unicode MS" pitchFamily="34" charset="-128"/>
+              </a:rPr>
+              <a:t> </a:t>
             </a:r>
             <a:r>
               <a:rPr lang="de-DE" sz="800" b="1" kern="0" dirty="0" err="1">
@@ -11633,7 +11578,21 @@
                 <a:ea typeface="Arial Unicode MS" pitchFamily="34" charset="-128"/>
                 <a:cs typeface="Arial Unicode MS" pitchFamily="34" charset="-128"/>
               </a:rPr>
-              <a:t> Gardener </a:t>
+              <a:t> </a:t>
+            </a:r>
+            <a:r>
+              <a:rPr lang="de-DE" sz="800" b="1" kern="0" dirty="0" err="1">
+                <a:ea typeface="Arial Unicode MS" pitchFamily="34" charset="-128"/>
+                <a:cs typeface="Arial Unicode MS" pitchFamily="34" charset="-128"/>
+              </a:rPr>
+              <a:t>Gardenlet</a:t>
+            </a:r>
+            <a:r>
+              <a:rPr lang="de-DE" sz="800" b="1" kern="0" dirty="0">
+                <a:ea typeface="Arial Unicode MS" pitchFamily="34" charset="-128"/>
+                <a:cs typeface="Arial Unicode MS" pitchFamily="34" charset="-128"/>
+              </a:rPr>
+              <a:t> </a:t>
             </a:r>
             <a:r>
               <a:rPr lang="de-DE" sz="800" b="1" kern="0" dirty="0" err="1">
@@ -11949,7 +11908,7 @@
         </p:nvSpPr>
         <p:spPr bwMode="auto">
           <a:xfrm>
-            <a:off x="2785889" y="889413"/>
+            <a:off x="2625142" y="896980"/>
             <a:ext cx="780758" cy="396000"/>
           </a:xfrm>
           <a:prstGeom prst="rect">
@@ -12000,7 +11959,7 @@
         </p:nvCxnSpPr>
         <p:spPr>
           <a:xfrm>
-            <a:off x="4016960" y="703059"/>
+            <a:off x="3856213" y="710626"/>
             <a:ext cx="0" cy="186126"/>
           </a:xfrm>
           <a:prstGeom prst="line">
@@ -12041,7 +12000,7 @@
         </p:nvGrpSpPr>
         <p:grpSpPr>
           <a:xfrm>
-            <a:off x="3903075" y="699339"/>
+            <a:off x="3742328" y="706906"/>
             <a:ext cx="151694" cy="171451"/>
             <a:chOff x="4873292" y="193240"/>
             <a:chExt cx="151694" cy="171451"/>
@@ -12196,7 +12155,7 @@
         </p:nvCxnSpPr>
         <p:spPr>
           <a:xfrm rot="5400000">
-            <a:off x="2357874" y="933423"/>
+            <a:off x="2197127" y="940990"/>
             <a:ext cx="466404" cy="1170384"/>
           </a:xfrm>
           <a:prstGeom prst="bentConnector2">
@@ -12237,7 +12196,7 @@
         </p:nvGrpSpPr>
         <p:grpSpPr>
           <a:xfrm>
-            <a:off x="3060930" y="1304796"/>
+            <a:off x="2905074" y="1303134"/>
             <a:ext cx="151694" cy="171451"/>
             <a:chOff x="4873292" y="193240"/>
             <a:chExt cx="151694" cy="171451"/>
@@ -13193,249 +13152,6 @@
       </p:sp>
       <p:sp>
         <p:nvSpPr>
-          <p:cNvPr id="387" name="Rectangle 138">
-            <a:extLst>
-              <a:ext uri="{FF2B5EF4-FFF2-40B4-BE49-F238E27FC236}">
-                <a16:creationId xmlns:a16="http://schemas.microsoft.com/office/drawing/2014/main" id="{7721A857-9DCC-9642-AA99-E1C7F2B8308A}"/>
-              </a:ext>
-            </a:extLst>
-          </p:cNvPr>
-          <p:cNvSpPr>
-            <a:spLocks noChangeArrowheads="1"/>
-          </p:cNvSpPr>
-          <p:nvPr/>
-        </p:nvSpPr>
-        <p:spPr bwMode="auto">
-          <a:xfrm>
-            <a:off x="153251" y="887891"/>
-            <a:ext cx="780758" cy="396000"/>
-          </a:xfrm>
-          <a:prstGeom prst="rect">
-            <a:avLst/>
-          </a:prstGeom>
-          <a:solidFill>
-            <a:schemeClr val="accent6">
-              <a:lumMod val="20000"/>
-              <a:lumOff val="80000"/>
-            </a:schemeClr>
-          </a:solidFill>
-          <a:ln w="17780">
-            <a:solidFill>
-              <a:schemeClr val="tx1"/>
-            </a:solidFill>
-            <a:miter lim="800000"/>
-            <a:headEnd/>
-            <a:tailEnd/>
-          </a:ln>
-        </p:spPr>
-        <p:txBody>
-          <a:bodyPr lIns="36000" tIns="36000" rIns="36000" bIns="36000" anchor="ctr"/>
-          <a:lstStyle/>
-          <a:p>
-            <a:pPr algn="ctr"/>
-            <a:r>
-              <a:rPr lang="en-US" sz="1200" dirty="0" err="1"/>
-              <a:t>kubify</a:t>
-            </a:r>
-            <a:endParaRPr lang="en-US" sz="1200" dirty="0"/>
-          </a:p>
-        </p:txBody>
-      </p:sp>
-      <p:cxnSp>
-        <p:nvCxnSpPr>
-          <p:cNvPr id="388" name="Straight Connector 387">
-            <a:extLst>
-              <a:ext uri="{FF2B5EF4-FFF2-40B4-BE49-F238E27FC236}">
-                <a16:creationId xmlns:a16="http://schemas.microsoft.com/office/drawing/2014/main" id="{71127C74-E59D-9D48-B579-661E74924CD0}"/>
-              </a:ext>
-            </a:extLst>
-          </p:cNvPr>
-          <p:cNvCxnSpPr/>
-          <p:nvPr/>
-        </p:nvCxnSpPr>
-        <p:spPr>
-          <a:xfrm flipH="1">
-            <a:off x="565050" y="707586"/>
-            <a:ext cx="875" cy="186354"/>
-          </a:xfrm>
-          <a:prstGeom prst="line">
-            <a:avLst/>
-          </a:prstGeom>
-          <a:ln w="12700">
-            <a:solidFill>
-              <a:schemeClr val="tx1"/>
-            </a:solidFill>
-          </a:ln>
-        </p:spPr>
-        <p:style>
-          <a:lnRef idx="1">
-            <a:schemeClr val="accent1"/>
-          </a:lnRef>
-          <a:fillRef idx="0">
-            <a:schemeClr val="accent1"/>
-          </a:fillRef>
-          <a:effectRef idx="0">
-            <a:schemeClr val="accent1"/>
-          </a:effectRef>
-          <a:fontRef idx="minor">
-            <a:schemeClr val="tx1"/>
-          </a:fontRef>
-        </p:style>
-      </p:cxnSp>
-      <p:grpSp>
-        <p:nvGrpSpPr>
-          <p:cNvPr id="390" name="Group 389">
-            <a:extLst>
-              <a:ext uri="{FF2B5EF4-FFF2-40B4-BE49-F238E27FC236}">
-                <a16:creationId xmlns:a16="http://schemas.microsoft.com/office/drawing/2014/main" id="{7660828D-3421-A846-9C1D-5154568F2E4D}"/>
-              </a:ext>
-            </a:extLst>
-          </p:cNvPr>
-          <p:cNvGrpSpPr/>
-          <p:nvPr/>
-        </p:nvGrpSpPr>
-        <p:grpSpPr>
-          <a:xfrm>
-            <a:off x="451626" y="699312"/>
-            <a:ext cx="151694" cy="171451"/>
-            <a:chOff x="4873292" y="193240"/>
-            <a:chExt cx="151694" cy="171451"/>
-          </a:xfrm>
-        </p:grpSpPr>
-        <p:sp>
-          <p:nvSpPr>
-            <p:cNvPr id="419" name="Line 104">
-              <a:extLst>
-                <a:ext uri="{FF2B5EF4-FFF2-40B4-BE49-F238E27FC236}">
-                  <a16:creationId xmlns:a16="http://schemas.microsoft.com/office/drawing/2014/main" id="{C66FA200-EE88-AD43-A080-AE48188EC84D}"/>
-                </a:ext>
-              </a:extLst>
-            </p:cNvPr>
-            <p:cNvSpPr>
-              <a:spLocks noChangeShapeType="1"/>
-            </p:cNvSpPr>
-            <p:nvPr/>
-          </p:nvSpPr>
-          <p:spPr bwMode="auto">
-            <a:xfrm flipH="1">
-              <a:off x="4900280" y="329947"/>
-              <a:ext cx="0" cy="34744"/>
-            </a:xfrm>
-            <a:prstGeom prst="line">
-              <a:avLst/>
-            </a:prstGeom>
-            <a:noFill/>
-            <a:ln w="8890">
-              <a:solidFill>
-                <a:schemeClr val="tx1"/>
-              </a:solidFill>
-              <a:round/>
-              <a:headEnd/>
-              <a:tailEnd type="stealth" w="med" len="med"/>
-            </a:ln>
-          </p:spPr>
-          <p:txBody>
-            <a:bodyPr lIns="90000" tIns="46800" rIns="90000" bIns="46800" anchor="ctr"/>
-            <a:lstStyle/>
-            <a:p>
-              <a:endParaRPr lang="en-US"/>
-            </a:p>
-          </p:txBody>
-        </p:sp>
-        <p:sp>
-          <p:nvSpPr>
-            <p:cNvPr id="455" name="Text Box 105">
-              <a:extLst>
-                <a:ext uri="{FF2B5EF4-FFF2-40B4-BE49-F238E27FC236}">
-                  <a16:creationId xmlns:a16="http://schemas.microsoft.com/office/drawing/2014/main" id="{C64B69CF-AE09-1544-BC32-81F1BE0EC62E}"/>
-                </a:ext>
-              </a:extLst>
-            </p:cNvPr>
-            <p:cNvSpPr txBox="1">
-              <a:spLocks noChangeArrowheads="1"/>
-            </p:cNvSpPr>
-            <p:nvPr/>
-          </p:nvSpPr>
-          <p:spPr bwMode="auto">
-            <a:xfrm>
-              <a:off x="4873292" y="193240"/>
-              <a:ext cx="85725" cy="122238"/>
-            </a:xfrm>
-            <a:prstGeom prst="rect">
-              <a:avLst/>
-            </a:prstGeom>
-            <a:noFill/>
-            <a:ln w="12700">
-              <a:noFill/>
-              <a:miter lim="800000"/>
-              <a:headEnd/>
-              <a:tailEnd/>
-            </a:ln>
-          </p:spPr>
-          <p:txBody>
-            <a:bodyPr lIns="0" tIns="0" rIns="0" bIns="0">
-              <a:spAutoFit/>
-            </a:bodyPr>
-            <a:lstStyle/>
-            <a:p>
-              <a:pPr algn="l">
-                <a:buClrTx/>
-                <a:buSzTx/>
-                <a:buFontTx/>
-                <a:buNone/>
-              </a:pPr>
-              <a:r>
-                <a:rPr lang="en-US" sz="800" b="1"/>
-                <a:t>R</a:t>
-              </a:r>
-            </a:p>
-          </p:txBody>
-        </p:sp>
-        <p:sp>
-          <p:nvSpPr>
-            <p:cNvPr id="457" name="AutoShape 76">
-              <a:extLst>
-                <a:ext uri="{FF2B5EF4-FFF2-40B4-BE49-F238E27FC236}">
-                  <a16:creationId xmlns:a16="http://schemas.microsoft.com/office/drawing/2014/main" id="{0F98F00F-B39D-C041-98A7-D2FA1904D52D}"/>
-                </a:ext>
-              </a:extLst>
-            </p:cNvPr>
-            <p:cNvSpPr>
-              <a:spLocks noChangeArrowheads="1"/>
-            </p:cNvSpPr>
-            <p:nvPr/>
-          </p:nvSpPr>
-          <p:spPr bwMode="auto">
-            <a:xfrm rot="5400000">
-              <a:off x="4952986" y="257947"/>
-              <a:ext cx="72000" cy="72000"/>
-            </a:xfrm>
-            <a:prstGeom prst="flowChartConnector">
-              <a:avLst/>
-            </a:prstGeom>
-            <a:solidFill>
-              <a:schemeClr val="bg1"/>
-            </a:solidFill>
-            <a:ln w="17780">
-              <a:solidFill>
-                <a:schemeClr val="tx1"/>
-              </a:solidFill>
-              <a:round/>
-              <a:headEnd/>
-              <a:tailEnd/>
-            </a:ln>
-          </p:spPr>
-          <p:txBody>
-            <a:bodyPr wrap="none" lIns="90000" tIns="46800" rIns="90000" bIns="46800" anchor="ctr"/>
-            <a:lstStyle/>
-            <a:p>
-              <a:endParaRPr lang="en-US"/>
-            </a:p>
-          </p:txBody>
-        </p:sp>
-      </p:grpSp>
-      <p:sp>
-        <p:nvSpPr>
           <p:cNvPr id="458" name="Line 104">
             <a:extLst>
               <a:ext uri="{FF2B5EF4-FFF2-40B4-BE49-F238E27FC236}">
@@ -13766,7 +13482,6 @@
           </p:cNvPr>
           <p:cNvCxnSpPr>
             <a:cxnSpLocks/>
-            <a:endCxn id="597" idx="3"/>
           </p:cNvCxnSpPr>
           <p:nvPr/>
         </p:nvCxnSpPr>
@@ -13963,202 +13678,6 @@
           </p:spPr>
           <p:txBody>
             <a:bodyPr wrap="none" lIns="90000" tIns="46800" rIns="90000" bIns="46800" anchor="ctr"/>
-            <a:lstStyle/>
-            <a:p>
-              <a:endParaRPr lang="en-US"/>
-            </a:p>
-          </p:txBody>
-        </p:sp>
-      </p:grpSp>
-      <p:cxnSp>
-        <p:nvCxnSpPr>
-          <p:cNvPr id="488" name="Straight Connector 487">
-            <a:extLst>
-              <a:ext uri="{FF2B5EF4-FFF2-40B4-BE49-F238E27FC236}">
-                <a16:creationId xmlns:a16="http://schemas.microsoft.com/office/drawing/2014/main" id="{C6934ED7-E4A2-534B-9E1B-842F52CD417A}"/>
-              </a:ext>
-            </a:extLst>
-          </p:cNvPr>
-          <p:cNvCxnSpPr>
-            <a:cxnSpLocks/>
-            <a:stCxn id="218" idx="3"/>
-          </p:cNvCxnSpPr>
-          <p:nvPr/>
-        </p:nvCxnSpPr>
-        <p:spPr>
-          <a:xfrm>
-            <a:off x="6808154" y="5473404"/>
-            <a:ext cx="602739" cy="0"/>
-          </a:xfrm>
-          <a:prstGeom prst="line">
-            <a:avLst/>
-          </a:prstGeom>
-          <a:ln w="12700">
-            <a:solidFill>
-              <a:schemeClr val="tx1"/>
-            </a:solidFill>
-          </a:ln>
-        </p:spPr>
-        <p:style>
-          <a:lnRef idx="1">
-            <a:schemeClr val="accent1"/>
-          </a:lnRef>
-          <a:fillRef idx="0">
-            <a:schemeClr val="accent1"/>
-          </a:fillRef>
-          <a:effectRef idx="0">
-            <a:schemeClr val="accent1"/>
-          </a:effectRef>
-          <a:fontRef idx="minor">
-            <a:schemeClr val="tx1"/>
-          </a:fontRef>
-        </p:style>
-      </p:cxnSp>
-      <p:grpSp>
-        <p:nvGrpSpPr>
-          <p:cNvPr id="428" name="Group 427">
-            <a:extLst>
-              <a:ext uri="{FF2B5EF4-FFF2-40B4-BE49-F238E27FC236}">
-                <a16:creationId xmlns:a16="http://schemas.microsoft.com/office/drawing/2014/main" id="{BC023725-7361-224A-8A75-9F3E1F8E4DD9}"/>
-              </a:ext>
-            </a:extLst>
-          </p:cNvPr>
-          <p:cNvGrpSpPr/>
-          <p:nvPr/>
-        </p:nvGrpSpPr>
-        <p:grpSpPr>
-          <a:xfrm>
-            <a:off x="6915429" y="5442987"/>
-            <a:ext cx="133802" cy="181810"/>
-            <a:chOff x="5750967" y="257947"/>
-            <a:chExt cx="133802" cy="181810"/>
-          </a:xfrm>
-        </p:grpSpPr>
-        <p:sp>
-          <p:nvSpPr>
-            <p:cNvPr id="474" name="Text Box 105">
-              <a:extLst>
-                <a:ext uri="{FF2B5EF4-FFF2-40B4-BE49-F238E27FC236}">
-                  <a16:creationId xmlns:a16="http://schemas.microsoft.com/office/drawing/2014/main" id="{9A4D6C8B-B98D-5D4C-B4BD-26CC1C27E75B}"/>
-                </a:ext>
-              </a:extLst>
-            </p:cNvPr>
-            <p:cNvSpPr txBox="1">
-              <a:spLocks noChangeArrowheads="1"/>
-            </p:cNvSpPr>
-            <p:nvPr/>
-          </p:nvSpPr>
-          <p:spPr bwMode="auto">
-            <a:xfrm>
-              <a:off x="5750967" y="317519"/>
-              <a:ext cx="85725" cy="122238"/>
-            </a:xfrm>
-            <a:prstGeom prst="rect">
-              <a:avLst/>
-            </a:prstGeom>
-            <a:noFill/>
-            <a:ln w="12700">
-              <a:noFill/>
-              <a:miter lim="800000"/>
-              <a:headEnd/>
-              <a:tailEnd/>
-            </a:ln>
-          </p:spPr>
-          <p:txBody>
-            <a:bodyPr lIns="0" tIns="0" rIns="0" bIns="0">
-              <a:spAutoFit/>
-            </a:bodyPr>
-            <a:lstStyle/>
-            <a:p>
-              <a:pPr algn="l">
-                <a:buClrTx/>
-                <a:buSzTx/>
-                <a:buFontTx/>
-                <a:buNone/>
-              </a:pPr>
-              <a:r>
-                <a:rPr lang="en-US" sz="800" b="1" dirty="0"/>
-                <a:t>R</a:t>
-              </a:r>
-            </a:p>
-          </p:txBody>
-        </p:sp>
-        <p:sp>
-          <p:nvSpPr>
-            <p:cNvPr id="478" name="AutoShape 76">
-              <a:extLst>
-                <a:ext uri="{FF2B5EF4-FFF2-40B4-BE49-F238E27FC236}">
-                  <a16:creationId xmlns:a16="http://schemas.microsoft.com/office/drawing/2014/main" id="{8DC0C466-CE71-CB40-B5E0-D14429C08403}"/>
-                </a:ext>
-              </a:extLst>
-            </p:cNvPr>
-            <p:cNvSpPr>
-              <a:spLocks noChangeArrowheads="1"/>
-            </p:cNvSpPr>
-            <p:nvPr/>
-          </p:nvSpPr>
-          <p:spPr bwMode="auto">
-            <a:xfrm rot="5400000">
-              <a:off x="5769537" y="257947"/>
-              <a:ext cx="72000" cy="72000"/>
-            </a:xfrm>
-            <a:prstGeom prst="flowChartConnector">
-              <a:avLst/>
-            </a:prstGeom>
-            <a:solidFill>
-              <a:schemeClr val="bg1"/>
-            </a:solidFill>
-            <a:ln w="17780">
-              <a:solidFill>
-                <a:schemeClr val="tx1"/>
-              </a:solidFill>
-              <a:round/>
-              <a:headEnd/>
-              <a:tailEnd/>
-            </a:ln>
-          </p:spPr>
-          <p:txBody>
-            <a:bodyPr wrap="none" lIns="90000" tIns="46800" rIns="90000" bIns="46800" anchor="ctr"/>
-            <a:lstStyle/>
-            <a:p>
-              <a:endParaRPr lang="en-US"/>
-            </a:p>
-          </p:txBody>
-        </p:sp>
-        <p:sp>
-          <p:nvSpPr>
-            <p:cNvPr id="479" name="Line 104">
-              <a:extLst>
-                <a:ext uri="{FF2B5EF4-FFF2-40B4-BE49-F238E27FC236}">
-                  <a16:creationId xmlns:a16="http://schemas.microsoft.com/office/drawing/2014/main" id="{A1D5834E-A4E5-BA44-BEA3-B71B2D47A280}"/>
-                </a:ext>
-              </a:extLst>
-            </p:cNvPr>
-            <p:cNvSpPr>
-              <a:spLocks noChangeShapeType="1"/>
-            </p:cNvSpPr>
-            <p:nvPr/>
-          </p:nvSpPr>
-          <p:spPr bwMode="auto">
-            <a:xfrm flipV="1">
-              <a:off x="5840543" y="379967"/>
-              <a:ext cx="44226" cy="0"/>
-            </a:xfrm>
-            <a:prstGeom prst="line">
-              <a:avLst/>
-            </a:prstGeom>
-            <a:noFill/>
-            <a:ln w="8890">
-              <a:solidFill>
-                <a:schemeClr val="tx1"/>
-              </a:solidFill>
-              <a:round/>
-              <a:headEnd/>
-              <a:tailEnd type="stealth" w="med" len="med"/>
-            </a:ln>
-          </p:spPr>
-          <p:txBody>
-            <a:bodyPr lIns="90000" tIns="46800" rIns="90000" bIns="46800" anchor="ctr"/>
             <a:lstStyle/>
             <a:p>
               <a:endParaRPr lang="en-US"/>
@@ -14337,202 +13856,6 @@
       </p:sp>
       <p:cxnSp>
         <p:nvCxnSpPr>
-          <p:cNvPr id="565" name="Elbow Connector 564">
-            <a:extLst>
-              <a:ext uri="{FF2B5EF4-FFF2-40B4-BE49-F238E27FC236}">
-                <a16:creationId xmlns:a16="http://schemas.microsoft.com/office/drawing/2014/main" id="{4A23C5FA-1316-1540-BE88-23208B29359E}"/>
-              </a:ext>
-            </a:extLst>
-          </p:cNvPr>
-          <p:cNvCxnSpPr>
-            <a:stCxn id="387" idx="2"/>
-            <a:endCxn id="548" idx="1"/>
-          </p:cNvCxnSpPr>
-          <p:nvPr/>
-        </p:nvCxnSpPr>
-        <p:spPr>
-          <a:xfrm rot="16200000" flipH="1">
-            <a:off x="-1903514" y="3731035"/>
-            <a:ext cx="5358896" cy="464608"/>
-          </a:xfrm>
-          <a:prstGeom prst="bentConnector2">
-            <a:avLst/>
-          </a:prstGeom>
-          <a:ln w="12700">
-            <a:solidFill>
-              <a:schemeClr val="tx1"/>
-            </a:solidFill>
-          </a:ln>
-        </p:spPr>
-        <p:style>
-          <a:lnRef idx="1">
-            <a:schemeClr val="accent1"/>
-          </a:lnRef>
-          <a:fillRef idx="0">
-            <a:schemeClr val="accent1"/>
-          </a:fillRef>
-          <a:effectRef idx="0">
-            <a:schemeClr val="accent1"/>
-          </a:effectRef>
-          <a:fontRef idx="minor">
-            <a:schemeClr val="tx1"/>
-          </a:fontRef>
-        </p:style>
-      </p:cxnSp>
-      <p:grpSp>
-        <p:nvGrpSpPr>
-          <p:cNvPr id="566" name="Group 565">
-            <a:extLst>
-              <a:ext uri="{FF2B5EF4-FFF2-40B4-BE49-F238E27FC236}">
-                <a16:creationId xmlns:a16="http://schemas.microsoft.com/office/drawing/2014/main" id="{B8987D61-3877-7247-8904-B0DFAE31CA69}"/>
-              </a:ext>
-            </a:extLst>
-          </p:cNvPr>
-          <p:cNvGrpSpPr/>
-          <p:nvPr/>
-        </p:nvGrpSpPr>
-        <p:grpSpPr>
-          <a:xfrm>
-            <a:off x="424854" y="1300062"/>
-            <a:ext cx="151694" cy="171451"/>
-            <a:chOff x="4873292" y="193240"/>
-            <a:chExt cx="151694" cy="171451"/>
-          </a:xfrm>
-        </p:grpSpPr>
-        <p:sp>
-          <p:nvSpPr>
-            <p:cNvPr id="567" name="Line 104">
-              <a:extLst>
-                <a:ext uri="{FF2B5EF4-FFF2-40B4-BE49-F238E27FC236}">
-                  <a16:creationId xmlns:a16="http://schemas.microsoft.com/office/drawing/2014/main" id="{BF1D2A76-9A57-DA4F-8648-0DB876EC4B1F}"/>
-                </a:ext>
-              </a:extLst>
-            </p:cNvPr>
-            <p:cNvSpPr>
-              <a:spLocks noChangeShapeType="1"/>
-            </p:cNvSpPr>
-            <p:nvPr/>
-          </p:nvSpPr>
-          <p:spPr bwMode="auto">
-            <a:xfrm flipH="1">
-              <a:off x="4900280" y="329947"/>
-              <a:ext cx="0" cy="34744"/>
-            </a:xfrm>
-            <a:prstGeom prst="line">
-              <a:avLst/>
-            </a:prstGeom>
-            <a:noFill/>
-            <a:ln w="8890">
-              <a:solidFill>
-                <a:schemeClr val="tx1"/>
-              </a:solidFill>
-              <a:round/>
-              <a:headEnd/>
-              <a:tailEnd type="stealth" w="med" len="med"/>
-            </a:ln>
-          </p:spPr>
-          <p:txBody>
-            <a:bodyPr lIns="90000" tIns="46800" rIns="90000" bIns="46800" anchor="ctr"/>
-            <a:lstStyle/>
-            <a:p>
-              <a:endParaRPr lang="en-US"/>
-            </a:p>
-          </p:txBody>
-        </p:sp>
-        <p:sp>
-          <p:nvSpPr>
-            <p:cNvPr id="568" name="Text Box 105">
-              <a:extLst>
-                <a:ext uri="{FF2B5EF4-FFF2-40B4-BE49-F238E27FC236}">
-                  <a16:creationId xmlns:a16="http://schemas.microsoft.com/office/drawing/2014/main" id="{B06549D0-423A-8446-B24A-4491F66F3DCB}"/>
-                </a:ext>
-              </a:extLst>
-            </p:cNvPr>
-            <p:cNvSpPr txBox="1">
-              <a:spLocks noChangeArrowheads="1"/>
-            </p:cNvSpPr>
-            <p:nvPr/>
-          </p:nvSpPr>
-          <p:spPr bwMode="auto">
-            <a:xfrm>
-              <a:off x="4873292" y="193240"/>
-              <a:ext cx="85725" cy="122238"/>
-            </a:xfrm>
-            <a:prstGeom prst="rect">
-              <a:avLst/>
-            </a:prstGeom>
-            <a:noFill/>
-            <a:ln w="12700">
-              <a:noFill/>
-              <a:miter lim="800000"/>
-              <a:headEnd/>
-              <a:tailEnd/>
-            </a:ln>
-          </p:spPr>
-          <p:txBody>
-            <a:bodyPr lIns="0" tIns="0" rIns="0" bIns="0">
-              <a:spAutoFit/>
-            </a:bodyPr>
-            <a:lstStyle/>
-            <a:p>
-              <a:pPr algn="l">
-                <a:buClrTx/>
-                <a:buSzTx/>
-                <a:buFontTx/>
-                <a:buNone/>
-              </a:pPr>
-              <a:r>
-                <a:rPr lang="en-US" sz="800" b="1" dirty="0"/>
-                <a:t>R</a:t>
-              </a:r>
-            </a:p>
-          </p:txBody>
-        </p:sp>
-        <p:sp>
-          <p:nvSpPr>
-            <p:cNvPr id="569" name="AutoShape 76">
-              <a:extLst>
-                <a:ext uri="{FF2B5EF4-FFF2-40B4-BE49-F238E27FC236}">
-                  <a16:creationId xmlns:a16="http://schemas.microsoft.com/office/drawing/2014/main" id="{63820F67-C38C-F346-A806-47652A16EC30}"/>
-                </a:ext>
-              </a:extLst>
-            </p:cNvPr>
-            <p:cNvSpPr>
-              <a:spLocks noChangeArrowheads="1"/>
-            </p:cNvSpPr>
-            <p:nvPr/>
-          </p:nvSpPr>
-          <p:spPr bwMode="auto">
-            <a:xfrm rot="5400000">
-              <a:off x="4952986" y="257947"/>
-              <a:ext cx="72000" cy="72000"/>
-            </a:xfrm>
-            <a:prstGeom prst="flowChartConnector">
-              <a:avLst/>
-            </a:prstGeom>
-            <a:solidFill>
-              <a:schemeClr val="bg1"/>
-            </a:solidFill>
-            <a:ln w="17780">
-              <a:solidFill>
-                <a:schemeClr val="tx1"/>
-              </a:solidFill>
-              <a:round/>
-              <a:headEnd/>
-              <a:tailEnd/>
-            </a:ln>
-          </p:spPr>
-          <p:txBody>
-            <a:bodyPr wrap="none" lIns="90000" tIns="46800" rIns="90000" bIns="46800" anchor="ctr"/>
-            <a:lstStyle/>
-            <a:p>
-              <a:endParaRPr lang="en-US"/>
-            </a:p>
-          </p:txBody>
-        </p:sp>
-      </p:grpSp>
-      <p:cxnSp>
-        <p:nvCxnSpPr>
           <p:cNvPr id="15" name="Straight Connector 14">
             <a:extLst>
               <a:ext uri="{FF2B5EF4-FFF2-40B4-BE49-F238E27FC236}">
@@ -14549,49 +13872,6 @@
           <a:xfrm>
             <a:off x="3345267" y="3839905"/>
             <a:ext cx="194858" cy="0"/>
-          </a:xfrm>
-          <a:prstGeom prst="line">
-            <a:avLst/>
-          </a:prstGeom>
-          <a:ln w="12700">
-            <a:solidFill>
-              <a:schemeClr val="tx1"/>
-            </a:solidFill>
-          </a:ln>
-        </p:spPr>
-        <p:style>
-          <a:lnRef idx="1">
-            <a:schemeClr val="accent1"/>
-          </a:lnRef>
-          <a:fillRef idx="0">
-            <a:schemeClr val="accent1"/>
-          </a:fillRef>
-          <a:effectRef idx="0">
-            <a:schemeClr val="accent1"/>
-          </a:effectRef>
-          <a:fontRef idx="minor">
-            <a:schemeClr val="tx1"/>
-          </a:fontRef>
-        </p:style>
-      </p:cxnSp>
-      <p:cxnSp>
-        <p:nvCxnSpPr>
-          <p:cNvPr id="37" name="Straight Connector 36">
-            <a:extLst>
-              <a:ext uri="{FF2B5EF4-FFF2-40B4-BE49-F238E27FC236}">
-                <a16:creationId xmlns:a16="http://schemas.microsoft.com/office/drawing/2014/main" id="{8379974E-9631-7B4D-8E52-12BB6E4B2644}"/>
-              </a:ext>
-            </a:extLst>
-          </p:cNvPr>
-          <p:cNvCxnSpPr>
-            <a:cxnSpLocks/>
-          </p:cNvCxnSpPr>
-          <p:nvPr/>
-        </p:nvCxnSpPr>
-        <p:spPr>
-          <a:xfrm flipV="1">
-            <a:off x="5815351" y="1563194"/>
-            <a:ext cx="0" cy="637362"/>
           </a:xfrm>
           <a:prstGeom prst="line">
             <a:avLst/>
@@ -14761,436 +14041,6 @@
         <p:spPr>
           <a:xfrm>
             <a:off x="4711700" y="1636090"/>
-            <a:ext cx="0" cy="33960"/>
-          </a:xfrm>
-          <a:prstGeom prst="line">
-            <a:avLst/>
-          </a:prstGeom>
-          <a:ln w="12700">
-            <a:solidFill>
-              <a:schemeClr val="bg1">
-                <a:lumMod val="95000"/>
-              </a:schemeClr>
-            </a:solidFill>
-          </a:ln>
-        </p:spPr>
-        <p:style>
-          <a:lnRef idx="1">
-            <a:schemeClr val="accent1"/>
-          </a:lnRef>
-          <a:fillRef idx="0">
-            <a:schemeClr val="accent1"/>
-          </a:fillRef>
-          <a:effectRef idx="0">
-            <a:schemeClr val="accent1"/>
-          </a:effectRef>
-          <a:fontRef idx="minor">
-            <a:schemeClr val="tx1"/>
-          </a:fontRef>
-        </p:style>
-      </p:cxnSp>
-      <p:cxnSp>
-        <p:nvCxnSpPr>
-          <p:cNvPr id="516" name="Straight Connector 515">
-            <a:extLst>
-              <a:ext uri="{FF2B5EF4-FFF2-40B4-BE49-F238E27FC236}">
-                <a16:creationId xmlns:a16="http://schemas.microsoft.com/office/drawing/2014/main" id="{D16A2DCE-8B41-DA47-ADE8-84B5C3204148}"/>
-              </a:ext>
-            </a:extLst>
-          </p:cNvPr>
-          <p:cNvCxnSpPr/>
-          <p:nvPr/>
-        </p:nvCxnSpPr>
-        <p:spPr>
-          <a:xfrm>
-            <a:off x="5969263" y="1541974"/>
-            <a:ext cx="0" cy="33960"/>
-          </a:xfrm>
-          <a:prstGeom prst="line">
-            <a:avLst/>
-          </a:prstGeom>
-          <a:ln w="12700">
-            <a:solidFill>
-              <a:schemeClr val="bg1">
-                <a:lumMod val="95000"/>
-              </a:schemeClr>
-            </a:solidFill>
-          </a:ln>
-        </p:spPr>
-        <p:style>
-          <a:lnRef idx="1">
-            <a:schemeClr val="accent1"/>
-          </a:lnRef>
-          <a:fillRef idx="0">
-            <a:schemeClr val="accent1"/>
-          </a:fillRef>
-          <a:effectRef idx="0">
-            <a:schemeClr val="accent1"/>
-          </a:effectRef>
-          <a:fontRef idx="minor">
-            <a:schemeClr val="tx1"/>
-          </a:fontRef>
-        </p:style>
-      </p:cxnSp>
-      <p:cxnSp>
-        <p:nvCxnSpPr>
-          <p:cNvPr id="517" name="Straight Connector 516">
-            <a:extLst>
-              <a:ext uri="{FF2B5EF4-FFF2-40B4-BE49-F238E27FC236}">
-                <a16:creationId xmlns:a16="http://schemas.microsoft.com/office/drawing/2014/main" id="{806D5CAB-8709-2347-910A-128C4DAB81C5}"/>
-              </a:ext>
-            </a:extLst>
-          </p:cNvPr>
-          <p:cNvCxnSpPr/>
-          <p:nvPr/>
-        </p:nvCxnSpPr>
-        <p:spPr>
-          <a:xfrm>
-            <a:off x="5940688" y="1541974"/>
-            <a:ext cx="0" cy="33960"/>
-          </a:xfrm>
-          <a:prstGeom prst="line">
-            <a:avLst/>
-          </a:prstGeom>
-          <a:ln w="12700">
-            <a:solidFill>
-              <a:schemeClr val="bg1">
-                <a:lumMod val="95000"/>
-              </a:schemeClr>
-            </a:solidFill>
-          </a:ln>
-        </p:spPr>
-        <p:style>
-          <a:lnRef idx="1">
-            <a:schemeClr val="accent1"/>
-          </a:lnRef>
-          <a:fillRef idx="0">
-            <a:schemeClr val="accent1"/>
-          </a:fillRef>
-          <a:effectRef idx="0">
-            <a:schemeClr val="accent1"/>
-          </a:effectRef>
-          <a:fontRef idx="minor">
-            <a:schemeClr val="tx1"/>
-          </a:fontRef>
-        </p:style>
-      </p:cxnSp>
-      <p:cxnSp>
-        <p:nvCxnSpPr>
-          <p:cNvPr id="518" name="Straight Connector 517">
-            <a:extLst>
-              <a:ext uri="{FF2B5EF4-FFF2-40B4-BE49-F238E27FC236}">
-                <a16:creationId xmlns:a16="http://schemas.microsoft.com/office/drawing/2014/main" id="{B2561413-BC04-3845-902D-9FF248044FCA}"/>
-              </a:ext>
-            </a:extLst>
-          </p:cNvPr>
-          <p:cNvCxnSpPr/>
-          <p:nvPr/>
-        </p:nvCxnSpPr>
-        <p:spPr>
-          <a:xfrm>
-            <a:off x="5803900" y="1639265"/>
-            <a:ext cx="0" cy="33960"/>
-          </a:xfrm>
-          <a:prstGeom prst="line">
-            <a:avLst/>
-          </a:prstGeom>
-          <a:ln w="12700">
-            <a:solidFill>
-              <a:schemeClr val="bg1">
-                <a:lumMod val="95000"/>
-              </a:schemeClr>
-            </a:solidFill>
-          </a:ln>
-        </p:spPr>
-        <p:style>
-          <a:lnRef idx="1">
-            <a:schemeClr val="accent1"/>
-          </a:lnRef>
-          <a:fillRef idx="0">
-            <a:schemeClr val="accent1"/>
-          </a:fillRef>
-          <a:effectRef idx="0">
-            <a:schemeClr val="accent1"/>
-          </a:effectRef>
-          <a:fontRef idx="minor">
-            <a:schemeClr val="tx1"/>
-          </a:fontRef>
-        </p:style>
-      </p:cxnSp>
-      <p:cxnSp>
-        <p:nvCxnSpPr>
-          <p:cNvPr id="519" name="Straight Connector 518">
-            <a:extLst>
-              <a:ext uri="{FF2B5EF4-FFF2-40B4-BE49-F238E27FC236}">
-                <a16:creationId xmlns:a16="http://schemas.microsoft.com/office/drawing/2014/main" id="{212BF46E-7382-7E40-9C92-309256B65531}"/>
-              </a:ext>
-            </a:extLst>
-          </p:cNvPr>
-          <p:cNvCxnSpPr/>
-          <p:nvPr/>
-        </p:nvCxnSpPr>
-        <p:spPr>
-          <a:xfrm>
-            <a:off x="5829300" y="1639265"/>
-            <a:ext cx="0" cy="33960"/>
-          </a:xfrm>
-          <a:prstGeom prst="line">
-            <a:avLst/>
-          </a:prstGeom>
-          <a:ln w="12700">
-            <a:solidFill>
-              <a:schemeClr val="bg1">
-                <a:lumMod val="95000"/>
-              </a:schemeClr>
-            </a:solidFill>
-          </a:ln>
-        </p:spPr>
-        <p:style>
-          <a:lnRef idx="1">
-            <a:schemeClr val="accent1"/>
-          </a:lnRef>
-          <a:fillRef idx="0">
-            <a:schemeClr val="accent1"/>
-          </a:fillRef>
-          <a:effectRef idx="0">
-            <a:schemeClr val="accent1"/>
-          </a:effectRef>
-          <a:fontRef idx="minor">
-            <a:schemeClr val="tx1"/>
-          </a:fontRef>
-        </p:style>
-      </p:cxnSp>
-      <p:cxnSp>
-        <p:nvCxnSpPr>
-          <p:cNvPr id="520" name="Straight Connector 519">
-            <a:extLst>
-              <a:ext uri="{FF2B5EF4-FFF2-40B4-BE49-F238E27FC236}">
-                <a16:creationId xmlns:a16="http://schemas.microsoft.com/office/drawing/2014/main" id="{05464AA4-FD05-8341-B17D-C889F67B085B}"/>
-              </a:ext>
-            </a:extLst>
-          </p:cNvPr>
-          <p:cNvCxnSpPr/>
-          <p:nvPr/>
-        </p:nvCxnSpPr>
-        <p:spPr>
-          <a:xfrm>
-            <a:off x="5943863" y="1639265"/>
-            <a:ext cx="0" cy="33960"/>
-          </a:xfrm>
-          <a:prstGeom prst="line">
-            <a:avLst/>
-          </a:prstGeom>
-          <a:ln w="12700">
-            <a:solidFill>
-              <a:schemeClr val="bg1">
-                <a:lumMod val="95000"/>
-              </a:schemeClr>
-            </a:solidFill>
-          </a:ln>
-        </p:spPr>
-        <p:style>
-          <a:lnRef idx="1">
-            <a:schemeClr val="accent1"/>
-          </a:lnRef>
-          <a:fillRef idx="0">
-            <a:schemeClr val="accent1"/>
-          </a:fillRef>
-          <a:effectRef idx="0">
-            <a:schemeClr val="accent1"/>
-          </a:effectRef>
-          <a:fontRef idx="minor">
-            <a:schemeClr val="tx1"/>
-          </a:fontRef>
-        </p:style>
-      </p:cxnSp>
-      <p:cxnSp>
-        <p:nvCxnSpPr>
-          <p:cNvPr id="530" name="Straight Connector 529">
-            <a:extLst>
-              <a:ext uri="{FF2B5EF4-FFF2-40B4-BE49-F238E27FC236}">
-                <a16:creationId xmlns:a16="http://schemas.microsoft.com/office/drawing/2014/main" id="{C954416B-8FD7-6243-A46D-6C87EC4EA861}"/>
-              </a:ext>
-            </a:extLst>
-          </p:cNvPr>
-          <p:cNvCxnSpPr/>
-          <p:nvPr/>
-        </p:nvCxnSpPr>
-        <p:spPr>
-          <a:xfrm>
-            <a:off x="5969126" y="1636090"/>
-            <a:ext cx="0" cy="33960"/>
-          </a:xfrm>
-          <a:prstGeom prst="line">
-            <a:avLst/>
-          </a:prstGeom>
-          <a:ln w="12700">
-            <a:solidFill>
-              <a:schemeClr val="bg1">
-                <a:lumMod val="95000"/>
-              </a:schemeClr>
-            </a:solidFill>
-          </a:ln>
-        </p:spPr>
-        <p:style>
-          <a:lnRef idx="1">
-            <a:schemeClr val="accent1"/>
-          </a:lnRef>
-          <a:fillRef idx="0">
-            <a:schemeClr val="accent1"/>
-          </a:fillRef>
-          <a:effectRef idx="0">
-            <a:schemeClr val="accent1"/>
-          </a:effectRef>
-          <a:fontRef idx="minor">
-            <a:schemeClr val="tx1"/>
-          </a:fontRef>
-        </p:style>
-      </p:cxnSp>
-      <p:cxnSp>
-        <p:nvCxnSpPr>
-          <p:cNvPr id="531" name="Straight Connector 530">
-            <a:extLst>
-              <a:ext uri="{FF2B5EF4-FFF2-40B4-BE49-F238E27FC236}">
-                <a16:creationId xmlns:a16="http://schemas.microsoft.com/office/drawing/2014/main" id="{5DB05067-E354-9A4E-8C08-D26DD956AAE8}"/>
-              </a:ext>
-            </a:extLst>
-          </p:cNvPr>
-          <p:cNvCxnSpPr/>
-          <p:nvPr/>
-        </p:nvCxnSpPr>
-        <p:spPr>
-          <a:xfrm>
-            <a:off x="6553200" y="1639265"/>
-            <a:ext cx="0" cy="33960"/>
-          </a:xfrm>
-          <a:prstGeom prst="line">
-            <a:avLst/>
-          </a:prstGeom>
-          <a:ln w="12700">
-            <a:solidFill>
-              <a:schemeClr val="bg1">
-                <a:lumMod val="95000"/>
-              </a:schemeClr>
-            </a:solidFill>
-          </a:ln>
-        </p:spPr>
-        <p:style>
-          <a:lnRef idx="1">
-            <a:schemeClr val="accent1"/>
-          </a:lnRef>
-          <a:fillRef idx="0">
-            <a:schemeClr val="accent1"/>
-          </a:fillRef>
-          <a:effectRef idx="0">
-            <a:schemeClr val="accent1"/>
-          </a:effectRef>
-          <a:fontRef idx="minor">
-            <a:schemeClr val="tx1"/>
-          </a:fontRef>
-        </p:style>
-      </p:cxnSp>
-      <p:cxnSp>
-        <p:nvCxnSpPr>
-          <p:cNvPr id="532" name="Straight Connector 531">
-            <a:extLst>
-              <a:ext uri="{FF2B5EF4-FFF2-40B4-BE49-F238E27FC236}">
-                <a16:creationId xmlns:a16="http://schemas.microsoft.com/office/drawing/2014/main" id="{0A917C74-89F6-094D-BC53-4F88BB4D0766}"/>
-              </a:ext>
-            </a:extLst>
-          </p:cNvPr>
-          <p:cNvCxnSpPr/>
-          <p:nvPr/>
-        </p:nvCxnSpPr>
-        <p:spPr>
-          <a:xfrm>
-            <a:off x="6578600" y="1636090"/>
-            <a:ext cx="0" cy="33960"/>
-          </a:xfrm>
-          <a:prstGeom prst="line">
-            <a:avLst/>
-          </a:prstGeom>
-          <a:ln w="12700">
-            <a:solidFill>
-              <a:schemeClr val="bg1">
-                <a:lumMod val="95000"/>
-              </a:schemeClr>
-            </a:solidFill>
-          </a:ln>
-        </p:spPr>
-        <p:style>
-          <a:lnRef idx="1">
-            <a:schemeClr val="accent1"/>
-          </a:lnRef>
-          <a:fillRef idx="0">
-            <a:schemeClr val="accent1"/>
-          </a:fillRef>
-          <a:effectRef idx="0">
-            <a:schemeClr val="accent1"/>
-          </a:effectRef>
-          <a:fontRef idx="minor">
-            <a:schemeClr val="tx1"/>
-          </a:fontRef>
-        </p:style>
-      </p:cxnSp>
-      <p:cxnSp>
-        <p:nvCxnSpPr>
-          <p:cNvPr id="533" name="Straight Connector 532">
-            <a:extLst>
-              <a:ext uri="{FF2B5EF4-FFF2-40B4-BE49-F238E27FC236}">
-                <a16:creationId xmlns:a16="http://schemas.microsoft.com/office/drawing/2014/main" id="{3126CB3A-7771-954E-A7E6-05B392A37512}"/>
-              </a:ext>
-            </a:extLst>
-          </p:cNvPr>
-          <p:cNvCxnSpPr/>
-          <p:nvPr/>
-        </p:nvCxnSpPr>
-        <p:spPr>
-          <a:xfrm>
-            <a:off x="6686687" y="1639265"/>
-            <a:ext cx="0" cy="33960"/>
-          </a:xfrm>
-          <a:prstGeom prst="line">
-            <a:avLst/>
-          </a:prstGeom>
-          <a:ln w="12700">
-            <a:solidFill>
-              <a:schemeClr val="bg1">
-                <a:lumMod val="95000"/>
-              </a:schemeClr>
-            </a:solidFill>
-          </a:ln>
-        </p:spPr>
-        <p:style>
-          <a:lnRef idx="1">
-            <a:schemeClr val="accent1"/>
-          </a:lnRef>
-          <a:fillRef idx="0">
-            <a:schemeClr val="accent1"/>
-          </a:fillRef>
-          <a:effectRef idx="0">
-            <a:schemeClr val="accent1"/>
-          </a:effectRef>
-          <a:fontRef idx="minor">
-            <a:schemeClr val="tx1"/>
-          </a:fontRef>
-        </p:style>
-      </p:cxnSp>
-      <p:cxnSp>
-        <p:nvCxnSpPr>
-          <p:cNvPr id="534" name="Straight Connector 533">
-            <a:extLst>
-              <a:ext uri="{FF2B5EF4-FFF2-40B4-BE49-F238E27FC236}">
-                <a16:creationId xmlns:a16="http://schemas.microsoft.com/office/drawing/2014/main" id="{924528E1-F5D1-5A4C-A29A-9959451B8CE0}"/>
-              </a:ext>
-            </a:extLst>
-          </p:cNvPr>
-          <p:cNvCxnSpPr/>
-          <p:nvPr/>
-        </p:nvCxnSpPr>
-        <p:spPr>
-          <a:xfrm>
-            <a:off x="6715262" y="1636090"/>
             <a:ext cx="0" cy="33960"/>
           </a:xfrm>
           <a:prstGeom prst="line">
@@ -15319,8 +14169,8 @@
         </p:nvSpPr>
         <p:spPr>
           <a:xfrm>
-            <a:off x="5312731" y="3554384"/>
-            <a:ext cx="1533167" cy="2148959"/>
+            <a:off x="5312731" y="4039170"/>
+            <a:ext cx="1533167" cy="1664173"/>
           </a:xfrm>
           <a:prstGeom prst="rect">
             <a:avLst/>
@@ -15669,7 +14519,7 @@
         </p:nvGrpSpPr>
         <p:grpSpPr>
           <a:xfrm>
-            <a:off x="5334553" y="4413425"/>
+            <a:off x="5341525" y="4868984"/>
             <a:ext cx="1474257" cy="199586"/>
             <a:chOff x="5334553" y="4646510"/>
             <a:chExt cx="1474257" cy="199586"/>
@@ -15786,7 +14636,7 @@
         </p:nvGrpSpPr>
         <p:grpSpPr>
           <a:xfrm>
-            <a:off x="5340707" y="4663383"/>
+            <a:off x="5347679" y="5118942"/>
             <a:ext cx="1468103" cy="199586"/>
             <a:chOff x="5334553" y="4896468"/>
             <a:chExt cx="1474257" cy="199586"/>
@@ -15899,7 +14749,7 @@
         </p:nvSpPr>
         <p:spPr bwMode="auto">
           <a:xfrm>
-            <a:off x="6591201" y="3590044"/>
+            <a:off x="6592635" y="4085611"/>
             <a:ext cx="214682" cy="194411"/>
           </a:xfrm>
           <a:prstGeom prst="rect">
@@ -15947,7 +14797,7 @@
         </p:nvSpPr>
         <p:spPr bwMode="auto">
           <a:xfrm>
-            <a:off x="5344435" y="3590014"/>
+            <a:off x="5345869" y="4085581"/>
             <a:ext cx="811663" cy="194411"/>
           </a:xfrm>
           <a:prstGeom prst="rect">
@@ -16005,7 +14855,7 @@
         </p:nvSpPr>
         <p:spPr bwMode="auto">
           <a:xfrm>
-            <a:off x="6140409" y="3590043"/>
+            <a:off x="6141843" y="4085610"/>
             <a:ext cx="450535" cy="195639"/>
           </a:xfrm>
           <a:prstGeom prst="rect">
@@ -16057,7 +14907,7 @@
         </p:nvGrpSpPr>
         <p:grpSpPr>
           <a:xfrm>
-            <a:off x="5350967" y="3882278"/>
+            <a:off x="5345869" y="4358330"/>
             <a:ext cx="2350728" cy="200108"/>
             <a:chOff x="5334554" y="3583995"/>
             <a:chExt cx="2350728" cy="200108"/>
@@ -16503,7 +15353,7 @@
         </p:nvSpPr>
         <p:spPr bwMode="auto">
           <a:xfrm>
-            <a:off x="5347285" y="4119101"/>
+            <a:off x="5348719" y="4614668"/>
             <a:ext cx="838872" cy="197736"/>
           </a:xfrm>
           <a:prstGeom prst="rect">
@@ -16551,7 +15401,7 @@
         </p:nvSpPr>
         <p:spPr bwMode="auto">
           <a:xfrm>
-            <a:off x="6139892" y="4119100"/>
+            <a:off x="6141326" y="4614667"/>
             <a:ext cx="487020" cy="197737"/>
           </a:xfrm>
           <a:prstGeom prst="rect">
@@ -16599,7 +15449,7 @@
         </p:nvSpPr>
         <p:spPr bwMode="auto">
           <a:xfrm>
-            <a:off x="6594107" y="4119130"/>
+            <a:off x="6595541" y="4614697"/>
             <a:ext cx="214682" cy="197706"/>
           </a:xfrm>
           <a:prstGeom prst="rect">
@@ -16639,124 +15489,6 @@
       </p:sp>
       <p:grpSp>
         <p:nvGrpSpPr>
-          <p:cNvPr id="85" name="Group 84">
-            <a:extLst>
-              <a:ext uri="{FF2B5EF4-FFF2-40B4-BE49-F238E27FC236}">
-                <a16:creationId xmlns:a16="http://schemas.microsoft.com/office/drawing/2014/main" id="{F731EB21-CE7E-F447-A677-1A556E91C8B4}"/>
-              </a:ext>
-            </a:extLst>
-          </p:cNvPr>
-          <p:cNvGrpSpPr/>
-          <p:nvPr/>
-        </p:nvGrpSpPr>
-        <p:grpSpPr>
-          <a:xfrm>
-            <a:off x="5352018" y="5373611"/>
-            <a:ext cx="1456136" cy="199586"/>
-            <a:chOff x="5352018" y="5367922"/>
-            <a:chExt cx="1456136" cy="199586"/>
-          </a:xfrm>
-        </p:grpSpPr>
-        <p:sp>
-          <p:nvSpPr>
-            <p:cNvPr id="217" name="Rectangle 138"/>
-            <p:cNvSpPr>
-              <a:spLocks noChangeArrowheads="1"/>
-            </p:cNvSpPr>
-            <p:nvPr/>
-          </p:nvSpPr>
-          <p:spPr bwMode="auto">
-            <a:xfrm>
-              <a:off x="5352018" y="5367922"/>
-              <a:ext cx="1243707" cy="199586"/>
-            </a:xfrm>
-            <a:prstGeom prst="rect">
-              <a:avLst/>
-            </a:prstGeom>
-            <a:solidFill>
-              <a:schemeClr val="accent2">
-                <a:lumMod val="60000"/>
-                <a:lumOff val="40000"/>
-              </a:schemeClr>
-            </a:solidFill>
-            <a:ln w="17780">
-              <a:solidFill>
-                <a:schemeClr val="tx1"/>
-              </a:solidFill>
-              <a:miter lim="800000"/>
-              <a:headEnd/>
-              <a:tailEnd/>
-            </a:ln>
-          </p:spPr>
-          <p:txBody>
-            <a:bodyPr lIns="36000" tIns="36000" rIns="36000" bIns="36000" anchor="ctr"/>
-            <a:lstStyle/>
-            <a:p>
-              <a:pPr algn="ctr">
-                <a:buClrTx/>
-                <a:buSzTx/>
-                <a:buFontTx/>
-                <a:buNone/>
-              </a:pPr>
-              <a:r>
-                <a:rPr lang="en-US" sz="1000" dirty="0" err="1"/>
-                <a:t>Terraformer</a:t>
-              </a:r>
-              <a:endParaRPr lang="en-US" sz="1000" dirty="0"/>
-            </a:p>
-          </p:txBody>
-        </p:sp>
-        <p:sp>
-          <p:nvSpPr>
-            <p:cNvPr id="218" name="Rectangle 138"/>
-            <p:cNvSpPr>
-              <a:spLocks noChangeArrowheads="1"/>
-            </p:cNvSpPr>
-            <p:nvPr/>
-          </p:nvSpPr>
-          <p:spPr bwMode="auto">
-            <a:xfrm>
-              <a:off x="6593472" y="5367922"/>
-              <a:ext cx="214682" cy="199586"/>
-            </a:xfrm>
-            <a:prstGeom prst="rect">
-              <a:avLst/>
-            </a:prstGeom>
-            <a:solidFill>
-              <a:schemeClr val="accent2">
-                <a:lumMod val="60000"/>
-                <a:lumOff val="40000"/>
-              </a:schemeClr>
-            </a:solidFill>
-            <a:ln w="17780">
-              <a:solidFill>
-                <a:schemeClr val="tx1"/>
-              </a:solidFill>
-              <a:miter lim="800000"/>
-              <a:headEnd/>
-              <a:tailEnd/>
-            </a:ln>
-          </p:spPr>
-          <p:txBody>
-            <a:bodyPr lIns="36000" tIns="36000" rIns="36000" bIns="36000" anchor="ctr"/>
-            <a:lstStyle/>
-            <a:p>
-              <a:pPr algn="ctr">
-                <a:buClrTx/>
-                <a:buSzTx/>
-                <a:buFontTx/>
-                <a:buNone/>
-              </a:pPr>
-              <a:r>
-                <a:rPr lang="en-US" sz="1000"/>
-                <a:t>J</a:t>
-              </a:r>
-            </a:p>
-          </p:txBody>
-        </p:sp>
-      </p:grpSp>
-      <p:grpSp>
-        <p:nvGrpSpPr>
           <p:cNvPr id="51" name="Group 50">
             <a:extLst>
               <a:ext uri="{FF2B5EF4-FFF2-40B4-BE49-F238E27FC236}">
@@ -16769,7 +15501,7 @@
         </p:nvGrpSpPr>
         <p:grpSpPr>
           <a:xfrm>
-            <a:off x="5349234" y="5140215"/>
+            <a:off x="5348489" y="5372156"/>
             <a:ext cx="1456405" cy="183068"/>
             <a:chOff x="5349234" y="5142021"/>
             <a:chExt cx="1456405" cy="183068"/>
@@ -16884,139 +15616,6 @@
           </p:txBody>
         </p:sp>
       </p:grpSp>
-      <p:grpSp>
-        <p:nvGrpSpPr>
-          <p:cNvPr id="468" name="Group 467">
-            <a:extLst>
-              <a:ext uri="{FF2B5EF4-FFF2-40B4-BE49-F238E27FC236}">
-                <a16:creationId xmlns:a16="http://schemas.microsoft.com/office/drawing/2014/main" id="{28B56AA4-5AE6-614B-89D3-805B66DB8656}"/>
-              </a:ext>
-            </a:extLst>
-          </p:cNvPr>
-          <p:cNvGrpSpPr/>
-          <p:nvPr/>
-        </p:nvGrpSpPr>
-        <p:grpSpPr>
-          <a:xfrm>
-            <a:off x="5344352" y="4908643"/>
-            <a:ext cx="1463633" cy="183068"/>
-            <a:chOff x="5344847" y="4912266"/>
-            <a:chExt cx="1463633" cy="183068"/>
-          </a:xfrm>
-        </p:grpSpPr>
-        <p:sp>
-          <p:nvSpPr>
-            <p:cNvPr id="595" name="Rectangle 138">
-              <a:extLst>
-                <a:ext uri="{FF2B5EF4-FFF2-40B4-BE49-F238E27FC236}">
-                  <a16:creationId xmlns:a16="http://schemas.microsoft.com/office/drawing/2014/main" id="{8BA60AB1-B5C7-514F-9277-80F281D8E5C4}"/>
-                </a:ext>
-              </a:extLst>
-            </p:cNvPr>
-            <p:cNvSpPr>
-              <a:spLocks noChangeArrowheads="1"/>
-            </p:cNvSpPr>
-            <p:nvPr/>
-          </p:nvSpPr>
-          <p:spPr bwMode="auto">
-            <a:xfrm>
-              <a:off x="5344847" y="4912266"/>
-              <a:ext cx="1248948" cy="183068"/>
-            </a:xfrm>
-            <a:prstGeom prst="rect">
-              <a:avLst/>
-            </a:prstGeom>
-            <a:solidFill>
-              <a:schemeClr val="accent2">
-                <a:lumMod val="60000"/>
-                <a:lumOff val="40000"/>
-              </a:schemeClr>
-            </a:solidFill>
-            <a:ln w="17780">
-              <a:solidFill>
-                <a:schemeClr val="tx1"/>
-              </a:solidFill>
-              <a:miter lim="800000"/>
-              <a:headEnd/>
-              <a:tailEnd/>
-            </a:ln>
-          </p:spPr>
-          <p:txBody>
-            <a:bodyPr lIns="36000" tIns="36000" rIns="36000" bIns="36000" anchor="ctr"/>
-            <a:lstStyle/>
-            <a:p>
-              <a:pPr algn="ctr">
-                <a:buClrTx/>
-                <a:buSzTx/>
-                <a:buFontTx/>
-                <a:buNone/>
-              </a:pPr>
-              <a:r>
-                <a:rPr lang="en-US" sz="1000" dirty="0" err="1"/>
-                <a:t>Addon</a:t>
-              </a:r>
-              <a:r>
-                <a:rPr lang="en-US" sz="1000" dirty="0"/>
-                <a:t> Manager</a:t>
-              </a:r>
-            </a:p>
-          </p:txBody>
-        </p:sp>
-        <p:sp>
-          <p:nvSpPr>
-            <p:cNvPr id="597" name="Rectangle 138">
-              <a:extLst>
-                <a:ext uri="{FF2B5EF4-FFF2-40B4-BE49-F238E27FC236}">
-                  <a16:creationId xmlns:a16="http://schemas.microsoft.com/office/drawing/2014/main" id="{62A3041C-934D-5149-996A-1AD12B24FE3E}"/>
-                </a:ext>
-              </a:extLst>
-            </p:cNvPr>
-            <p:cNvSpPr>
-              <a:spLocks noChangeArrowheads="1"/>
-            </p:cNvSpPr>
-            <p:nvPr/>
-          </p:nvSpPr>
-          <p:spPr bwMode="auto">
-            <a:xfrm>
-              <a:off x="6593798" y="4912266"/>
-              <a:ext cx="214682" cy="182261"/>
-            </a:xfrm>
-            <a:prstGeom prst="rect">
-              <a:avLst/>
-            </a:prstGeom>
-            <a:solidFill>
-              <a:schemeClr val="accent2">
-                <a:lumMod val="60000"/>
-                <a:lumOff val="40000"/>
-              </a:schemeClr>
-            </a:solidFill>
-            <a:ln w="17780">
-              <a:solidFill>
-                <a:schemeClr val="tx1"/>
-              </a:solidFill>
-              <a:miter lim="800000"/>
-              <a:headEnd/>
-              <a:tailEnd/>
-            </a:ln>
-          </p:spPr>
-          <p:txBody>
-            <a:bodyPr lIns="36000" tIns="36000" rIns="36000" bIns="36000" anchor="ctr"/>
-            <a:lstStyle/>
-            <a:p>
-              <a:pPr algn="ctr">
-                <a:buClrTx/>
-                <a:buSzTx/>
-                <a:buFontTx/>
-                <a:buNone/>
-              </a:pPr>
-              <a:r>
-                <a:rPr lang="en-US" sz="1000" dirty="0"/>
-                <a:t>D</a:t>
-              </a:r>
-            </a:p>
-          </p:txBody>
-        </p:sp>
-      </p:grpSp>
       <p:sp>
         <p:nvSpPr>
           <p:cNvPr id="422" name="Rectangular Callout 421">
@@ -17105,8 +15704,8 @@
         </p:nvCxnSpPr>
         <p:spPr>
           <a:xfrm rot="5400000">
-            <a:off x="6436707" y="2798342"/>
-            <a:ext cx="1791724" cy="1047559"/>
+            <a:off x="6183303" y="3041960"/>
+            <a:ext cx="2298510" cy="1044670"/>
           </a:xfrm>
           <a:prstGeom prst="bentConnector2">
             <a:avLst/>
@@ -17144,14 +15743,14 @@
         </p:nvCxnSpPr>
         <p:spPr>
           <a:xfrm rot="16200000" flipH="1" flipV="1">
-            <a:off x="6870479" y="1725706"/>
-            <a:ext cx="2104054" cy="3078207"/>
+            <a:off x="6623412" y="1974206"/>
+            <a:ext cx="2599621" cy="3076773"/>
           </a:xfrm>
           <a:prstGeom prst="bentConnector5">
             <a:avLst>
-              <a:gd name="adj1" fmla="val -17129"/>
-              <a:gd name="adj2" fmla="val 35851"/>
-              <a:gd name="adj3" fmla="val 102251"/>
+              <a:gd name="adj1" fmla="val -14484"/>
+              <a:gd name="adj2" fmla="val 35390"/>
+              <a:gd name="adj3" fmla="val 101294"/>
             </a:avLst>
           </a:prstGeom>
           <a:ln w="12700">
@@ -17189,7 +15788,7 @@
         </p:nvGrpSpPr>
         <p:grpSpPr>
           <a:xfrm>
-            <a:off x="6914277" y="4326807"/>
+            <a:off x="6963718" y="4810761"/>
             <a:ext cx="133802" cy="181810"/>
             <a:chOff x="5750967" y="257947"/>
             <a:chExt cx="133802" cy="181810"/>
@@ -17344,12 +15943,12 @@
         </p:nvCxnSpPr>
         <p:spPr>
           <a:xfrm rot="16200000" flipH="1">
-            <a:off x="5705725" y="4445634"/>
-            <a:ext cx="2726310" cy="1406406"/>
+            <a:off x="5961823" y="4686537"/>
+            <a:ext cx="2230743" cy="1420166"/>
           </a:xfrm>
           <a:prstGeom prst="bentConnector3">
             <a:avLst>
-              <a:gd name="adj1" fmla="val 1835"/>
+              <a:gd name="adj1" fmla="val 2077"/>
             </a:avLst>
           </a:prstGeom>
           <a:ln w="12700">
@@ -17558,13 +16157,13 @@
         </p:nvCxnSpPr>
         <p:spPr>
           <a:xfrm>
-            <a:off x="6805639" y="5231346"/>
-            <a:ext cx="3163336" cy="1016633"/>
+            <a:off x="6804894" y="5463287"/>
+            <a:ext cx="3164081" cy="784692"/>
           </a:xfrm>
           <a:prstGeom prst="bentConnector4">
             <a:avLst>
-              <a:gd name="adj1" fmla="val 19331"/>
-              <a:gd name="adj2" fmla="val 139502"/>
+              <a:gd name="adj1" fmla="val 19497"/>
+              <a:gd name="adj2" fmla="val 150553"/>
             </a:avLst>
           </a:prstGeom>
           <a:ln w="12700">
@@ -17602,7 +16201,7 @@
         </p:nvGrpSpPr>
         <p:grpSpPr>
           <a:xfrm>
-            <a:off x="6909006" y="5203903"/>
+            <a:off x="6942724" y="5412922"/>
             <a:ext cx="133802" cy="181810"/>
             <a:chOff x="5750967" y="257947"/>
             <a:chExt cx="133802" cy="181810"/>
@@ -17754,7 +16353,7 @@
         </p:nvCxnSpPr>
         <p:spPr>
           <a:xfrm>
-            <a:off x="7759700" y="4188442"/>
+            <a:off x="7761134" y="4684009"/>
             <a:ext cx="0" cy="56664"/>
           </a:xfrm>
           <a:prstGeom prst="line">
@@ -17797,7 +16396,7 @@
         </p:nvCxnSpPr>
         <p:spPr>
           <a:xfrm>
-            <a:off x="7785100" y="4182092"/>
+            <a:off x="7786534" y="4677659"/>
             <a:ext cx="0" cy="56664"/>
           </a:xfrm>
           <a:prstGeom prst="line">
@@ -17840,7 +16439,7 @@
         </p:nvCxnSpPr>
         <p:spPr>
           <a:xfrm>
-            <a:off x="7759745" y="4337667"/>
+            <a:off x="7766717" y="4793226"/>
             <a:ext cx="0" cy="56664"/>
           </a:xfrm>
           <a:prstGeom prst="line">
@@ -17883,7 +16482,7 @@
         </p:nvCxnSpPr>
         <p:spPr>
           <a:xfrm>
-            <a:off x="7785100" y="4337667"/>
+            <a:off x="7792072" y="4793226"/>
             <a:ext cx="0" cy="56664"/>
           </a:xfrm>
           <a:prstGeom prst="line">
@@ -17926,7 +16525,7 @@
         </p:nvCxnSpPr>
         <p:spPr>
           <a:xfrm>
-            <a:off x="7912100" y="4340842"/>
+            <a:off x="7919072" y="4796401"/>
             <a:ext cx="0" cy="56664"/>
           </a:xfrm>
           <a:prstGeom prst="line">
@@ -17969,7 +16568,7 @@
         </p:nvCxnSpPr>
         <p:spPr>
           <a:xfrm>
-            <a:off x="7937500" y="4337667"/>
+            <a:off x="7944472" y="4793226"/>
             <a:ext cx="0" cy="56664"/>
           </a:xfrm>
           <a:prstGeom prst="line">
@@ -18166,6 +16765,1043 @@
           </a:fontRef>
         </p:style>
       </p:cxnSp>
+      <p:sp>
+        <p:nvSpPr>
+          <p:cNvPr id="369" name="Rectangle 138">
+            <a:extLst>
+              <a:ext uri="{FF2B5EF4-FFF2-40B4-BE49-F238E27FC236}">
+                <a16:creationId xmlns:a16="http://schemas.microsoft.com/office/drawing/2014/main" id="{4ACDF34C-B4C7-A34E-9A25-7581C6E33DA8}"/>
+              </a:ext>
+            </a:extLst>
+          </p:cNvPr>
+          <p:cNvSpPr>
+            <a:spLocks noChangeArrowheads="1"/>
+          </p:cNvSpPr>
+          <p:nvPr/>
+        </p:nvSpPr>
+        <p:spPr bwMode="auto">
+          <a:xfrm>
+            <a:off x="1439712" y="4553747"/>
+            <a:ext cx="1672684" cy="199586"/>
+          </a:xfrm>
+          <a:prstGeom prst="rect">
+            <a:avLst/>
+          </a:prstGeom>
+          <a:solidFill>
+            <a:schemeClr val="accent6">
+              <a:lumMod val="20000"/>
+              <a:lumOff val="80000"/>
+            </a:schemeClr>
+          </a:solidFill>
+          <a:ln w="17780">
+            <a:solidFill>
+              <a:schemeClr val="tx1"/>
+            </a:solidFill>
+            <a:miter lim="800000"/>
+            <a:headEnd/>
+            <a:tailEnd/>
+          </a:ln>
+        </p:spPr>
+        <p:txBody>
+          <a:bodyPr lIns="36000" tIns="36000" rIns="36000" bIns="36000" anchor="ctr"/>
+          <a:lstStyle/>
+          <a:p>
+            <a:pPr algn="ctr">
+              <a:buClrTx/>
+              <a:buSzTx/>
+              <a:buFontTx/>
+              <a:buNone/>
+            </a:pPr>
+            <a:r>
+              <a:rPr lang="en-US" sz="1000" dirty="0"/>
+              <a:t>Gardener Scheduler</a:t>
+            </a:r>
+          </a:p>
+        </p:txBody>
+      </p:sp>
+      <p:sp>
+        <p:nvSpPr>
+          <p:cNvPr id="382" name="Rectangle 138">
+            <a:extLst>
+              <a:ext uri="{FF2B5EF4-FFF2-40B4-BE49-F238E27FC236}">
+                <a16:creationId xmlns:a16="http://schemas.microsoft.com/office/drawing/2014/main" id="{52BD6BEB-90C3-1141-BA81-51780870455C}"/>
+              </a:ext>
+            </a:extLst>
+          </p:cNvPr>
+          <p:cNvSpPr>
+            <a:spLocks noChangeArrowheads="1"/>
+          </p:cNvSpPr>
+          <p:nvPr/>
+        </p:nvSpPr>
+        <p:spPr bwMode="auto">
+          <a:xfrm>
+            <a:off x="3117314" y="4553747"/>
+            <a:ext cx="214682" cy="199586"/>
+          </a:xfrm>
+          <a:prstGeom prst="rect">
+            <a:avLst/>
+          </a:prstGeom>
+          <a:solidFill>
+            <a:schemeClr val="accent6">
+              <a:lumMod val="20000"/>
+              <a:lumOff val="80000"/>
+            </a:schemeClr>
+          </a:solidFill>
+          <a:ln w="17780">
+            <a:solidFill>
+              <a:schemeClr val="tx1"/>
+            </a:solidFill>
+            <a:miter lim="800000"/>
+            <a:headEnd/>
+            <a:tailEnd/>
+          </a:ln>
+        </p:spPr>
+        <p:txBody>
+          <a:bodyPr lIns="36000" tIns="36000" rIns="36000" bIns="36000" anchor="ctr"/>
+          <a:lstStyle/>
+          <a:p>
+            <a:pPr algn="ctr">
+              <a:buClrTx/>
+              <a:buSzTx/>
+              <a:buFontTx/>
+              <a:buNone/>
+            </a:pPr>
+            <a:r>
+              <a:rPr lang="en-US" sz="1000"/>
+              <a:t>D</a:t>
+            </a:r>
+          </a:p>
+        </p:txBody>
+      </p:sp>
+      <p:cxnSp>
+        <p:nvCxnSpPr>
+          <p:cNvPr id="27" name="Straight Connector 26">
+            <a:extLst>
+              <a:ext uri="{FF2B5EF4-FFF2-40B4-BE49-F238E27FC236}">
+                <a16:creationId xmlns:a16="http://schemas.microsoft.com/office/drawing/2014/main" id="{7E8B281C-BECC-6348-B521-7E06027D3CE9}"/>
+              </a:ext>
+            </a:extLst>
+          </p:cNvPr>
+          <p:cNvCxnSpPr/>
+          <p:nvPr/>
+        </p:nvCxnSpPr>
+        <p:spPr>
+          <a:xfrm>
+            <a:off x="3543197" y="4335583"/>
+            <a:ext cx="0" cy="318294"/>
+          </a:xfrm>
+          <a:prstGeom prst="line">
+            <a:avLst/>
+          </a:prstGeom>
+          <a:ln w="12700">
+            <a:solidFill>
+              <a:schemeClr val="tx1"/>
+            </a:solidFill>
+          </a:ln>
+        </p:spPr>
+        <p:style>
+          <a:lnRef idx="1">
+            <a:schemeClr val="accent1"/>
+          </a:lnRef>
+          <a:fillRef idx="0">
+            <a:schemeClr val="accent1"/>
+          </a:fillRef>
+          <a:effectRef idx="0">
+            <a:schemeClr val="accent1"/>
+          </a:effectRef>
+          <a:fontRef idx="minor">
+            <a:schemeClr val="tx1"/>
+          </a:fontRef>
+        </p:style>
+      </p:cxnSp>
+      <p:cxnSp>
+        <p:nvCxnSpPr>
+          <p:cNvPr id="29" name="Straight Connector 28">
+            <a:extLst>
+              <a:ext uri="{FF2B5EF4-FFF2-40B4-BE49-F238E27FC236}">
+                <a16:creationId xmlns:a16="http://schemas.microsoft.com/office/drawing/2014/main" id="{FEA258E9-5986-824E-AD86-5D4B94C1BC42}"/>
+              </a:ext>
+            </a:extLst>
+          </p:cNvPr>
+          <p:cNvCxnSpPr>
+            <a:cxnSpLocks/>
+            <a:stCxn id="382" idx="3"/>
+          </p:cNvCxnSpPr>
+          <p:nvPr/>
+        </p:nvCxnSpPr>
+        <p:spPr>
+          <a:xfrm>
+            <a:off x="3331996" y="4653540"/>
+            <a:ext cx="212891" cy="0"/>
+          </a:xfrm>
+          <a:prstGeom prst="line">
+            <a:avLst/>
+          </a:prstGeom>
+          <a:ln w="12700">
+            <a:solidFill>
+              <a:schemeClr val="tx1"/>
+            </a:solidFill>
+          </a:ln>
+        </p:spPr>
+        <p:style>
+          <a:lnRef idx="1">
+            <a:schemeClr val="accent1"/>
+          </a:lnRef>
+          <a:fillRef idx="0">
+            <a:schemeClr val="accent1"/>
+          </a:fillRef>
+          <a:effectRef idx="0">
+            <a:schemeClr val="accent1"/>
+          </a:effectRef>
+          <a:fontRef idx="minor">
+            <a:schemeClr val="tx1"/>
+          </a:fontRef>
+        </p:style>
+      </p:cxnSp>
+      <p:sp>
+        <p:nvSpPr>
+          <p:cNvPr id="395" name="Rectangle 138">
+            <a:extLst>
+              <a:ext uri="{FF2B5EF4-FFF2-40B4-BE49-F238E27FC236}">
+                <a16:creationId xmlns:a16="http://schemas.microsoft.com/office/drawing/2014/main" id="{93055BAA-1879-CF4E-BD59-849A236C7AED}"/>
+              </a:ext>
+            </a:extLst>
+          </p:cNvPr>
+          <p:cNvSpPr>
+            <a:spLocks noChangeArrowheads="1"/>
+          </p:cNvSpPr>
+          <p:nvPr/>
+        </p:nvSpPr>
+        <p:spPr bwMode="auto">
+          <a:xfrm>
+            <a:off x="5331256" y="3560787"/>
+            <a:ext cx="1280830" cy="209942"/>
+          </a:xfrm>
+          <a:prstGeom prst="rect">
+            <a:avLst/>
+          </a:prstGeom>
+          <a:solidFill>
+            <a:schemeClr val="accent6">
+              <a:lumMod val="20000"/>
+              <a:lumOff val="80000"/>
+            </a:schemeClr>
+          </a:solidFill>
+          <a:ln w="17780">
+            <a:solidFill>
+              <a:schemeClr val="tx1"/>
+            </a:solidFill>
+            <a:miter lim="800000"/>
+            <a:headEnd/>
+            <a:tailEnd/>
+          </a:ln>
+        </p:spPr>
+        <p:txBody>
+          <a:bodyPr lIns="36000" tIns="36000" rIns="36000" bIns="36000" anchor="ctr"/>
+          <a:lstStyle/>
+          <a:p>
+            <a:pPr algn="ctr">
+              <a:buClrTx/>
+              <a:buSzTx/>
+              <a:buFontTx/>
+              <a:buNone/>
+            </a:pPr>
+            <a:r>
+              <a:rPr lang="en-US" sz="1000" dirty="0" err="1"/>
+              <a:t>Gardenlet</a:t>
+            </a:r>
+            <a:endParaRPr lang="en-US" sz="1000" dirty="0"/>
+          </a:p>
+        </p:txBody>
+      </p:sp>
+      <p:sp>
+        <p:nvSpPr>
+          <p:cNvPr id="396" name="Rectangle 138">
+            <a:extLst>
+              <a:ext uri="{FF2B5EF4-FFF2-40B4-BE49-F238E27FC236}">
+                <a16:creationId xmlns:a16="http://schemas.microsoft.com/office/drawing/2014/main" id="{F424AFF0-E5BF-234C-87DC-49D050A1EEFF}"/>
+              </a:ext>
+            </a:extLst>
+          </p:cNvPr>
+          <p:cNvSpPr>
+            <a:spLocks noChangeArrowheads="1"/>
+          </p:cNvSpPr>
+          <p:nvPr/>
+        </p:nvSpPr>
+        <p:spPr bwMode="auto">
+          <a:xfrm>
+            <a:off x="6603489" y="3562801"/>
+            <a:ext cx="210606" cy="204339"/>
+          </a:xfrm>
+          <a:prstGeom prst="rect">
+            <a:avLst/>
+          </a:prstGeom>
+          <a:solidFill>
+            <a:schemeClr val="accent6">
+              <a:lumMod val="20000"/>
+              <a:lumOff val="80000"/>
+            </a:schemeClr>
+          </a:solidFill>
+          <a:ln w="17780">
+            <a:solidFill>
+              <a:schemeClr val="tx1"/>
+            </a:solidFill>
+            <a:miter lim="800000"/>
+            <a:headEnd/>
+            <a:tailEnd/>
+          </a:ln>
+        </p:spPr>
+        <p:txBody>
+          <a:bodyPr lIns="36000" tIns="36000" rIns="36000" bIns="36000" anchor="ctr"/>
+          <a:lstStyle/>
+          <a:p>
+            <a:pPr algn="ctr">
+              <a:buClrTx/>
+              <a:buSzTx/>
+              <a:buFontTx/>
+              <a:buNone/>
+            </a:pPr>
+            <a:r>
+              <a:rPr lang="en-US" sz="1000" dirty="0"/>
+              <a:t>D</a:t>
+            </a:r>
+          </a:p>
+        </p:txBody>
+      </p:sp>
+      <p:sp>
+        <p:nvSpPr>
+          <p:cNvPr id="481" name="Text Box 139">
+            <a:extLst>
+              <a:ext uri="{FF2B5EF4-FFF2-40B4-BE49-F238E27FC236}">
+                <a16:creationId xmlns:a16="http://schemas.microsoft.com/office/drawing/2014/main" id="{D90FA81A-2A1A-254D-9B53-7DA31B293E7A}"/>
+              </a:ext>
+            </a:extLst>
+          </p:cNvPr>
+          <p:cNvSpPr txBox="1">
+            <a:spLocks noChangeArrowheads="1"/>
+          </p:cNvSpPr>
+          <p:nvPr/>
+        </p:nvSpPr>
+        <p:spPr bwMode="auto">
+          <a:xfrm>
+            <a:off x="5248524" y="3650903"/>
+            <a:ext cx="424463" cy="371513"/>
+          </a:xfrm>
+          <a:prstGeom prst="rect">
+            <a:avLst/>
+          </a:prstGeom>
+          <a:noFill/>
+          <a:ln w="12700">
+            <a:noFill/>
+            <a:miter lim="800000"/>
+            <a:headEnd/>
+            <a:tailEnd/>
+          </a:ln>
+        </p:spPr>
+        <p:txBody>
+          <a:bodyPr wrap="square" lIns="90000" tIns="46800" rIns="90000" bIns="46800">
+            <a:spAutoFit/>
+          </a:bodyPr>
+          <a:lstStyle/>
+          <a:p>
+            <a:pPr>
+              <a:spcBef>
+                <a:spcPct val="50000"/>
+              </a:spcBef>
+              <a:buClrTx/>
+              <a:buSzTx/>
+              <a:buFontTx/>
+              <a:buNone/>
+            </a:pPr>
+            <a:r>
+              <a:rPr lang="en-US" sz="1800" b="1" dirty="0">
+                <a:latin typeface="Times New Roman" pitchFamily="18" charset="0"/>
+              </a:rPr>
+              <a:t>...</a:t>
+            </a:r>
+          </a:p>
+        </p:txBody>
+      </p:sp>
+      <p:cxnSp>
+        <p:nvCxnSpPr>
+          <p:cNvPr id="497" name="Elbow Connector 496">
+            <a:extLst>
+              <a:ext uri="{FF2B5EF4-FFF2-40B4-BE49-F238E27FC236}">
+                <a16:creationId xmlns:a16="http://schemas.microsoft.com/office/drawing/2014/main" id="{C15F3D69-BFB6-F146-BD1E-64E82565E4D5}"/>
+              </a:ext>
+            </a:extLst>
+          </p:cNvPr>
+          <p:cNvCxnSpPr>
+            <a:cxnSpLocks/>
+          </p:cNvCxnSpPr>
+          <p:nvPr/>
+        </p:nvCxnSpPr>
+        <p:spPr>
+          <a:xfrm rot="5400000">
+            <a:off x="6709957" y="3249297"/>
+            <a:ext cx="495955" cy="268732"/>
+          </a:xfrm>
+          <a:prstGeom prst="bentConnector3">
+            <a:avLst>
+              <a:gd name="adj1" fmla="val 98804"/>
+            </a:avLst>
+          </a:prstGeom>
+          <a:ln w="12700">
+            <a:solidFill>
+              <a:schemeClr val="tx1"/>
+            </a:solidFill>
+          </a:ln>
+        </p:spPr>
+        <p:style>
+          <a:lnRef idx="1">
+            <a:schemeClr val="accent1"/>
+          </a:lnRef>
+          <a:fillRef idx="0">
+            <a:schemeClr val="accent1"/>
+          </a:fillRef>
+          <a:effectRef idx="0">
+            <a:schemeClr val="accent1"/>
+          </a:effectRef>
+          <a:fontRef idx="minor">
+            <a:schemeClr val="tx1"/>
+          </a:fontRef>
+        </p:style>
+      </p:cxnSp>
+      <p:cxnSp>
+        <p:nvCxnSpPr>
+          <p:cNvPr id="499" name="Elbow Connector 498">
+            <a:extLst>
+              <a:ext uri="{FF2B5EF4-FFF2-40B4-BE49-F238E27FC236}">
+                <a16:creationId xmlns:a16="http://schemas.microsoft.com/office/drawing/2014/main" id="{D36A568A-CC38-4F40-AD85-E5C02742EBDB}"/>
+              </a:ext>
+            </a:extLst>
+          </p:cNvPr>
+          <p:cNvCxnSpPr>
+            <a:cxnSpLocks/>
+          </p:cNvCxnSpPr>
+          <p:nvPr/>
+        </p:nvCxnSpPr>
+        <p:spPr>
+          <a:xfrm rot="10800000">
+            <a:off x="5990925" y="3010255"/>
+            <a:ext cx="1101677" cy="125432"/>
+          </a:xfrm>
+          <a:prstGeom prst="bentConnector3">
+            <a:avLst>
+              <a:gd name="adj1" fmla="val 101876"/>
+            </a:avLst>
+          </a:prstGeom>
+          <a:ln w="12700">
+            <a:solidFill>
+              <a:schemeClr val="tx1"/>
+            </a:solidFill>
+          </a:ln>
+        </p:spPr>
+        <p:style>
+          <a:lnRef idx="1">
+            <a:schemeClr val="accent1"/>
+          </a:lnRef>
+          <a:fillRef idx="0">
+            <a:schemeClr val="accent1"/>
+          </a:fillRef>
+          <a:effectRef idx="0">
+            <a:schemeClr val="accent1"/>
+          </a:effectRef>
+          <a:fontRef idx="minor">
+            <a:schemeClr val="tx1"/>
+          </a:fontRef>
+        </p:style>
+      </p:cxnSp>
+      <p:grpSp>
+        <p:nvGrpSpPr>
+          <p:cNvPr id="500" name="Group 499">
+            <a:extLst>
+              <a:ext uri="{FF2B5EF4-FFF2-40B4-BE49-F238E27FC236}">
+                <a16:creationId xmlns:a16="http://schemas.microsoft.com/office/drawing/2014/main" id="{7D16D29E-95D8-9944-BE87-E533C5255AE9}"/>
+              </a:ext>
+            </a:extLst>
+          </p:cNvPr>
+          <p:cNvGrpSpPr/>
+          <p:nvPr/>
+        </p:nvGrpSpPr>
+        <p:grpSpPr>
+          <a:xfrm>
+            <a:off x="6984234" y="3262206"/>
+            <a:ext cx="151694" cy="171029"/>
+            <a:chOff x="4873292" y="581648"/>
+            <a:chExt cx="151694" cy="171029"/>
+          </a:xfrm>
+        </p:grpSpPr>
+        <p:sp>
+          <p:nvSpPr>
+            <p:cNvPr id="524" name="Line 104">
+              <a:extLst>
+                <a:ext uri="{FF2B5EF4-FFF2-40B4-BE49-F238E27FC236}">
+                  <a16:creationId xmlns:a16="http://schemas.microsoft.com/office/drawing/2014/main" id="{9B1142E6-5A6F-5E40-8B9C-545360BAF394}"/>
+                </a:ext>
+              </a:extLst>
+            </p:cNvPr>
+            <p:cNvSpPr>
+              <a:spLocks noChangeShapeType="1"/>
+            </p:cNvSpPr>
+            <p:nvPr/>
+          </p:nvSpPr>
+          <p:spPr bwMode="auto">
+            <a:xfrm flipH="1" flipV="1">
+              <a:off x="4900280" y="581648"/>
+              <a:ext cx="0" cy="40770"/>
+            </a:xfrm>
+            <a:prstGeom prst="line">
+              <a:avLst/>
+            </a:prstGeom>
+            <a:noFill/>
+            <a:ln w="8890">
+              <a:solidFill>
+                <a:schemeClr val="tx1"/>
+              </a:solidFill>
+              <a:round/>
+              <a:headEnd/>
+              <a:tailEnd type="stealth" w="med" len="med"/>
+            </a:ln>
+          </p:spPr>
+          <p:txBody>
+            <a:bodyPr lIns="90000" tIns="46800" rIns="90000" bIns="46800" anchor="ctr"/>
+            <a:lstStyle/>
+            <a:p>
+              <a:endParaRPr lang="en-US"/>
+            </a:p>
+          </p:txBody>
+        </p:sp>
+        <p:sp>
+          <p:nvSpPr>
+            <p:cNvPr id="544" name="Text Box 105">
+              <a:extLst>
+                <a:ext uri="{FF2B5EF4-FFF2-40B4-BE49-F238E27FC236}">
+                  <a16:creationId xmlns:a16="http://schemas.microsoft.com/office/drawing/2014/main" id="{0871A16D-53C9-D447-A33D-CDA28155DA5B}"/>
+                </a:ext>
+              </a:extLst>
+            </p:cNvPr>
+            <p:cNvSpPr txBox="1">
+              <a:spLocks noChangeArrowheads="1"/>
+            </p:cNvSpPr>
+            <p:nvPr/>
+          </p:nvSpPr>
+          <p:spPr bwMode="auto">
+            <a:xfrm>
+              <a:off x="4873292" y="630439"/>
+              <a:ext cx="85725" cy="122238"/>
+            </a:xfrm>
+            <a:prstGeom prst="rect">
+              <a:avLst/>
+            </a:prstGeom>
+            <a:noFill/>
+            <a:ln w="12700">
+              <a:noFill/>
+              <a:miter lim="800000"/>
+              <a:headEnd/>
+              <a:tailEnd/>
+            </a:ln>
+          </p:spPr>
+          <p:txBody>
+            <a:bodyPr lIns="0" tIns="0" rIns="0" bIns="0">
+              <a:spAutoFit/>
+            </a:bodyPr>
+            <a:lstStyle/>
+            <a:p>
+              <a:pPr algn="l">
+                <a:buClrTx/>
+                <a:buSzTx/>
+                <a:buFontTx/>
+                <a:buNone/>
+              </a:pPr>
+              <a:r>
+                <a:rPr lang="en-US" sz="800" b="1"/>
+                <a:t>R</a:t>
+              </a:r>
+            </a:p>
+          </p:txBody>
+        </p:sp>
+        <p:sp>
+          <p:nvSpPr>
+            <p:cNvPr id="545" name="AutoShape 76">
+              <a:extLst>
+                <a:ext uri="{FF2B5EF4-FFF2-40B4-BE49-F238E27FC236}">
+                  <a16:creationId xmlns:a16="http://schemas.microsoft.com/office/drawing/2014/main" id="{ED3F4C64-1134-974B-A487-577437D15684}"/>
+                </a:ext>
+              </a:extLst>
+            </p:cNvPr>
+            <p:cNvSpPr>
+              <a:spLocks noChangeArrowheads="1"/>
+            </p:cNvSpPr>
+            <p:nvPr/>
+          </p:nvSpPr>
+          <p:spPr bwMode="auto">
+            <a:xfrm rot="5400000">
+              <a:off x="4952986" y="623443"/>
+              <a:ext cx="72000" cy="72000"/>
+            </a:xfrm>
+            <a:prstGeom prst="flowChartConnector">
+              <a:avLst/>
+            </a:prstGeom>
+            <a:solidFill>
+              <a:schemeClr val="bg1"/>
+            </a:solidFill>
+            <a:ln w="17780">
+              <a:solidFill>
+                <a:schemeClr val="tx1"/>
+              </a:solidFill>
+              <a:round/>
+              <a:headEnd/>
+              <a:tailEnd/>
+            </a:ln>
+          </p:spPr>
+          <p:txBody>
+            <a:bodyPr wrap="none" lIns="90000" tIns="46800" rIns="90000" bIns="46800" anchor="ctr"/>
+            <a:lstStyle/>
+            <a:p>
+              <a:endParaRPr lang="en-US"/>
+            </a:p>
+          </p:txBody>
+        </p:sp>
+      </p:grpSp>
+      <p:cxnSp>
+        <p:nvCxnSpPr>
+          <p:cNvPr id="546" name="Elbow Connector 545">
+            <a:extLst>
+              <a:ext uri="{FF2B5EF4-FFF2-40B4-BE49-F238E27FC236}">
+                <a16:creationId xmlns:a16="http://schemas.microsoft.com/office/drawing/2014/main" id="{E8200891-CBC0-5947-9D86-D2E52BEAD031}"/>
+              </a:ext>
+            </a:extLst>
+          </p:cNvPr>
+          <p:cNvCxnSpPr>
+            <a:cxnSpLocks/>
+          </p:cNvCxnSpPr>
+          <p:nvPr/>
+        </p:nvCxnSpPr>
+        <p:spPr>
+          <a:xfrm rot="5400000">
+            <a:off x="6647454" y="2683924"/>
+            <a:ext cx="1207510" cy="874744"/>
+          </a:xfrm>
+          <a:prstGeom prst="bentConnector3">
+            <a:avLst>
+              <a:gd name="adj1" fmla="val 96772"/>
+            </a:avLst>
+          </a:prstGeom>
+          <a:ln w="12700">
+            <a:solidFill>
+              <a:schemeClr val="tx1"/>
+            </a:solidFill>
+          </a:ln>
+        </p:spPr>
+        <p:style>
+          <a:lnRef idx="1">
+            <a:schemeClr val="accent1"/>
+          </a:lnRef>
+          <a:fillRef idx="0">
+            <a:schemeClr val="accent1"/>
+          </a:fillRef>
+          <a:effectRef idx="0">
+            <a:schemeClr val="accent1"/>
+          </a:effectRef>
+          <a:fontRef idx="minor">
+            <a:schemeClr val="tx1"/>
+          </a:fontRef>
+        </p:style>
+      </p:cxnSp>
+      <p:cxnSp>
+        <p:nvCxnSpPr>
+          <p:cNvPr id="552" name="Elbow Connector 551">
+            <a:extLst>
+              <a:ext uri="{FF2B5EF4-FFF2-40B4-BE49-F238E27FC236}">
+                <a16:creationId xmlns:a16="http://schemas.microsoft.com/office/drawing/2014/main" id="{C198322A-4BE8-D544-A5DA-05889D7FF3D2}"/>
+              </a:ext>
+            </a:extLst>
+          </p:cNvPr>
+          <p:cNvCxnSpPr>
+            <a:cxnSpLocks/>
+          </p:cNvCxnSpPr>
+          <p:nvPr/>
+        </p:nvCxnSpPr>
+        <p:spPr>
+          <a:xfrm rot="10800000" flipV="1">
+            <a:off x="2387644" y="1824515"/>
+            <a:ext cx="3988128" cy="376036"/>
+          </a:xfrm>
+          <a:prstGeom prst="bentConnector3">
+            <a:avLst>
+              <a:gd name="adj1" fmla="val 100155"/>
+            </a:avLst>
+          </a:prstGeom>
+          <a:ln w="12700">
+            <a:solidFill>
+              <a:schemeClr val="tx1"/>
+            </a:solidFill>
+          </a:ln>
+        </p:spPr>
+        <p:style>
+          <a:lnRef idx="1">
+            <a:schemeClr val="accent1"/>
+          </a:lnRef>
+          <a:fillRef idx="0">
+            <a:schemeClr val="accent1"/>
+          </a:fillRef>
+          <a:effectRef idx="0">
+            <a:schemeClr val="accent1"/>
+          </a:effectRef>
+          <a:fontRef idx="minor">
+            <a:schemeClr val="tx1"/>
+          </a:fontRef>
+        </p:style>
+      </p:cxnSp>
+      <p:cxnSp>
+        <p:nvCxnSpPr>
+          <p:cNvPr id="572" name="Elbow Connector 571">
+            <a:extLst>
+              <a:ext uri="{FF2B5EF4-FFF2-40B4-BE49-F238E27FC236}">
+                <a16:creationId xmlns:a16="http://schemas.microsoft.com/office/drawing/2014/main" id="{AF7D955A-0896-1C40-A858-A7515CC30835}"/>
+              </a:ext>
+            </a:extLst>
+          </p:cNvPr>
+          <p:cNvCxnSpPr>
+            <a:cxnSpLocks/>
+          </p:cNvCxnSpPr>
+          <p:nvPr/>
+        </p:nvCxnSpPr>
+        <p:spPr>
+          <a:xfrm>
+            <a:off x="6375600" y="1825200"/>
+            <a:ext cx="1314408" cy="698400"/>
+          </a:xfrm>
+          <a:prstGeom prst="bentConnector3">
+            <a:avLst>
+              <a:gd name="adj1" fmla="val 1206"/>
+            </a:avLst>
+          </a:prstGeom>
+          <a:ln w="12700">
+            <a:solidFill>
+              <a:schemeClr val="tx1"/>
+            </a:solidFill>
+          </a:ln>
+        </p:spPr>
+        <p:style>
+          <a:lnRef idx="1">
+            <a:schemeClr val="accent1"/>
+          </a:lnRef>
+          <a:fillRef idx="0">
+            <a:schemeClr val="accent1"/>
+          </a:fillRef>
+          <a:effectRef idx="0">
+            <a:schemeClr val="accent1"/>
+          </a:effectRef>
+          <a:fontRef idx="minor">
+            <a:schemeClr val="tx1"/>
+          </a:fontRef>
+        </p:style>
+      </p:cxnSp>
+      <p:grpSp>
+        <p:nvGrpSpPr>
+          <p:cNvPr id="599" name="Group 598">
+            <a:extLst>
+              <a:ext uri="{FF2B5EF4-FFF2-40B4-BE49-F238E27FC236}">
+                <a16:creationId xmlns:a16="http://schemas.microsoft.com/office/drawing/2014/main" id="{8418BCAD-0E62-704B-896C-725E7391F449}"/>
+              </a:ext>
+            </a:extLst>
+          </p:cNvPr>
+          <p:cNvGrpSpPr/>
+          <p:nvPr/>
+        </p:nvGrpSpPr>
+        <p:grpSpPr>
+          <a:xfrm>
+            <a:off x="4896816" y="1666192"/>
+            <a:ext cx="161055" cy="189811"/>
+            <a:chOff x="6020928" y="505632"/>
+            <a:chExt cx="161055" cy="189811"/>
+          </a:xfrm>
+        </p:grpSpPr>
+        <p:sp>
+          <p:nvSpPr>
+            <p:cNvPr id="600" name="Text Box 105">
+              <a:extLst>
+                <a:ext uri="{FF2B5EF4-FFF2-40B4-BE49-F238E27FC236}">
+                  <a16:creationId xmlns:a16="http://schemas.microsoft.com/office/drawing/2014/main" id="{06DEF28B-5D99-6E4C-B73A-83912EF07EDA}"/>
+                </a:ext>
+              </a:extLst>
+            </p:cNvPr>
+            <p:cNvSpPr txBox="1">
+              <a:spLocks noChangeArrowheads="1"/>
+            </p:cNvSpPr>
+            <p:nvPr/>
+          </p:nvSpPr>
+          <p:spPr bwMode="auto">
+            <a:xfrm>
+              <a:off x="6096258" y="505632"/>
+              <a:ext cx="85725" cy="122238"/>
+            </a:xfrm>
+            <a:prstGeom prst="rect">
+              <a:avLst/>
+            </a:prstGeom>
+            <a:noFill/>
+            <a:ln w="12700">
+              <a:noFill/>
+              <a:miter lim="800000"/>
+              <a:headEnd/>
+              <a:tailEnd/>
+            </a:ln>
+          </p:spPr>
+          <p:txBody>
+            <a:bodyPr lIns="0" tIns="0" rIns="0" bIns="0">
+              <a:spAutoFit/>
+            </a:bodyPr>
+            <a:lstStyle/>
+            <a:p>
+              <a:pPr algn="l">
+                <a:buClrTx/>
+                <a:buSzTx/>
+                <a:buFontTx/>
+                <a:buNone/>
+              </a:pPr>
+              <a:r>
+                <a:rPr lang="en-US" sz="800" b="1"/>
+                <a:t>R</a:t>
+              </a:r>
+            </a:p>
+          </p:txBody>
+        </p:sp>
+        <p:sp>
+          <p:nvSpPr>
+            <p:cNvPr id="601" name="AutoShape 76">
+              <a:extLst>
+                <a:ext uri="{FF2B5EF4-FFF2-40B4-BE49-F238E27FC236}">
+                  <a16:creationId xmlns:a16="http://schemas.microsoft.com/office/drawing/2014/main" id="{CE807DAB-2CC9-CE4C-9BC2-5A7E3D973687}"/>
+                </a:ext>
+              </a:extLst>
+            </p:cNvPr>
+            <p:cNvSpPr>
+              <a:spLocks noChangeArrowheads="1"/>
+            </p:cNvSpPr>
+            <p:nvPr/>
+          </p:nvSpPr>
+          <p:spPr bwMode="auto">
+            <a:xfrm rot="5400000">
+              <a:off x="6061593" y="623443"/>
+              <a:ext cx="72000" cy="72000"/>
+            </a:xfrm>
+            <a:prstGeom prst="flowChartConnector">
+              <a:avLst/>
+            </a:prstGeom>
+            <a:solidFill>
+              <a:schemeClr val="bg1"/>
+            </a:solidFill>
+            <a:ln w="17780">
+              <a:solidFill>
+                <a:schemeClr val="tx1"/>
+              </a:solidFill>
+              <a:round/>
+              <a:headEnd/>
+              <a:tailEnd/>
+            </a:ln>
+          </p:spPr>
+          <p:txBody>
+            <a:bodyPr wrap="none" lIns="90000" tIns="46800" rIns="90000" bIns="46800" anchor="ctr"/>
+            <a:lstStyle/>
+            <a:p>
+              <a:endParaRPr lang="en-US"/>
+            </a:p>
+          </p:txBody>
+        </p:sp>
+        <p:sp>
+          <p:nvSpPr>
+            <p:cNvPr id="602" name="Line 104">
+              <a:extLst>
+                <a:ext uri="{FF2B5EF4-FFF2-40B4-BE49-F238E27FC236}">
+                  <a16:creationId xmlns:a16="http://schemas.microsoft.com/office/drawing/2014/main" id="{DF76BA47-DEB8-9845-B321-134532C72AC4}"/>
+                </a:ext>
+              </a:extLst>
+            </p:cNvPr>
+            <p:cNvSpPr>
+              <a:spLocks noChangeShapeType="1"/>
+            </p:cNvSpPr>
+            <p:nvPr/>
+          </p:nvSpPr>
+          <p:spPr bwMode="auto">
+            <a:xfrm flipH="1" flipV="1">
+              <a:off x="6020928" y="568445"/>
+              <a:ext cx="44226" cy="0"/>
+            </a:xfrm>
+            <a:prstGeom prst="line">
+              <a:avLst/>
+            </a:prstGeom>
+            <a:noFill/>
+            <a:ln w="8890">
+              <a:solidFill>
+                <a:schemeClr val="tx1"/>
+              </a:solidFill>
+              <a:round/>
+              <a:headEnd/>
+              <a:tailEnd type="stealth" w="med" len="med"/>
+            </a:ln>
+          </p:spPr>
+          <p:txBody>
+            <a:bodyPr lIns="90000" tIns="46800" rIns="90000" bIns="46800" anchor="ctr"/>
+            <a:lstStyle/>
+            <a:p>
+              <a:endParaRPr lang="en-US"/>
+            </a:p>
+          </p:txBody>
+        </p:sp>
+      </p:grpSp>
+      <p:grpSp>
+        <p:nvGrpSpPr>
+          <p:cNvPr id="347" name="Group 346">
+            <a:extLst>
+              <a:ext uri="{FF2B5EF4-FFF2-40B4-BE49-F238E27FC236}">
+                <a16:creationId xmlns:a16="http://schemas.microsoft.com/office/drawing/2014/main" id="{A5074573-C36F-DC41-8830-88DF1E613D90}"/>
+              </a:ext>
+            </a:extLst>
+          </p:cNvPr>
+          <p:cNvGrpSpPr/>
+          <p:nvPr/>
+        </p:nvGrpSpPr>
+        <p:grpSpPr>
+          <a:xfrm>
+            <a:off x="7748459" y="5618295"/>
+            <a:ext cx="180269" cy="171451"/>
+            <a:chOff x="5145186" y="193240"/>
+            <a:chExt cx="180269" cy="171451"/>
+          </a:xfrm>
+        </p:grpSpPr>
+        <p:sp>
+          <p:nvSpPr>
+            <p:cNvPr id="367" name="Line 104">
+              <a:extLst>
+                <a:ext uri="{FF2B5EF4-FFF2-40B4-BE49-F238E27FC236}">
+                  <a16:creationId xmlns:a16="http://schemas.microsoft.com/office/drawing/2014/main" id="{A4A8681C-0C23-5148-BBFA-D255B646143D}"/>
+                </a:ext>
+              </a:extLst>
+            </p:cNvPr>
+            <p:cNvSpPr>
+              <a:spLocks noChangeShapeType="1"/>
+            </p:cNvSpPr>
+            <p:nvPr/>
+          </p:nvSpPr>
+          <p:spPr bwMode="auto">
+            <a:xfrm>
+              <a:off x="5266717" y="329947"/>
+              <a:ext cx="0" cy="34744"/>
+            </a:xfrm>
+            <a:prstGeom prst="line">
+              <a:avLst/>
+            </a:prstGeom>
+            <a:noFill/>
+            <a:ln w="8890">
+              <a:solidFill>
+                <a:schemeClr val="tx1"/>
+              </a:solidFill>
+              <a:round/>
+              <a:headEnd/>
+              <a:tailEnd type="stealth" w="med" len="med"/>
+            </a:ln>
+          </p:spPr>
+          <p:txBody>
+            <a:bodyPr lIns="90000" tIns="46800" rIns="90000" bIns="46800" anchor="ctr"/>
+            <a:lstStyle/>
+            <a:p>
+              <a:endParaRPr lang="en-US"/>
+            </a:p>
+          </p:txBody>
+        </p:sp>
+        <p:sp>
+          <p:nvSpPr>
+            <p:cNvPr id="386" name="Text Box 105">
+              <a:extLst>
+                <a:ext uri="{FF2B5EF4-FFF2-40B4-BE49-F238E27FC236}">
+                  <a16:creationId xmlns:a16="http://schemas.microsoft.com/office/drawing/2014/main" id="{1013438D-47E5-D846-AEB7-4D980EB670A1}"/>
+                </a:ext>
+              </a:extLst>
+            </p:cNvPr>
+            <p:cNvSpPr txBox="1">
+              <a:spLocks noChangeArrowheads="1"/>
+            </p:cNvSpPr>
+            <p:nvPr/>
+          </p:nvSpPr>
+          <p:spPr bwMode="auto">
+            <a:xfrm flipH="1">
+              <a:off x="5239730" y="193240"/>
+              <a:ext cx="85725" cy="122238"/>
+            </a:xfrm>
+            <a:prstGeom prst="rect">
+              <a:avLst/>
+            </a:prstGeom>
+            <a:noFill/>
+            <a:ln w="12700">
+              <a:noFill/>
+              <a:miter lim="800000"/>
+              <a:headEnd/>
+              <a:tailEnd/>
+            </a:ln>
+          </p:spPr>
+          <p:txBody>
+            <a:bodyPr lIns="0" tIns="0" rIns="0" bIns="0">
+              <a:spAutoFit/>
+            </a:bodyPr>
+            <a:lstStyle/>
+            <a:p>
+              <a:pPr algn="l">
+                <a:buClrTx/>
+                <a:buSzTx/>
+                <a:buFontTx/>
+                <a:buNone/>
+              </a:pPr>
+              <a:r>
+                <a:rPr lang="en-US" sz="800" b="1"/>
+                <a:t>R</a:t>
+              </a:r>
+            </a:p>
+          </p:txBody>
+        </p:sp>
+        <p:sp>
+          <p:nvSpPr>
+            <p:cNvPr id="387" name="AutoShape 76">
+              <a:extLst>
+                <a:ext uri="{FF2B5EF4-FFF2-40B4-BE49-F238E27FC236}">
+                  <a16:creationId xmlns:a16="http://schemas.microsoft.com/office/drawing/2014/main" id="{BB462409-E174-E640-83B9-5E1357CED3BE}"/>
+                </a:ext>
+              </a:extLst>
+            </p:cNvPr>
+            <p:cNvSpPr>
+              <a:spLocks noChangeArrowheads="1"/>
+            </p:cNvSpPr>
+            <p:nvPr/>
+          </p:nvSpPr>
+          <p:spPr bwMode="auto">
+            <a:xfrm rot="16200000" flipH="1">
+              <a:off x="5145186" y="257947"/>
+              <a:ext cx="72000" cy="72000"/>
+            </a:xfrm>
+            <a:prstGeom prst="flowChartConnector">
+              <a:avLst/>
+            </a:prstGeom>
+            <a:solidFill>
+              <a:schemeClr val="bg1"/>
+            </a:solidFill>
+            <a:ln w="17780">
+              <a:solidFill>
+                <a:schemeClr val="tx1"/>
+              </a:solidFill>
+              <a:round/>
+              <a:headEnd/>
+              <a:tailEnd/>
+            </a:ln>
+          </p:spPr>
+          <p:txBody>
+            <a:bodyPr wrap="none" lIns="90000" tIns="46800" rIns="90000" bIns="46800" anchor="ctr"/>
+            <a:lstStyle/>
+            <a:p>
+              <a:endParaRPr lang="en-US"/>
+            </a:p>
+          </p:txBody>
+        </p:sp>
+      </p:grpSp>
     </p:spTree>
     <p:extLst>
       <p:ext uri="{BB962C8B-B14F-4D97-AF65-F5344CB8AC3E}">

</xml_diff>

<commit_message>
Updated architecture diagram to include reverse vpn tunnel and sni infrastructure.
Added vpn server/envoy to the control plane in the seed and removed the vpn load balancer in the shoot. Furthermore, removed the vpn side-car in the monitoring of the seed. Renamed the shoot api server load balancer to istio ingress load balancer as it is now used for the sni infrastructure.
</commit_message>
<xml_diff>
--- a/doc/architecture/GardenerArchitecture.pptx
+++ b/doc/architecture/GardenerArchitecture.pptx
@@ -197,7 +197,7 @@
           <a:p>
             <a:fld id="{D74E709A-69AA-A94C-AD8F-6C318DC30780}" type="datetimeFigureOut">
               <a:rPr lang="en-US" smtClean="0"/>
-              <a:t>1/16/20</a:t>
+              <a:t>5/28/21</a:t>
             </a:fld>
             <a:endParaRPr lang="en-US"/>
           </a:p>
@@ -593,7 +593,7 @@
           <a:p>
             <a:fld id="{5EFE2BF0-18F9-D245-A6F0-FBB2AFC12A9B}" type="datetimeFigureOut">
               <a:rPr lang="en-US" smtClean="0"/>
-              <a:t>1/16/20</a:t>
+              <a:t>5/28/21</a:t>
             </a:fld>
             <a:endParaRPr lang="en-US"/>
           </a:p>
@@ -761,7 +761,7 @@
           <a:p>
             <a:fld id="{5EFE2BF0-18F9-D245-A6F0-FBB2AFC12A9B}" type="datetimeFigureOut">
               <a:rPr lang="en-US" smtClean="0"/>
-              <a:t>1/16/20</a:t>
+              <a:t>5/28/21</a:t>
             </a:fld>
             <a:endParaRPr lang="en-US"/>
           </a:p>
@@ -939,7 +939,7 @@
           <a:p>
             <a:fld id="{5EFE2BF0-18F9-D245-A6F0-FBB2AFC12A9B}" type="datetimeFigureOut">
               <a:rPr lang="en-US" smtClean="0"/>
-              <a:t>1/16/20</a:t>
+              <a:t>5/28/21</a:t>
             </a:fld>
             <a:endParaRPr lang="en-US"/>
           </a:p>
@@ -1107,7 +1107,7 @@
           <a:p>
             <a:fld id="{5EFE2BF0-18F9-D245-A6F0-FBB2AFC12A9B}" type="datetimeFigureOut">
               <a:rPr lang="en-US" smtClean="0"/>
-              <a:t>1/16/20</a:t>
+              <a:t>5/28/21</a:t>
             </a:fld>
             <a:endParaRPr lang="en-US"/>
           </a:p>
@@ -1352,7 +1352,7 @@
           <a:p>
             <a:fld id="{5EFE2BF0-18F9-D245-A6F0-FBB2AFC12A9B}" type="datetimeFigureOut">
               <a:rPr lang="en-US" smtClean="0"/>
-              <a:t>1/16/20</a:t>
+              <a:t>5/28/21</a:t>
             </a:fld>
             <a:endParaRPr lang="en-US"/>
           </a:p>
@@ -1581,7 +1581,7 @@
           <a:p>
             <a:fld id="{5EFE2BF0-18F9-D245-A6F0-FBB2AFC12A9B}" type="datetimeFigureOut">
               <a:rPr lang="en-US" smtClean="0"/>
-              <a:t>1/16/20</a:t>
+              <a:t>5/28/21</a:t>
             </a:fld>
             <a:endParaRPr lang="en-US"/>
           </a:p>
@@ -1945,7 +1945,7 @@
           <a:p>
             <a:fld id="{5EFE2BF0-18F9-D245-A6F0-FBB2AFC12A9B}" type="datetimeFigureOut">
               <a:rPr lang="en-US" smtClean="0"/>
-              <a:t>1/16/20</a:t>
+              <a:t>5/28/21</a:t>
             </a:fld>
             <a:endParaRPr lang="en-US"/>
           </a:p>
@@ -2062,7 +2062,7 @@
           <a:p>
             <a:fld id="{5EFE2BF0-18F9-D245-A6F0-FBB2AFC12A9B}" type="datetimeFigureOut">
               <a:rPr lang="en-US" smtClean="0"/>
-              <a:t>1/16/20</a:t>
+              <a:t>5/28/21</a:t>
             </a:fld>
             <a:endParaRPr lang="en-US"/>
           </a:p>
@@ -2157,7 +2157,7 @@
           <a:p>
             <a:fld id="{5EFE2BF0-18F9-D245-A6F0-FBB2AFC12A9B}" type="datetimeFigureOut">
               <a:rPr lang="en-US" smtClean="0"/>
-              <a:t>1/16/20</a:t>
+              <a:t>5/28/21</a:t>
             </a:fld>
             <a:endParaRPr lang="en-US"/>
           </a:p>
@@ -2432,7 +2432,7 @@
           <a:p>
             <a:fld id="{5EFE2BF0-18F9-D245-A6F0-FBB2AFC12A9B}" type="datetimeFigureOut">
               <a:rPr lang="en-US" smtClean="0"/>
-              <a:t>1/16/20</a:t>
+              <a:t>5/28/21</a:t>
             </a:fld>
             <a:endParaRPr lang="en-US"/>
           </a:p>
@@ -2684,7 +2684,7 @@
           <a:p>
             <a:fld id="{5EFE2BF0-18F9-D245-A6F0-FBB2AFC12A9B}" type="datetimeFigureOut">
               <a:rPr lang="en-US" smtClean="0"/>
-              <a:t>1/16/20</a:t>
+              <a:t>5/28/21</a:t>
             </a:fld>
             <a:endParaRPr lang="en-US"/>
           </a:p>
@@ -2895,7 +2895,7 @@
           <a:p>
             <a:fld id="{5EFE2BF0-18F9-D245-A6F0-FBB2AFC12A9B}" type="datetimeFigureOut">
               <a:rPr lang="en-US" smtClean="0"/>
-              <a:t>1/16/20</a:t>
+              <a:t>5/28/21</a:t>
             </a:fld>
             <a:endParaRPr lang="en-US"/>
           </a:p>
@@ -3717,193 +3717,6 @@
           </a:p>
         </p:txBody>
       </p:sp>
-      <p:grpSp>
-        <p:nvGrpSpPr>
-          <p:cNvPr id="447" name="Group 133"/>
-          <p:cNvGrpSpPr>
-            <a:grpSpLocks/>
-          </p:cNvGrpSpPr>
-          <p:nvPr/>
-        </p:nvGrpSpPr>
-        <p:grpSpPr bwMode="auto">
-          <a:xfrm rot="5400000">
-            <a:off x="6905536" y="4091211"/>
-            <a:ext cx="157654" cy="182177"/>
-            <a:chOff x="998" y="3624"/>
-            <a:chExt cx="271" cy="271"/>
-          </a:xfrm>
-        </p:grpSpPr>
-        <p:sp>
-          <p:nvSpPr>
-            <p:cNvPr id="448" name="Freeform 134"/>
-            <p:cNvSpPr>
-              <a:spLocks/>
-            </p:cNvSpPr>
-            <p:nvPr/>
-          </p:nvSpPr>
-          <p:spPr bwMode="auto">
-            <a:xfrm>
-              <a:off x="1043" y="3624"/>
-              <a:ext cx="46" cy="272"/>
-            </a:xfrm>
-            <a:custGeom>
-              <a:avLst/>
-              <a:gdLst>
-                <a:gd name="T0" fmla="*/ 3 w 201"/>
-                <a:gd name="T1" fmla="*/ 0 h 1201"/>
-                <a:gd name="T2" fmla="*/ 3 w 201"/>
-                <a:gd name="T3" fmla="*/ 14 h 1201"/>
-                <a:gd name="T4" fmla="*/ 0 60000 65536"/>
-                <a:gd name="T5" fmla="*/ 0 60000 65536"/>
-                <a:gd name="T6" fmla="*/ 0 w 201"/>
-                <a:gd name="T7" fmla="*/ 0 h 1201"/>
-                <a:gd name="T8" fmla="*/ 201 w 201"/>
-                <a:gd name="T9" fmla="*/ 1201 h 1201"/>
-              </a:gdLst>
-              <a:ahLst/>
-              <a:cxnLst>
-                <a:cxn ang="T4">
-                  <a:pos x="T0" y="T1"/>
-                </a:cxn>
-                <a:cxn ang="T5">
-                  <a:pos x="T2" y="T3"/>
-                </a:cxn>
-              </a:cxnLst>
-              <a:rect l="T6" t="T7" r="T8" b="T9"/>
-              <a:pathLst>
-                <a:path w="201" h="1201">
-                  <a:moveTo>
-                    <a:pt x="200" y="0"/>
-                  </a:moveTo>
-                  <a:cubicBezTo>
-                    <a:pt x="0" y="400"/>
-                    <a:pt x="0" y="800"/>
-                    <a:pt x="200" y="1200"/>
-                  </a:cubicBezTo>
-                </a:path>
-              </a:pathLst>
-            </a:custGeom>
-            <a:noFill/>
-            <a:ln w="7200">
-              <a:solidFill>
-                <a:srgbClr val="000000"/>
-              </a:solidFill>
-              <a:round/>
-              <a:headEnd/>
-              <a:tailEnd type="triangle" w="med" len="med"/>
-            </a:ln>
-          </p:spPr>
-          <p:txBody>
-            <a:bodyPr/>
-            <a:lstStyle/>
-            <a:p>
-              <a:endParaRPr lang="en-US"/>
-            </a:p>
-          </p:txBody>
-        </p:sp>
-        <p:sp>
-          <p:nvSpPr>
-            <p:cNvPr id="449" name="Freeform 135"/>
-            <p:cNvSpPr>
-              <a:spLocks/>
-            </p:cNvSpPr>
-            <p:nvPr/>
-          </p:nvSpPr>
-          <p:spPr bwMode="auto">
-            <a:xfrm>
-              <a:off x="1179" y="3624"/>
-              <a:ext cx="46" cy="272"/>
-            </a:xfrm>
-            <a:custGeom>
-              <a:avLst/>
-              <a:gdLst>
-                <a:gd name="T0" fmla="*/ 0 w 201"/>
-                <a:gd name="T1" fmla="*/ 14 h 1201"/>
-                <a:gd name="T2" fmla="*/ 0 w 201"/>
-                <a:gd name="T3" fmla="*/ 0 h 1201"/>
-                <a:gd name="T4" fmla="*/ 0 60000 65536"/>
-                <a:gd name="T5" fmla="*/ 0 60000 65536"/>
-                <a:gd name="T6" fmla="*/ 0 w 201"/>
-                <a:gd name="T7" fmla="*/ 0 h 1201"/>
-                <a:gd name="T8" fmla="*/ 201 w 201"/>
-                <a:gd name="T9" fmla="*/ 1201 h 1201"/>
-              </a:gdLst>
-              <a:ahLst/>
-              <a:cxnLst>
-                <a:cxn ang="T4">
-                  <a:pos x="T0" y="T1"/>
-                </a:cxn>
-                <a:cxn ang="T5">
-                  <a:pos x="T2" y="T3"/>
-                </a:cxn>
-              </a:cxnLst>
-              <a:rect l="T6" t="T7" r="T8" b="T9"/>
-              <a:pathLst>
-                <a:path w="201" h="1201">
-                  <a:moveTo>
-                    <a:pt x="0" y="1200"/>
-                  </a:moveTo>
-                  <a:cubicBezTo>
-                    <a:pt x="200" y="800"/>
-                    <a:pt x="200" y="400"/>
-                    <a:pt x="0" y="0"/>
-                  </a:cubicBezTo>
-                </a:path>
-              </a:pathLst>
-            </a:custGeom>
-            <a:noFill/>
-            <a:ln w="7200">
-              <a:solidFill>
-                <a:srgbClr val="000000"/>
-              </a:solidFill>
-              <a:round/>
-              <a:headEnd/>
-              <a:tailEnd type="triangle" w="med" len="med"/>
-            </a:ln>
-          </p:spPr>
-          <p:txBody>
-            <a:bodyPr/>
-            <a:lstStyle/>
-            <a:p>
-              <a:endParaRPr lang="en-US"/>
-            </a:p>
-          </p:txBody>
-        </p:sp>
-        <p:sp>
-          <p:nvSpPr>
-            <p:cNvPr id="450" name="AutoShape 136"/>
-            <p:cNvSpPr>
-              <a:spLocks noChangeArrowheads="1"/>
-            </p:cNvSpPr>
-            <p:nvPr/>
-          </p:nvSpPr>
-          <p:spPr bwMode="auto">
-            <a:xfrm>
-              <a:off x="998" y="3624"/>
-              <a:ext cx="272" cy="272"/>
-            </a:xfrm>
-            <a:prstGeom prst="roundRect">
-              <a:avLst>
-                <a:gd name="adj" fmla="val 366"/>
-              </a:avLst>
-            </a:prstGeom>
-            <a:noFill/>
-            <a:ln w="9525">
-              <a:noFill/>
-              <a:round/>
-              <a:headEnd/>
-              <a:tailEnd/>
-            </a:ln>
-          </p:spPr>
-          <p:txBody>
-            <a:bodyPr wrap="none" anchor="ctr"/>
-            <a:lstStyle/>
-            <a:p>
-              <a:endParaRPr lang="en-US"/>
-            </a:p>
-          </p:txBody>
-        </p:sp>
-      </p:grpSp>
       <p:sp>
         <p:nvSpPr>
           <p:cNvPr id="451" name="AutoShape 29"/>
@@ -3915,7 +3728,7 @@
         <p:spPr bwMode="auto">
           <a:xfrm>
             <a:off x="7048037" y="4078115"/>
-            <a:ext cx="718458" cy="190951"/>
+            <a:ext cx="720000" cy="162000"/>
           </a:xfrm>
           <a:prstGeom prst="roundRect">
             <a:avLst>
@@ -3965,7 +3778,7 @@
         <p:spPr>
           <a:xfrm>
             <a:off x="7507041" y="4078115"/>
-            <a:ext cx="0" cy="185552"/>
+            <a:ext cx="0" cy="162000"/>
           </a:xfrm>
           <a:prstGeom prst="line">
             <a:avLst/>
@@ -4069,7 +3882,7 @@
             <a:pPr algn="ctr"/>
             <a:r>
               <a:rPr lang="en-US" sz="1000" dirty="0"/>
-              <a:t>VPN</a:t>
+              <a:t>VPN Client</a:t>
             </a:r>
           </a:p>
         </p:txBody>
@@ -4398,49 +4211,6 @@
             <a:r>
               <a:rPr lang="en-US" sz="1000" dirty="0"/>
               <a:t>D</a:t>
-            </a:r>
-          </a:p>
-        </p:txBody>
-      </p:sp>
-      <p:sp>
-        <p:nvSpPr>
-          <p:cNvPr id="589" name="Rectangle 138"/>
-          <p:cNvSpPr>
-            <a:spLocks noChangeArrowheads="1"/>
-          </p:cNvSpPr>
-          <p:nvPr/>
-        </p:nvSpPr>
-        <p:spPr bwMode="auto">
-          <a:xfrm>
-            <a:off x="8705196" y="2212783"/>
-            <a:ext cx="1512825" cy="206532"/>
-          </a:xfrm>
-          <a:prstGeom prst="rect">
-            <a:avLst/>
-          </a:prstGeom>
-          <a:solidFill>
-            <a:schemeClr val="accent2">
-              <a:lumMod val="40000"/>
-              <a:lumOff val="60000"/>
-            </a:schemeClr>
-          </a:solidFill>
-          <a:ln w="17780">
-            <a:solidFill>
-              <a:schemeClr val="tx1"/>
-            </a:solidFill>
-            <a:miter lim="800000"/>
-            <a:headEnd/>
-            <a:tailEnd/>
-          </a:ln>
-        </p:spPr>
-        <p:txBody>
-          <a:bodyPr lIns="36000" tIns="36000" rIns="36000" bIns="36000" anchor="ctr"/>
-          <a:lstStyle/>
-          <a:p>
-            <a:pPr algn="ctr"/>
-            <a:r>
-              <a:rPr lang="en-US" sz="1200" dirty="0"/>
-              <a:t>Shoot Cluster VPN LB</a:t>
             </a:r>
           </a:p>
         </p:txBody>
@@ -7010,7 +6780,7 @@
           </a:xfrm>
           <a:prstGeom prst="bentConnector3">
             <a:avLst>
-              <a:gd name="adj1" fmla="val 50000"/>
+              <a:gd name="adj1" fmla="val 38845"/>
             </a:avLst>
           </a:prstGeom>
           <a:ln w="12700">
@@ -7079,7 +6849,7 @@
         </p:nvCxnSpPr>
         <p:spPr>
           <a:xfrm rot="16200000" flipH="1">
-            <a:off x="7589220" y="2486990"/>
+            <a:off x="7652720" y="2486990"/>
             <a:ext cx="1715134" cy="410050"/>
           </a:xfrm>
           <a:prstGeom prst="bentConnector2">
@@ -7123,7 +6893,7 @@
           </a:xfrm>
           <a:prstGeom prst="bentConnector4">
             <a:avLst>
-              <a:gd name="adj1" fmla="val -24083"/>
+              <a:gd name="adj1" fmla="val -29219"/>
               <a:gd name="adj2" fmla="val 123085"/>
             </a:avLst>
           </a:prstGeom>
@@ -7158,12 +6928,12 @@
         </p:nvCxnSpPr>
         <p:spPr>
           <a:xfrm rot="10800000" flipV="1">
-            <a:off x="7718284" y="1833883"/>
-            <a:ext cx="523478" cy="373920"/>
+            <a:off x="7718284" y="1834183"/>
+            <a:ext cx="586978" cy="373619"/>
           </a:xfrm>
           <a:prstGeom prst="bentConnector3">
             <a:avLst>
-              <a:gd name="adj1" fmla="val 171911"/>
+              <a:gd name="adj1" fmla="val 146281"/>
             </a:avLst>
           </a:prstGeom>
           <a:ln w="12700">
@@ -7192,17 +6962,18 @@
           <p:cNvPr id="580" name="Elbow Connector 579"/>
           <p:cNvCxnSpPr>
             <a:cxnSpLocks/>
-            <a:stCxn id="589" idx="2"/>
           </p:cNvCxnSpPr>
           <p:nvPr/>
         </p:nvCxnSpPr>
         <p:spPr>
-          <a:xfrm rot="16200000" flipH="1">
-            <a:off x="10029442" y="1851482"/>
-            <a:ext cx="435054" cy="1570720"/>
-          </a:xfrm>
-          <a:prstGeom prst="bentConnector2">
-            <a:avLst/>
+          <a:xfrm rot="10800000" flipV="1">
+            <a:off x="7341339" y="1741460"/>
+            <a:ext cx="3690990" cy="467046"/>
+          </a:xfrm>
+          <a:prstGeom prst="bentConnector3">
+            <a:avLst>
+              <a:gd name="adj1" fmla="val 99882"/>
+            </a:avLst>
           </a:prstGeom>
           <a:ln w="12700">
             <a:solidFill>
@@ -7236,8 +7007,8 @@
         </p:nvCxnSpPr>
         <p:spPr>
           <a:xfrm flipV="1">
-            <a:off x="10538584" y="2855345"/>
-            <a:ext cx="493745" cy="1020344"/>
+            <a:off x="10538584" y="1732414"/>
+            <a:ext cx="493745" cy="2143275"/>
           </a:xfrm>
           <a:prstGeom prst="bentConnector2">
             <a:avLst/>
@@ -10394,134 +10165,6 @@
           </p:txBody>
         </p:sp>
       </p:grpSp>
-      <p:grpSp>
-        <p:nvGrpSpPr>
-          <p:cNvPr id="71" name="Group 70"/>
-          <p:cNvGrpSpPr/>
-          <p:nvPr/>
-        </p:nvGrpSpPr>
-        <p:grpSpPr>
-          <a:xfrm>
-            <a:off x="8159007" y="2808989"/>
-            <a:ext cx="116660" cy="251150"/>
-            <a:chOff x="8400629" y="2842628"/>
-            <a:chExt cx="116660" cy="251150"/>
-          </a:xfrm>
-        </p:grpSpPr>
-        <p:sp>
-          <p:nvSpPr>
-            <p:cNvPr id="635" name="Line 104"/>
-            <p:cNvSpPr>
-              <a:spLocks noChangeShapeType="1"/>
-            </p:cNvSpPr>
-            <p:nvPr/>
-          </p:nvSpPr>
-          <p:spPr bwMode="auto">
-            <a:xfrm flipH="1" flipV="1">
-              <a:off x="8425143" y="2924377"/>
-              <a:ext cx="0" cy="40770"/>
-            </a:xfrm>
-            <a:prstGeom prst="line">
-              <a:avLst/>
-            </a:prstGeom>
-            <a:noFill/>
-            <a:ln w="8890">
-              <a:solidFill>
-                <a:schemeClr val="tx1"/>
-              </a:solidFill>
-              <a:round/>
-              <a:headEnd/>
-              <a:tailEnd type="stealth" w="med" len="med"/>
-            </a:ln>
-          </p:spPr>
-          <p:txBody>
-            <a:bodyPr lIns="90000" tIns="46800" rIns="90000" bIns="46800" anchor="ctr"/>
-            <a:lstStyle/>
-            <a:p>
-              <a:endParaRPr lang="en-US"/>
-            </a:p>
-          </p:txBody>
-        </p:sp>
-        <p:sp>
-          <p:nvSpPr>
-            <p:cNvPr id="636" name="Text Box 105"/>
-            <p:cNvSpPr txBox="1">
-              <a:spLocks noChangeArrowheads="1"/>
-            </p:cNvSpPr>
-            <p:nvPr/>
-          </p:nvSpPr>
-          <p:spPr bwMode="auto">
-            <a:xfrm>
-              <a:off x="8400629" y="2971540"/>
-              <a:ext cx="85725" cy="122238"/>
-            </a:xfrm>
-            <a:prstGeom prst="rect">
-              <a:avLst/>
-            </a:prstGeom>
-            <a:noFill/>
-            <a:ln w="12700">
-              <a:noFill/>
-              <a:miter lim="800000"/>
-              <a:headEnd/>
-              <a:tailEnd/>
-            </a:ln>
-          </p:spPr>
-          <p:txBody>
-            <a:bodyPr wrap="square" lIns="0" tIns="0" rIns="0" bIns="0">
-              <a:spAutoFit/>
-            </a:bodyPr>
-            <a:lstStyle/>
-            <a:p>
-              <a:pPr algn="l">
-                <a:buClrTx/>
-                <a:buSzTx/>
-                <a:buFontTx/>
-                <a:buNone/>
-              </a:pPr>
-              <a:r>
-                <a:rPr lang="en-US" sz="800" b="1" dirty="0"/>
-                <a:t>R</a:t>
-              </a:r>
-            </a:p>
-          </p:txBody>
-        </p:sp>
-        <p:sp>
-          <p:nvSpPr>
-            <p:cNvPr id="637" name="AutoShape 76"/>
-            <p:cNvSpPr>
-              <a:spLocks noChangeArrowheads="1"/>
-            </p:cNvSpPr>
-            <p:nvPr/>
-          </p:nvSpPr>
-          <p:spPr bwMode="auto">
-            <a:xfrm rot="5400000">
-              <a:off x="8445289" y="2842628"/>
-              <a:ext cx="72000" cy="72000"/>
-            </a:xfrm>
-            <a:prstGeom prst="flowChartConnector">
-              <a:avLst/>
-            </a:prstGeom>
-            <a:solidFill>
-              <a:schemeClr val="bg1"/>
-            </a:solidFill>
-            <a:ln w="17780">
-              <a:solidFill>
-                <a:schemeClr val="tx1"/>
-              </a:solidFill>
-              <a:round/>
-              <a:headEnd/>
-              <a:tailEnd/>
-            </a:ln>
-          </p:spPr>
-          <p:txBody>
-            <a:bodyPr wrap="none" lIns="90000" tIns="46800" rIns="90000" bIns="46800" anchor="ctr"/>
-            <a:lstStyle/>
-            <a:p>
-              <a:endParaRPr lang="en-US"/>
-            </a:p>
-          </p:txBody>
-        </p:sp>
-      </p:grpSp>
       <p:sp>
         <p:nvSpPr>
           <p:cNvPr id="338" name="Rectangular Callout 337"/>
@@ -11573,8 +11216,8 @@
         </p:nvSpPr>
         <p:spPr bwMode="auto">
           <a:xfrm>
-            <a:off x="5414271" y="5975372"/>
-            <a:ext cx="1466121" cy="174449"/>
+            <a:off x="5414400" y="5994000"/>
+            <a:ext cx="1465200" cy="162000"/>
           </a:xfrm>
           <a:prstGeom prst="rect">
             <a:avLst/>
@@ -12825,49 +12468,6 @@
       </p:sp>
       <p:sp>
         <p:nvSpPr>
-          <p:cNvPr id="537" name="Rectangle 138"/>
-          <p:cNvSpPr>
-            <a:spLocks noChangeArrowheads="1"/>
-          </p:cNvSpPr>
-          <p:nvPr/>
-        </p:nvSpPr>
-        <p:spPr bwMode="auto">
-          <a:xfrm>
-            <a:off x="6460815" y="2208506"/>
-            <a:ext cx="1596283" cy="206532"/>
-          </a:xfrm>
-          <a:prstGeom prst="rect">
-            <a:avLst/>
-          </a:prstGeom>
-          <a:solidFill>
-            <a:schemeClr val="accent5">
-              <a:lumMod val="40000"/>
-              <a:lumOff val="60000"/>
-            </a:schemeClr>
-          </a:solidFill>
-          <a:ln w="17780">
-            <a:solidFill>
-              <a:schemeClr val="tx1"/>
-            </a:solidFill>
-            <a:miter lim="800000"/>
-            <a:headEnd/>
-            <a:tailEnd/>
-          </a:ln>
-        </p:spPr>
-        <p:txBody>
-          <a:bodyPr lIns="36000" tIns="36000" rIns="36000" bIns="36000" anchor="ctr"/>
-          <a:lstStyle/>
-          <a:p>
-            <a:pPr algn="ctr"/>
-            <a:r>
-              <a:rPr lang="en-US" sz="1200" dirty="0"/>
-              <a:t>Shoot Cluster API LB</a:t>
-            </a:r>
-          </a:p>
-        </p:txBody>
-      </p:sp>
-      <p:sp>
-        <p:nvSpPr>
           <p:cNvPr id="458" name="Line 104">
             <a:extLst>
               <a:ext uri="{FF2B5EF4-FFF2-40B4-BE49-F238E27FC236}">
@@ -13197,14 +12797,15 @@
             </a:extLst>
           </p:cNvPr>
           <p:cNvCxnSpPr>
+            <a:cxnSpLocks/>
             <a:stCxn id="270" idx="2"/>
           </p:cNvCxnSpPr>
           <p:nvPr/>
         </p:nvCxnSpPr>
         <p:spPr>
-          <a:xfrm flipH="1">
-            <a:off x="10689056" y="1285413"/>
-            <a:ext cx="3779" cy="466404"/>
+          <a:xfrm>
+            <a:off x="10692835" y="1285413"/>
+            <a:ext cx="0" cy="362218"/>
           </a:xfrm>
           <a:prstGeom prst="line">
             <a:avLst/>
@@ -13368,8 +12969,8 @@
         </p:nvSpPr>
         <p:spPr bwMode="auto">
           <a:xfrm>
-            <a:off x="5414271" y="5747468"/>
-            <a:ext cx="1027036" cy="184515"/>
+            <a:off x="5414400" y="5785200"/>
+            <a:ext cx="1465200" cy="162000"/>
           </a:xfrm>
           <a:prstGeom prst="rect">
             <a:avLst/>
@@ -13402,60 +13003,6 @@
             <a:r>
               <a:rPr lang="en-US" sz="1000" dirty="0"/>
               <a:t>Monitoring</a:t>
-            </a:r>
-          </a:p>
-        </p:txBody>
-      </p:sp>
-      <p:sp>
-        <p:nvSpPr>
-          <p:cNvPr id="529" name="Rectangle 138">
-            <a:extLst>
-              <a:ext uri="{FF2B5EF4-FFF2-40B4-BE49-F238E27FC236}">
-                <a16:creationId xmlns:a16="http://schemas.microsoft.com/office/drawing/2014/main" id="{B35A1431-5D96-5A45-ABA4-9F5DE9CEF2D8}"/>
-              </a:ext>
-            </a:extLst>
-          </p:cNvPr>
-          <p:cNvSpPr>
-            <a:spLocks noChangeArrowheads="1"/>
-          </p:cNvSpPr>
-          <p:nvPr/>
-        </p:nvSpPr>
-        <p:spPr bwMode="auto">
-          <a:xfrm>
-            <a:off x="6442628" y="5747470"/>
-            <a:ext cx="437764" cy="184515"/>
-          </a:xfrm>
-          <a:prstGeom prst="rect">
-            <a:avLst/>
-          </a:prstGeom>
-          <a:solidFill>
-            <a:schemeClr val="accent4">
-              <a:lumMod val="60000"/>
-              <a:lumOff val="40000"/>
-            </a:schemeClr>
-          </a:solidFill>
-          <a:ln w="17780">
-            <a:solidFill>
-              <a:schemeClr val="tx1"/>
-            </a:solidFill>
-            <a:miter lim="800000"/>
-            <a:headEnd/>
-            <a:tailEnd/>
-          </a:ln>
-        </p:spPr>
-        <p:txBody>
-          <a:bodyPr lIns="36000" tIns="36000" rIns="36000" bIns="36000" anchor="ctr"/>
-          <a:lstStyle/>
-          <a:p>
-            <a:pPr algn="ctr">
-              <a:buClrTx/>
-              <a:buSzTx/>
-              <a:buFontTx/>
-              <a:buNone/>
-            </a:pPr>
-            <a:r>
-              <a:rPr lang="en-US" sz="1000" dirty="0"/>
-              <a:t>VPN</a:t>
             </a:r>
           </a:p>
         </p:txBody>
@@ -13821,8 +13368,8 @@
         </p:nvSpPr>
         <p:spPr>
           <a:xfrm>
-            <a:off x="5374026" y="4039170"/>
-            <a:ext cx="1547373" cy="1664173"/>
+            <a:off x="5374025" y="4039169"/>
+            <a:ext cx="1548000" cy="1699200"/>
           </a:xfrm>
           <a:prstGeom prst="rect">
             <a:avLst/>
@@ -13914,8 +13461,8 @@
         </p:nvSpPr>
         <p:spPr bwMode="auto">
           <a:xfrm>
-            <a:off x="5414271" y="4888034"/>
-            <a:ext cx="1260929" cy="199586"/>
+            <a:off x="5414400" y="5018400"/>
+            <a:ext cx="1260000" cy="162000"/>
           </a:xfrm>
           <a:prstGeom prst="rect">
             <a:avLst/>
@@ -13962,8 +13509,8 @@
         </p:nvSpPr>
         <p:spPr bwMode="auto">
           <a:xfrm>
-            <a:off x="6676601" y="4888034"/>
-            <a:ext cx="214682" cy="199586"/>
+            <a:off x="6678000" y="5018400"/>
+            <a:ext cx="216000" cy="162000"/>
           </a:xfrm>
           <a:prstGeom prst="rect">
             <a:avLst/>
@@ -13994,7 +13541,7 @@
               <a:buNone/>
             </a:pPr>
             <a:r>
-              <a:rPr lang="en-US" sz="1000"/>
+              <a:rPr lang="en-US" sz="1000" dirty="0"/>
               <a:t>D</a:t>
             </a:r>
           </a:p>
@@ -14010,8 +13557,8 @@
         </p:nvSpPr>
         <p:spPr bwMode="auto">
           <a:xfrm>
-            <a:off x="5414270" y="5137992"/>
-            <a:ext cx="1260000" cy="199586"/>
+            <a:off x="5414400" y="5220000"/>
+            <a:ext cx="1260000" cy="162000"/>
           </a:xfrm>
           <a:prstGeom prst="rect">
             <a:avLst/>
@@ -14058,8 +13605,8 @@
         </p:nvSpPr>
         <p:spPr bwMode="auto">
           <a:xfrm>
-            <a:off x="6677497" y="5137992"/>
-            <a:ext cx="213786" cy="199586"/>
+            <a:off x="6678000" y="5220000"/>
+            <a:ext cx="212400" cy="162000"/>
           </a:xfrm>
           <a:prstGeom prst="rect">
             <a:avLst/>
@@ -14090,7 +13637,7 @@
               <a:buNone/>
             </a:pPr>
             <a:r>
-              <a:rPr lang="en-US" sz="1000"/>
+              <a:rPr lang="en-US" sz="1000" dirty="0"/>
               <a:t>D</a:t>
             </a:r>
           </a:p>
@@ -14107,7 +13654,7 @@
         <p:spPr bwMode="auto">
           <a:xfrm>
             <a:off x="6668136" y="4085611"/>
-            <a:ext cx="214682" cy="194411"/>
+            <a:ext cx="216000" cy="162000"/>
           </a:xfrm>
           <a:prstGeom prst="rect">
             <a:avLst/>
@@ -14155,7 +13702,7 @@
         <p:spPr bwMode="auto">
           <a:xfrm>
             <a:off x="5414271" y="4085581"/>
-            <a:ext cx="811663" cy="194411"/>
+            <a:ext cx="810000" cy="162000"/>
           </a:xfrm>
           <a:prstGeom prst="rect">
             <a:avLst/>
@@ -14213,7 +13760,7 @@
         <p:spPr bwMode="auto">
           <a:xfrm>
             <a:off x="6217344" y="4085610"/>
-            <a:ext cx="450535" cy="195639"/>
+            <a:ext cx="450000" cy="162000"/>
           </a:xfrm>
           <a:prstGeom prst="rect">
             <a:avLst/>
@@ -14260,7 +13807,7 @@
         </p:nvGrpSpPr>
         <p:grpSpPr bwMode="auto">
           <a:xfrm rot="5400000">
-            <a:off x="6893262" y="4360669"/>
+            <a:off x="6893262" y="4348395"/>
             <a:ext cx="166994" cy="162315"/>
             <a:chOff x="998" y="3624"/>
             <a:chExt cx="271" cy="271"/>
@@ -14447,8 +13994,8 @@
         </p:nvSpPr>
         <p:spPr bwMode="auto">
           <a:xfrm>
-            <a:off x="7056432" y="4364764"/>
-            <a:ext cx="710063" cy="186379"/>
+            <a:off x="7056000" y="4341600"/>
+            <a:ext cx="709200" cy="162000"/>
           </a:xfrm>
           <a:prstGeom prst="roundRect">
             <a:avLst>
@@ -14497,8 +14044,8 @@
         </p:nvCxnSpPr>
         <p:spPr>
           <a:xfrm flipH="1">
-            <a:off x="7507538" y="4373153"/>
-            <a:ext cx="1" cy="176791"/>
+            <a:off x="7506000" y="4341600"/>
+            <a:ext cx="0" cy="162000"/>
           </a:xfrm>
           <a:prstGeom prst="line">
             <a:avLst/>
@@ -14526,8 +14073,8 @@
         </p:nvSpPr>
         <p:spPr bwMode="auto">
           <a:xfrm>
-            <a:off x="5414271" y="4358852"/>
-            <a:ext cx="1260000" cy="199586"/>
+            <a:off x="5414400" y="4341600"/>
+            <a:ext cx="1260000" cy="162000"/>
           </a:xfrm>
           <a:prstGeom prst="rect">
             <a:avLst/>
@@ -14578,8 +14125,8 @@
         </p:nvSpPr>
         <p:spPr bwMode="auto">
           <a:xfrm>
-            <a:off x="6680944" y="4358852"/>
-            <a:ext cx="214682" cy="199586"/>
+            <a:off x="6681600" y="4341600"/>
+            <a:ext cx="216000" cy="162000"/>
           </a:xfrm>
           <a:prstGeom prst="rect">
             <a:avLst/>
@@ -14610,7 +14157,7 @@
               <a:buNone/>
             </a:pPr>
             <a:r>
-              <a:rPr lang="en-US" sz="1000"/>
+              <a:rPr lang="en-US" sz="1000" dirty="0"/>
               <a:t>SS</a:t>
             </a:r>
           </a:p>
@@ -14626,8 +14173,8 @@
         </p:nvSpPr>
         <p:spPr bwMode="auto">
           <a:xfrm>
-            <a:off x="5414271" y="4614668"/>
-            <a:ext cx="838872" cy="197736"/>
+            <a:off x="5414400" y="4561200"/>
+            <a:ext cx="1260000" cy="162000"/>
           </a:xfrm>
           <a:prstGeom prst="rect">
             <a:avLst/>
@@ -14666,7 +14213,7 @@
       </p:sp>
       <p:sp>
         <p:nvSpPr>
-          <p:cNvPr id="432" name="Rectangle 138"/>
+          <p:cNvPr id="539" name="Rectangle 138"/>
           <p:cNvSpPr>
             <a:spLocks noChangeArrowheads="1"/>
           </p:cNvSpPr>
@@ -14674,8 +14221,8 @@
         </p:nvSpPr>
         <p:spPr bwMode="auto">
           <a:xfrm>
-            <a:off x="6216827" y="4614667"/>
-            <a:ext cx="487020" cy="197737"/>
+            <a:off x="6670800" y="4561200"/>
+            <a:ext cx="216000" cy="162000"/>
           </a:xfrm>
           <a:prstGeom prst="rect">
             <a:avLst/>
@@ -14707,14 +14254,20 @@
             </a:pPr>
             <a:r>
               <a:rPr lang="en-US" sz="1000" dirty="0"/>
-              <a:t>VPN</a:t>
+              <a:t>D</a:t>
             </a:r>
           </a:p>
         </p:txBody>
       </p:sp>
       <p:sp>
         <p:nvSpPr>
-          <p:cNvPr id="539" name="Rectangle 138"/>
+          <p:cNvPr id="581" name="Rectangle 138">
+            <a:extLst>
+              <a:ext uri="{FF2B5EF4-FFF2-40B4-BE49-F238E27FC236}">
+                <a16:creationId xmlns:a16="http://schemas.microsoft.com/office/drawing/2014/main" id="{63565779-6A67-9648-BAE1-FA286CDC6730}"/>
+              </a:ext>
+            </a:extLst>
+          </p:cNvPr>
           <p:cNvSpPr>
             <a:spLocks noChangeArrowheads="1"/>
           </p:cNvSpPr>
@@ -14722,8 +14275,8 @@
         </p:nvSpPr>
         <p:spPr bwMode="auto">
           <a:xfrm>
-            <a:off x="6671042" y="4614697"/>
-            <a:ext cx="214682" cy="197706"/>
+            <a:off x="5414400" y="5428800"/>
+            <a:ext cx="1260000" cy="162000"/>
           </a:xfrm>
           <a:prstGeom prst="rect">
             <a:avLst/>
@@ -14755,17 +14308,17 @@
             </a:pPr>
             <a:r>
               <a:rPr lang="en-US" sz="1000" dirty="0"/>
-              <a:t>D</a:t>
+              <a:t>Machine Controller</a:t>
             </a:r>
           </a:p>
         </p:txBody>
       </p:sp>
       <p:sp>
         <p:nvSpPr>
-          <p:cNvPr id="581" name="Rectangle 138">
+          <p:cNvPr id="582" name="Rectangle 138">
             <a:extLst>
               <a:ext uri="{FF2B5EF4-FFF2-40B4-BE49-F238E27FC236}">
-                <a16:creationId xmlns:a16="http://schemas.microsoft.com/office/drawing/2014/main" id="{63565779-6A67-9648-BAE1-FA286CDC6730}"/>
+                <a16:creationId xmlns:a16="http://schemas.microsoft.com/office/drawing/2014/main" id="{5A6259BE-D608-E040-9FDF-BDD62DDFBA88}"/>
               </a:ext>
             </a:extLst>
           </p:cNvPr>
@@ -14776,8 +14329,8 @@
         </p:nvSpPr>
         <p:spPr bwMode="auto">
           <a:xfrm>
-            <a:off x="5414271" y="5391206"/>
-            <a:ext cx="1260000" cy="183068"/>
+            <a:off x="6667200" y="5428800"/>
+            <a:ext cx="216000" cy="162000"/>
           </a:xfrm>
           <a:prstGeom prst="rect">
             <a:avLst/>
@@ -14809,60 +14362,6 @@
             </a:pPr>
             <a:r>
               <a:rPr lang="en-US" sz="1000" dirty="0"/>
-              <a:t>Machine Controller</a:t>
-            </a:r>
-          </a:p>
-        </p:txBody>
-      </p:sp>
-      <p:sp>
-        <p:nvSpPr>
-          <p:cNvPr id="582" name="Rectangle 138">
-            <a:extLst>
-              <a:ext uri="{FF2B5EF4-FFF2-40B4-BE49-F238E27FC236}">
-                <a16:creationId xmlns:a16="http://schemas.microsoft.com/office/drawing/2014/main" id="{5A6259BE-D608-E040-9FDF-BDD62DDFBA88}"/>
-              </a:ext>
-            </a:extLst>
-          </p:cNvPr>
-          <p:cNvSpPr>
-            <a:spLocks noChangeArrowheads="1"/>
-          </p:cNvSpPr>
-          <p:nvPr/>
-        </p:nvSpPr>
-        <p:spPr bwMode="auto">
-          <a:xfrm>
-            <a:off x="6665713" y="5391206"/>
-            <a:ext cx="214682" cy="182261"/>
-          </a:xfrm>
-          <a:prstGeom prst="rect">
-            <a:avLst/>
-          </a:prstGeom>
-          <a:solidFill>
-            <a:schemeClr val="accent2">
-              <a:lumMod val="60000"/>
-              <a:lumOff val="40000"/>
-            </a:schemeClr>
-          </a:solidFill>
-          <a:ln w="17780">
-            <a:solidFill>
-              <a:schemeClr val="tx1"/>
-            </a:solidFill>
-            <a:miter lim="800000"/>
-            <a:headEnd/>
-            <a:tailEnd/>
-          </a:ln>
-        </p:spPr>
-        <p:txBody>
-          <a:bodyPr lIns="36000" tIns="36000" rIns="36000" bIns="36000" anchor="ctr"/>
-          <a:lstStyle/>
-          <a:p>
-            <a:pPr algn="ctr">
-              <a:buClrTx/>
-              <a:buSzTx/>
-              <a:buFontTx/>
-              <a:buNone/>
-            </a:pPr>
-            <a:r>
-              <a:rPr lang="en-US" sz="1000" dirty="0"/>
               <a:t>D</a:t>
             </a:r>
           </a:p>
@@ -14882,7 +14381,7 @@
         </p:nvSpPr>
         <p:spPr bwMode="gray">
           <a:xfrm>
-            <a:off x="5502247" y="5568550"/>
+            <a:off x="5500800" y="5605200"/>
             <a:ext cx="1242872" cy="141142"/>
           </a:xfrm>
           <a:prstGeom prst="wedgeRectCallout">
@@ -14950,14 +14449,13 @@
           <p:cNvPr id="438" name="Elbow Connector 437"/>
           <p:cNvCxnSpPr>
             <a:cxnSpLocks/>
-            <a:endCxn id="539" idx="3"/>
           </p:cNvCxnSpPr>
           <p:nvPr/>
         </p:nvCxnSpPr>
         <p:spPr>
           <a:xfrm rot="5400000">
-            <a:off x="6239570" y="3064743"/>
-            <a:ext cx="2294961" cy="1002652"/>
+            <a:off x="6277492" y="2986247"/>
+            <a:ext cx="2227161" cy="1008544"/>
           </a:xfrm>
           <a:prstGeom prst="bentConnector2">
             <a:avLst/>
@@ -14988,22 +14486,17 @@
           <p:cNvPr id="564" name="Elbow Connector 563"/>
           <p:cNvCxnSpPr>
             <a:cxnSpLocks/>
-            <a:stCxn id="589" idx="0"/>
-            <a:endCxn id="432" idx="2"/>
+            <a:endCxn id="341" idx="3"/>
           </p:cNvCxnSpPr>
           <p:nvPr/>
         </p:nvCxnSpPr>
         <p:spPr>
-          <a:xfrm rot="16200000" flipH="1" flipV="1">
-            <a:off x="6661162" y="2011957"/>
-            <a:ext cx="2599621" cy="3001272"/>
-          </a:xfrm>
-          <a:prstGeom prst="bentConnector5">
-            <a:avLst>
-              <a:gd name="adj1" fmla="val -14412"/>
-              <a:gd name="adj2" fmla="val 36118"/>
-              <a:gd name="adj3" fmla="val 101588"/>
-            </a:avLst>
+          <a:xfrm rot="5400000">
+            <a:off x="6180775" y="3117464"/>
+            <a:ext cx="2482762" cy="1077911"/>
+          </a:xfrm>
+          <a:prstGeom prst="bentConnector2">
+            <a:avLst/>
           </a:prstGeom>
           <a:ln w="12700">
             <a:solidFill>
@@ -15040,7 +14533,7 @@
         </p:nvGrpSpPr>
         <p:grpSpPr>
           <a:xfrm>
-            <a:off x="7039219" y="4820286"/>
+            <a:off x="7039219" y="4861904"/>
             <a:ext cx="133802" cy="181810"/>
             <a:chOff x="5750967" y="257947"/>
             <a:chExt cx="133802" cy="181810"/>
@@ -15195,12 +14688,12 @@
         </p:nvCxnSpPr>
         <p:spPr>
           <a:xfrm rot="16200000" flipH="1">
-            <a:off x="6019758" y="4704102"/>
-            <a:ext cx="2234527" cy="1388819"/>
+            <a:off x="6002805" y="4687149"/>
+            <a:ext cx="2268164" cy="1389086"/>
           </a:xfrm>
           <a:prstGeom prst="bentConnector3">
             <a:avLst>
-              <a:gd name="adj1" fmla="val 1832"/>
+              <a:gd name="adj1" fmla="val 1839"/>
             </a:avLst>
           </a:prstGeom>
           <a:ln w="12700">
@@ -15409,13 +14902,13 @@
         </p:nvCxnSpPr>
         <p:spPr>
           <a:xfrm>
-            <a:off x="6880395" y="5482337"/>
-            <a:ext cx="3103740" cy="762090"/>
+            <a:off x="6883200" y="5509800"/>
+            <a:ext cx="3100935" cy="734627"/>
           </a:xfrm>
           <a:prstGeom prst="bentConnector4">
             <a:avLst>
-              <a:gd name="adj1" fmla="val 27380"/>
-              <a:gd name="adj2" fmla="val 149810"/>
+              <a:gd name="adj1" fmla="val 27359"/>
+              <a:gd name="adj2" fmla="val 131118"/>
             </a:avLst>
           </a:prstGeom>
           <a:ln w="12700">
@@ -15453,7 +14946,7 @@
         </p:nvGrpSpPr>
         <p:grpSpPr>
           <a:xfrm>
-            <a:off x="7018225" y="5456236"/>
+            <a:off x="7020000" y="5475600"/>
             <a:ext cx="133802" cy="181810"/>
             <a:chOff x="5750967" y="257947"/>
             <a:chExt cx="133802" cy="181810"/>
@@ -17070,6 +16563,748 @@
               <a:t>Runtime</a:t>
             </a:r>
             <a:endParaRPr lang="en-US" sz="1000" dirty="0"/>
+          </a:p>
+        </p:txBody>
+      </p:sp>
+      <p:grpSp>
+        <p:nvGrpSpPr>
+          <p:cNvPr id="447" name="Group 133"/>
+          <p:cNvGrpSpPr>
+            <a:grpSpLocks/>
+          </p:cNvGrpSpPr>
+          <p:nvPr/>
+        </p:nvGrpSpPr>
+        <p:grpSpPr bwMode="auto">
+          <a:xfrm rot="5400000">
+            <a:off x="6890703" y="4101672"/>
+            <a:ext cx="158400" cy="162000"/>
+            <a:chOff x="998" y="3624"/>
+            <a:chExt cx="271" cy="271"/>
+          </a:xfrm>
+        </p:grpSpPr>
+        <p:sp>
+          <p:nvSpPr>
+            <p:cNvPr id="448" name="Freeform 134"/>
+            <p:cNvSpPr>
+              <a:spLocks/>
+            </p:cNvSpPr>
+            <p:nvPr/>
+          </p:nvSpPr>
+          <p:spPr bwMode="auto">
+            <a:xfrm>
+              <a:off x="1043" y="3624"/>
+              <a:ext cx="46" cy="272"/>
+            </a:xfrm>
+            <a:custGeom>
+              <a:avLst/>
+              <a:gdLst>
+                <a:gd name="T0" fmla="*/ 3 w 201"/>
+                <a:gd name="T1" fmla="*/ 0 h 1201"/>
+                <a:gd name="T2" fmla="*/ 3 w 201"/>
+                <a:gd name="T3" fmla="*/ 14 h 1201"/>
+                <a:gd name="T4" fmla="*/ 0 60000 65536"/>
+                <a:gd name="T5" fmla="*/ 0 60000 65536"/>
+                <a:gd name="T6" fmla="*/ 0 w 201"/>
+                <a:gd name="T7" fmla="*/ 0 h 1201"/>
+                <a:gd name="T8" fmla="*/ 201 w 201"/>
+                <a:gd name="T9" fmla="*/ 1201 h 1201"/>
+              </a:gdLst>
+              <a:ahLst/>
+              <a:cxnLst>
+                <a:cxn ang="T4">
+                  <a:pos x="T0" y="T1"/>
+                </a:cxn>
+                <a:cxn ang="T5">
+                  <a:pos x="T2" y="T3"/>
+                </a:cxn>
+              </a:cxnLst>
+              <a:rect l="T6" t="T7" r="T8" b="T9"/>
+              <a:pathLst>
+                <a:path w="201" h="1201">
+                  <a:moveTo>
+                    <a:pt x="200" y="0"/>
+                  </a:moveTo>
+                  <a:cubicBezTo>
+                    <a:pt x="0" y="400"/>
+                    <a:pt x="0" y="800"/>
+                    <a:pt x="200" y="1200"/>
+                  </a:cubicBezTo>
+                </a:path>
+              </a:pathLst>
+            </a:custGeom>
+            <a:noFill/>
+            <a:ln w="7200">
+              <a:solidFill>
+                <a:srgbClr val="000000"/>
+              </a:solidFill>
+              <a:round/>
+              <a:headEnd/>
+              <a:tailEnd type="triangle" w="med" len="med"/>
+            </a:ln>
+          </p:spPr>
+          <p:txBody>
+            <a:bodyPr/>
+            <a:lstStyle/>
+            <a:p>
+              <a:endParaRPr lang="en-US"/>
+            </a:p>
+          </p:txBody>
+        </p:sp>
+        <p:sp>
+          <p:nvSpPr>
+            <p:cNvPr id="449" name="Freeform 135"/>
+            <p:cNvSpPr>
+              <a:spLocks/>
+            </p:cNvSpPr>
+            <p:nvPr/>
+          </p:nvSpPr>
+          <p:spPr bwMode="auto">
+            <a:xfrm>
+              <a:off x="1179" y="3624"/>
+              <a:ext cx="46" cy="272"/>
+            </a:xfrm>
+            <a:custGeom>
+              <a:avLst/>
+              <a:gdLst>
+                <a:gd name="T0" fmla="*/ 0 w 201"/>
+                <a:gd name="T1" fmla="*/ 14 h 1201"/>
+                <a:gd name="T2" fmla="*/ 0 w 201"/>
+                <a:gd name="T3" fmla="*/ 0 h 1201"/>
+                <a:gd name="T4" fmla="*/ 0 60000 65536"/>
+                <a:gd name="T5" fmla="*/ 0 60000 65536"/>
+                <a:gd name="T6" fmla="*/ 0 w 201"/>
+                <a:gd name="T7" fmla="*/ 0 h 1201"/>
+                <a:gd name="T8" fmla="*/ 201 w 201"/>
+                <a:gd name="T9" fmla="*/ 1201 h 1201"/>
+              </a:gdLst>
+              <a:ahLst/>
+              <a:cxnLst>
+                <a:cxn ang="T4">
+                  <a:pos x="T0" y="T1"/>
+                </a:cxn>
+                <a:cxn ang="T5">
+                  <a:pos x="T2" y="T3"/>
+                </a:cxn>
+              </a:cxnLst>
+              <a:rect l="T6" t="T7" r="T8" b="T9"/>
+              <a:pathLst>
+                <a:path w="201" h="1201">
+                  <a:moveTo>
+                    <a:pt x="0" y="1200"/>
+                  </a:moveTo>
+                  <a:cubicBezTo>
+                    <a:pt x="200" y="800"/>
+                    <a:pt x="200" y="400"/>
+                    <a:pt x="0" y="0"/>
+                  </a:cubicBezTo>
+                </a:path>
+              </a:pathLst>
+            </a:custGeom>
+            <a:noFill/>
+            <a:ln w="7200">
+              <a:solidFill>
+                <a:srgbClr val="000000"/>
+              </a:solidFill>
+              <a:round/>
+              <a:headEnd/>
+              <a:tailEnd type="triangle" w="med" len="med"/>
+            </a:ln>
+          </p:spPr>
+          <p:txBody>
+            <a:bodyPr/>
+            <a:lstStyle/>
+            <a:p>
+              <a:endParaRPr lang="en-US"/>
+            </a:p>
+          </p:txBody>
+        </p:sp>
+        <p:sp>
+          <p:nvSpPr>
+            <p:cNvPr id="450" name="AutoShape 136"/>
+            <p:cNvSpPr>
+              <a:spLocks noChangeArrowheads="1"/>
+            </p:cNvSpPr>
+            <p:nvPr/>
+          </p:nvSpPr>
+          <p:spPr bwMode="auto">
+            <a:xfrm>
+              <a:off x="998" y="3624"/>
+              <a:ext cx="272" cy="272"/>
+            </a:xfrm>
+            <a:prstGeom prst="roundRect">
+              <a:avLst>
+                <a:gd name="adj" fmla="val 366"/>
+              </a:avLst>
+            </a:prstGeom>
+            <a:noFill/>
+            <a:ln w="9525">
+              <a:noFill/>
+              <a:round/>
+              <a:headEnd/>
+              <a:tailEnd/>
+            </a:ln>
+          </p:spPr>
+          <p:txBody>
+            <a:bodyPr wrap="none" anchor="ctr"/>
+            <a:lstStyle/>
+            <a:p>
+              <a:endParaRPr lang="en-US"/>
+            </a:p>
+          </p:txBody>
+        </p:sp>
+      </p:grpSp>
+      <p:sp>
+        <p:nvSpPr>
+          <p:cNvPr id="341" name="Rectangle 138">
+            <a:extLst>
+              <a:ext uri="{FF2B5EF4-FFF2-40B4-BE49-F238E27FC236}">
+                <a16:creationId xmlns:a16="http://schemas.microsoft.com/office/drawing/2014/main" id="{F8A0210D-7F0F-434A-B5C9-18617517BF0F}"/>
+              </a:ext>
+            </a:extLst>
+          </p:cNvPr>
+          <p:cNvSpPr>
+            <a:spLocks noChangeArrowheads="1"/>
+          </p:cNvSpPr>
+          <p:nvPr/>
+        </p:nvSpPr>
+        <p:spPr bwMode="auto">
+          <a:xfrm>
+            <a:off x="6667200" y="4816800"/>
+            <a:ext cx="216000" cy="162000"/>
+          </a:xfrm>
+          <a:prstGeom prst="rect">
+            <a:avLst/>
+          </a:prstGeom>
+          <a:solidFill>
+            <a:schemeClr val="accent2">
+              <a:lumMod val="60000"/>
+              <a:lumOff val="40000"/>
+            </a:schemeClr>
+          </a:solidFill>
+          <a:ln w="17780">
+            <a:solidFill>
+              <a:schemeClr val="tx1"/>
+            </a:solidFill>
+            <a:miter lim="800000"/>
+            <a:headEnd/>
+            <a:tailEnd/>
+          </a:ln>
+        </p:spPr>
+        <p:txBody>
+          <a:bodyPr lIns="36000" tIns="36000" rIns="36000" bIns="36000" anchor="ctr"/>
+          <a:lstStyle/>
+          <a:p>
+            <a:pPr algn="ctr">
+              <a:buClrTx/>
+              <a:buSzTx/>
+              <a:buFontTx/>
+              <a:buNone/>
+            </a:pPr>
+            <a:r>
+              <a:rPr lang="en-US" sz="1000" dirty="0"/>
+              <a:t>D</a:t>
+            </a:r>
+          </a:p>
+        </p:txBody>
+      </p:sp>
+      <p:sp>
+        <p:nvSpPr>
+          <p:cNvPr id="344" name="Rectangle 138">
+            <a:extLst>
+              <a:ext uri="{FF2B5EF4-FFF2-40B4-BE49-F238E27FC236}">
+                <a16:creationId xmlns:a16="http://schemas.microsoft.com/office/drawing/2014/main" id="{31BDEE7F-63C0-BC4D-8ABC-993D1A2992E0}"/>
+              </a:ext>
+            </a:extLst>
+          </p:cNvPr>
+          <p:cNvSpPr>
+            <a:spLocks noChangeArrowheads="1"/>
+          </p:cNvSpPr>
+          <p:nvPr/>
+        </p:nvSpPr>
+        <p:spPr bwMode="auto">
+          <a:xfrm>
+            <a:off x="5418000" y="4816800"/>
+            <a:ext cx="720000" cy="162000"/>
+          </a:xfrm>
+          <a:prstGeom prst="rect">
+            <a:avLst/>
+          </a:prstGeom>
+          <a:solidFill>
+            <a:schemeClr val="accent2">
+              <a:lumMod val="60000"/>
+              <a:lumOff val="40000"/>
+            </a:schemeClr>
+          </a:solidFill>
+          <a:ln w="17780">
+            <a:solidFill>
+              <a:schemeClr val="tx1"/>
+            </a:solidFill>
+            <a:miter lim="800000"/>
+            <a:headEnd/>
+            <a:tailEnd/>
+          </a:ln>
+        </p:spPr>
+        <p:txBody>
+          <a:bodyPr lIns="36000" tIns="36000" rIns="36000" bIns="36000" anchor="ctr"/>
+          <a:lstStyle/>
+          <a:p>
+            <a:pPr algn="ctr">
+              <a:buClrTx/>
+              <a:buSzTx/>
+              <a:buFontTx/>
+              <a:buNone/>
+            </a:pPr>
+            <a:r>
+              <a:rPr lang="en-US" sz="1000" dirty="0"/>
+              <a:t>VPN Server</a:t>
+            </a:r>
+          </a:p>
+        </p:txBody>
+      </p:sp>
+      <p:sp>
+        <p:nvSpPr>
+          <p:cNvPr id="537" name="Rectangle 138"/>
+          <p:cNvSpPr>
+            <a:spLocks noChangeArrowheads="1"/>
+          </p:cNvSpPr>
+          <p:nvPr/>
+        </p:nvSpPr>
+        <p:spPr bwMode="auto">
+          <a:xfrm>
+            <a:off x="6460815" y="2208506"/>
+            <a:ext cx="1596283" cy="206532"/>
+          </a:xfrm>
+          <a:prstGeom prst="rect">
+            <a:avLst/>
+          </a:prstGeom>
+          <a:solidFill>
+            <a:schemeClr val="accent5">
+              <a:lumMod val="40000"/>
+              <a:lumOff val="60000"/>
+            </a:schemeClr>
+          </a:solidFill>
+          <a:ln w="17780">
+            <a:solidFill>
+              <a:schemeClr val="tx1"/>
+            </a:solidFill>
+            <a:miter lim="800000"/>
+            <a:headEnd/>
+            <a:tailEnd/>
+          </a:ln>
+        </p:spPr>
+        <p:txBody>
+          <a:bodyPr lIns="36000" tIns="36000" rIns="36000" bIns="36000" anchor="ctr"/>
+          <a:lstStyle/>
+          <a:p>
+            <a:pPr algn="ctr"/>
+            <a:r>
+              <a:rPr lang="en-US" sz="1200" dirty="0"/>
+              <a:t>Istio Ingress LB</a:t>
+            </a:r>
+          </a:p>
+        </p:txBody>
+      </p:sp>
+      <p:cxnSp>
+        <p:nvCxnSpPr>
+          <p:cNvPr id="385" name="Elbow Connector 384">
+            <a:extLst>
+              <a:ext uri="{FF2B5EF4-FFF2-40B4-BE49-F238E27FC236}">
+                <a16:creationId xmlns:a16="http://schemas.microsoft.com/office/drawing/2014/main" id="{0A6FE412-6C4A-1548-B21D-CDFE00BBA260}"/>
+              </a:ext>
+            </a:extLst>
+          </p:cNvPr>
+          <p:cNvCxnSpPr>
+            <a:cxnSpLocks/>
+          </p:cNvCxnSpPr>
+          <p:nvPr/>
+        </p:nvCxnSpPr>
+        <p:spPr>
+          <a:xfrm flipH="1">
+            <a:off x="6397200" y="4680000"/>
+            <a:ext cx="489600" cy="174600"/>
+          </a:xfrm>
+          <a:prstGeom prst="bentConnector4">
+            <a:avLst>
+              <a:gd name="adj1" fmla="val -40855"/>
+              <a:gd name="adj2" fmla="val 51375"/>
+            </a:avLst>
+          </a:prstGeom>
+          <a:ln w="12700">
+            <a:solidFill>
+              <a:schemeClr val="tx1"/>
+            </a:solidFill>
+          </a:ln>
+        </p:spPr>
+        <p:style>
+          <a:lnRef idx="1">
+            <a:schemeClr val="accent1"/>
+          </a:lnRef>
+          <a:fillRef idx="0">
+            <a:schemeClr val="accent1"/>
+          </a:fillRef>
+          <a:effectRef idx="0">
+            <a:schemeClr val="accent1"/>
+          </a:effectRef>
+          <a:fontRef idx="minor">
+            <a:schemeClr val="tx1"/>
+          </a:fontRef>
+        </p:style>
+      </p:cxnSp>
+      <p:grpSp>
+        <p:nvGrpSpPr>
+          <p:cNvPr id="391" name="Group 390">
+            <a:extLst>
+              <a:ext uri="{FF2B5EF4-FFF2-40B4-BE49-F238E27FC236}">
+                <a16:creationId xmlns:a16="http://schemas.microsoft.com/office/drawing/2014/main" id="{58EC9102-4989-784A-8782-99A2BE026B8F}"/>
+              </a:ext>
+            </a:extLst>
+          </p:cNvPr>
+          <p:cNvGrpSpPr/>
+          <p:nvPr/>
+        </p:nvGrpSpPr>
+        <p:grpSpPr>
+          <a:xfrm>
+            <a:off x="7053442" y="4626267"/>
+            <a:ext cx="180269" cy="171451"/>
+            <a:chOff x="5145186" y="193240"/>
+            <a:chExt cx="180269" cy="171451"/>
+          </a:xfrm>
+        </p:grpSpPr>
+        <p:sp>
+          <p:nvSpPr>
+            <p:cNvPr id="392" name="Line 104">
+              <a:extLst>
+                <a:ext uri="{FF2B5EF4-FFF2-40B4-BE49-F238E27FC236}">
+                  <a16:creationId xmlns:a16="http://schemas.microsoft.com/office/drawing/2014/main" id="{C367BC49-AC9F-844B-8724-77A28E3A2D96}"/>
+                </a:ext>
+              </a:extLst>
+            </p:cNvPr>
+            <p:cNvSpPr>
+              <a:spLocks noChangeShapeType="1"/>
+            </p:cNvSpPr>
+            <p:nvPr/>
+          </p:nvSpPr>
+          <p:spPr bwMode="auto">
+            <a:xfrm>
+              <a:off x="5266717" y="329947"/>
+              <a:ext cx="0" cy="34744"/>
+            </a:xfrm>
+            <a:prstGeom prst="line">
+              <a:avLst/>
+            </a:prstGeom>
+            <a:noFill/>
+            <a:ln w="8890">
+              <a:solidFill>
+                <a:schemeClr val="tx1"/>
+              </a:solidFill>
+              <a:round/>
+              <a:headEnd/>
+              <a:tailEnd type="stealth" w="med" len="med"/>
+            </a:ln>
+          </p:spPr>
+          <p:txBody>
+            <a:bodyPr lIns="90000" tIns="46800" rIns="90000" bIns="46800" anchor="ctr"/>
+            <a:lstStyle/>
+            <a:p>
+              <a:endParaRPr lang="en-US"/>
+            </a:p>
+          </p:txBody>
+        </p:sp>
+        <p:sp>
+          <p:nvSpPr>
+            <p:cNvPr id="395" name="Text Box 105">
+              <a:extLst>
+                <a:ext uri="{FF2B5EF4-FFF2-40B4-BE49-F238E27FC236}">
+                  <a16:creationId xmlns:a16="http://schemas.microsoft.com/office/drawing/2014/main" id="{45F1CBFA-A7F2-C04A-B15B-D74982C8A700}"/>
+                </a:ext>
+              </a:extLst>
+            </p:cNvPr>
+            <p:cNvSpPr txBox="1">
+              <a:spLocks noChangeArrowheads="1"/>
+            </p:cNvSpPr>
+            <p:nvPr/>
+          </p:nvSpPr>
+          <p:spPr bwMode="auto">
+            <a:xfrm flipH="1">
+              <a:off x="5239730" y="193240"/>
+              <a:ext cx="85725" cy="122238"/>
+            </a:xfrm>
+            <a:prstGeom prst="rect">
+              <a:avLst/>
+            </a:prstGeom>
+            <a:noFill/>
+            <a:ln w="12700">
+              <a:noFill/>
+              <a:miter lim="800000"/>
+              <a:headEnd/>
+              <a:tailEnd/>
+            </a:ln>
+          </p:spPr>
+          <p:txBody>
+            <a:bodyPr lIns="0" tIns="0" rIns="0" bIns="0">
+              <a:spAutoFit/>
+            </a:bodyPr>
+            <a:lstStyle/>
+            <a:p>
+              <a:pPr algn="l">
+                <a:buClrTx/>
+                <a:buSzTx/>
+                <a:buFontTx/>
+                <a:buNone/>
+              </a:pPr>
+              <a:r>
+                <a:rPr lang="en-US" sz="800" b="1" dirty="0"/>
+                <a:t>R</a:t>
+              </a:r>
+            </a:p>
+          </p:txBody>
+        </p:sp>
+        <p:sp>
+          <p:nvSpPr>
+            <p:cNvPr id="396" name="AutoShape 76">
+              <a:extLst>
+                <a:ext uri="{FF2B5EF4-FFF2-40B4-BE49-F238E27FC236}">
+                  <a16:creationId xmlns:a16="http://schemas.microsoft.com/office/drawing/2014/main" id="{C0CB0EEE-B210-5D47-A7F9-FF737E96CAC5}"/>
+                </a:ext>
+              </a:extLst>
+            </p:cNvPr>
+            <p:cNvSpPr>
+              <a:spLocks noChangeArrowheads="1"/>
+            </p:cNvSpPr>
+            <p:nvPr/>
+          </p:nvSpPr>
+          <p:spPr bwMode="auto">
+            <a:xfrm rot="16200000" flipH="1">
+              <a:off x="5145186" y="257947"/>
+              <a:ext cx="72000" cy="72000"/>
+            </a:xfrm>
+            <a:prstGeom prst="flowChartConnector">
+              <a:avLst/>
+            </a:prstGeom>
+            <a:solidFill>
+              <a:schemeClr val="bg1"/>
+            </a:solidFill>
+            <a:ln w="17780">
+              <a:solidFill>
+                <a:schemeClr val="tx1"/>
+              </a:solidFill>
+              <a:round/>
+              <a:headEnd/>
+              <a:tailEnd/>
+            </a:ln>
+          </p:spPr>
+          <p:txBody>
+            <a:bodyPr wrap="none" lIns="90000" tIns="46800" rIns="90000" bIns="46800" anchor="ctr"/>
+            <a:lstStyle/>
+            <a:p>
+              <a:endParaRPr lang="en-US"/>
+            </a:p>
+          </p:txBody>
+        </p:sp>
+      </p:grpSp>
+      <p:grpSp>
+        <p:nvGrpSpPr>
+          <p:cNvPr id="397" name="Group 396">
+            <a:extLst>
+              <a:ext uri="{FF2B5EF4-FFF2-40B4-BE49-F238E27FC236}">
+                <a16:creationId xmlns:a16="http://schemas.microsoft.com/office/drawing/2014/main" id="{0DA6ADC3-5CAD-6843-AFA2-5A12F5EB4E35}"/>
+              </a:ext>
+            </a:extLst>
+          </p:cNvPr>
+          <p:cNvGrpSpPr/>
+          <p:nvPr/>
+        </p:nvGrpSpPr>
+        <p:grpSpPr>
+          <a:xfrm>
+            <a:off x="8187968" y="2745366"/>
+            <a:ext cx="151694" cy="171029"/>
+            <a:chOff x="4873292" y="581648"/>
+            <a:chExt cx="151694" cy="171029"/>
+          </a:xfrm>
+        </p:grpSpPr>
+        <p:sp>
+          <p:nvSpPr>
+            <p:cNvPr id="398" name="Line 104">
+              <a:extLst>
+                <a:ext uri="{FF2B5EF4-FFF2-40B4-BE49-F238E27FC236}">
+                  <a16:creationId xmlns:a16="http://schemas.microsoft.com/office/drawing/2014/main" id="{5E97A2E4-AEB1-5945-B42C-2F8FD2246CC4}"/>
+                </a:ext>
+              </a:extLst>
+            </p:cNvPr>
+            <p:cNvSpPr>
+              <a:spLocks noChangeShapeType="1"/>
+            </p:cNvSpPr>
+            <p:nvPr/>
+          </p:nvSpPr>
+          <p:spPr bwMode="auto">
+            <a:xfrm flipH="1" flipV="1">
+              <a:off x="4900280" y="581648"/>
+              <a:ext cx="0" cy="40770"/>
+            </a:xfrm>
+            <a:prstGeom prst="line">
+              <a:avLst/>
+            </a:prstGeom>
+            <a:noFill/>
+            <a:ln w="8890">
+              <a:solidFill>
+                <a:schemeClr val="tx1"/>
+              </a:solidFill>
+              <a:round/>
+              <a:headEnd/>
+              <a:tailEnd type="stealth" w="med" len="med"/>
+            </a:ln>
+          </p:spPr>
+          <p:txBody>
+            <a:bodyPr lIns="90000" tIns="46800" rIns="90000" bIns="46800" anchor="ctr"/>
+            <a:lstStyle/>
+            <a:p>
+              <a:endParaRPr lang="en-US"/>
+            </a:p>
+          </p:txBody>
+        </p:sp>
+        <p:sp>
+          <p:nvSpPr>
+            <p:cNvPr id="402" name="Text Box 105">
+              <a:extLst>
+                <a:ext uri="{FF2B5EF4-FFF2-40B4-BE49-F238E27FC236}">
+                  <a16:creationId xmlns:a16="http://schemas.microsoft.com/office/drawing/2014/main" id="{1FDCF607-B828-A440-ACC0-1D11AE1CF21A}"/>
+                </a:ext>
+              </a:extLst>
+            </p:cNvPr>
+            <p:cNvSpPr txBox="1">
+              <a:spLocks noChangeArrowheads="1"/>
+            </p:cNvSpPr>
+            <p:nvPr/>
+          </p:nvSpPr>
+          <p:spPr bwMode="auto">
+            <a:xfrm>
+              <a:off x="4873292" y="630439"/>
+              <a:ext cx="85725" cy="122238"/>
+            </a:xfrm>
+            <a:prstGeom prst="rect">
+              <a:avLst/>
+            </a:prstGeom>
+            <a:noFill/>
+            <a:ln w="12700">
+              <a:noFill/>
+              <a:miter lim="800000"/>
+              <a:headEnd/>
+              <a:tailEnd/>
+            </a:ln>
+          </p:spPr>
+          <p:txBody>
+            <a:bodyPr lIns="0" tIns="0" rIns="0" bIns="0">
+              <a:spAutoFit/>
+            </a:bodyPr>
+            <a:lstStyle/>
+            <a:p>
+              <a:pPr algn="l">
+                <a:buClrTx/>
+                <a:buSzTx/>
+                <a:buFontTx/>
+                <a:buNone/>
+              </a:pPr>
+              <a:r>
+                <a:rPr lang="en-US" sz="800" b="1"/>
+                <a:t>R</a:t>
+              </a:r>
+            </a:p>
+          </p:txBody>
+        </p:sp>
+        <p:sp>
+          <p:nvSpPr>
+            <p:cNvPr id="414" name="AutoShape 76">
+              <a:extLst>
+                <a:ext uri="{FF2B5EF4-FFF2-40B4-BE49-F238E27FC236}">
+                  <a16:creationId xmlns:a16="http://schemas.microsoft.com/office/drawing/2014/main" id="{38933A99-55B5-F949-872F-37EE4CFC8832}"/>
+                </a:ext>
+              </a:extLst>
+            </p:cNvPr>
+            <p:cNvSpPr>
+              <a:spLocks noChangeArrowheads="1"/>
+            </p:cNvSpPr>
+            <p:nvPr/>
+          </p:nvSpPr>
+          <p:spPr bwMode="auto">
+            <a:xfrm rot="5400000">
+              <a:off x="4952986" y="623443"/>
+              <a:ext cx="72000" cy="72000"/>
+            </a:xfrm>
+            <a:prstGeom prst="flowChartConnector">
+              <a:avLst/>
+            </a:prstGeom>
+            <a:solidFill>
+              <a:schemeClr val="bg1"/>
+            </a:solidFill>
+            <a:ln w="17780">
+              <a:solidFill>
+                <a:schemeClr val="tx1"/>
+              </a:solidFill>
+              <a:round/>
+              <a:headEnd/>
+              <a:tailEnd/>
+            </a:ln>
+          </p:spPr>
+          <p:txBody>
+            <a:bodyPr wrap="none" lIns="90000" tIns="46800" rIns="90000" bIns="46800" anchor="ctr"/>
+            <a:lstStyle/>
+            <a:p>
+              <a:endParaRPr lang="en-US"/>
+            </a:p>
+          </p:txBody>
+        </p:sp>
+      </p:grpSp>
+      <p:sp>
+        <p:nvSpPr>
+          <p:cNvPr id="346" name="Rectangle 138">
+            <a:extLst>
+              <a:ext uri="{FF2B5EF4-FFF2-40B4-BE49-F238E27FC236}">
+                <a16:creationId xmlns:a16="http://schemas.microsoft.com/office/drawing/2014/main" id="{697EC147-0DF8-D442-A592-3A509F2E6401}"/>
+              </a:ext>
+            </a:extLst>
+          </p:cNvPr>
+          <p:cNvSpPr>
+            <a:spLocks noChangeArrowheads="1"/>
+          </p:cNvSpPr>
+          <p:nvPr/>
+        </p:nvSpPr>
+        <p:spPr bwMode="auto">
+          <a:xfrm>
+            <a:off x="6127200" y="4816800"/>
+            <a:ext cx="540000" cy="162000"/>
+          </a:xfrm>
+          <a:prstGeom prst="rect">
+            <a:avLst/>
+          </a:prstGeom>
+          <a:solidFill>
+            <a:schemeClr val="accent2">
+              <a:lumMod val="60000"/>
+              <a:lumOff val="40000"/>
+            </a:schemeClr>
+          </a:solidFill>
+          <a:ln w="17780">
+            <a:solidFill>
+              <a:schemeClr val="tx1"/>
+            </a:solidFill>
+            <a:miter lim="800000"/>
+            <a:headEnd/>
+            <a:tailEnd/>
+          </a:ln>
+        </p:spPr>
+        <p:txBody>
+          <a:bodyPr lIns="36000" tIns="36000" rIns="36000" bIns="36000" anchor="ctr"/>
+          <a:lstStyle/>
+          <a:p>
+            <a:pPr algn="ctr">
+              <a:buClrTx/>
+              <a:buSzTx/>
+              <a:buFontTx/>
+              <a:buNone/>
+            </a:pPr>
+            <a:r>
+              <a:rPr lang="en-US" sz="1000" dirty="0"/>
+              <a:t>Envoy</a:t>
+            </a:r>
           </a:p>
         </p:txBody>
       </p:sp>

</xml_diff>